<commit_message>
Diagram of Cavity packaging.
</commit_message>
<xml_diff>
--- a/src/Diagrams/Packages.pptx
+++ b/src/Diagrams/Packages.pptx
@@ -8,7 +8,7 @@
     <p:sldId id="258" r:id="rId2"/>
   </p:sldIdLst>
   <p:sldSz cx="9144000" cy="6858000" type="screen4x3"/>
-  <p:notesSz cx="6858000" cy="9144000"/>
+  <p:notesSz cx="6834188" cy="9979025"/>
   <p:defaultTextStyle>
     <a:defPPr>
       <a:defRPr lang="en-US"/>
@@ -108,15 +108,15 @@
 </file>
 
 <file path=ppt/diagrams/colors1.xml><?xml version="1.0" encoding="utf-8"?>
-<dgm:colorsDef xmlns:dgm="http://schemas.openxmlformats.org/drawingml/2006/diagram" xmlns:a="http://schemas.openxmlformats.org/drawingml/2006/main" uniqueId="urn:microsoft.com/office/officeart/2005/8/colors/accent1_2">
+<dgm:colorsDef xmlns:dgm="http://schemas.openxmlformats.org/drawingml/2006/diagram" xmlns:a="http://schemas.openxmlformats.org/drawingml/2006/main" uniqueId="urn:microsoft.com/office/officeart/2005/8/colors/colorful4">
   <dgm:title val=""/>
   <dgm:desc val=""/>
   <dgm:catLst>
-    <dgm:cat type="accent1" pri="11200"/>
+    <dgm:cat type="colorful" pri="10400"/>
   </dgm:catLst>
   <dgm:styleLbl name="node0">
     <dgm:fillClrLst meth="repeat">
-      <a:schemeClr val="accent1"/>
+      <a:schemeClr val="accent3"/>
     </dgm:fillClrLst>
     <dgm:linClrLst meth="repeat">
       <a:schemeClr val="lt1"/>
@@ -126,21 +126,10 @@
     <dgm:txFillClrLst/>
     <dgm:txEffectClrLst/>
   </dgm:styleLbl>
-  <dgm:styleLbl name="alignNode1">
-    <dgm:fillClrLst meth="repeat">
-      <a:schemeClr val="accent1"/>
-    </dgm:fillClrLst>
-    <dgm:linClrLst meth="repeat">
-      <a:schemeClr val="accent1"/>
-    </dgm:linClrLst>
-    <dgm:effectClrLst/>
-    <dgm:txLinClrLst/>
-    <dgm:txFillClrLst/>
-    <dgm:txEffectClrLst/>
-  </dgm:styleLbl>
   <dgm:styleLbl name="node1">
-    <dgm:fillClrLst meth="repeat">
-      <a:schemeClr val="accent1"/>
+    <dgm:fillClrLst>
+      <a:schemeClr val="accent4"/>
+      <a:schemeClr val="accent5"/>
     </dgm:fillClrLst>
     <dgm:linClrLst meth="repeat">
       <a:schemeClr val="lt1"/>
@@ -150,9 +139,24 @@
     <dgm:txFillClrLst/>
     <dgm:txEffectClrLst/>
   </dgm:styleLbl>
+  <dgm:styleLbl name="alignNode1">
+    <dgm:fillClrLst>
+      <a:schemeClr val="accent4"/>
+      <a:schemeClr val="accent5"/>
+    </dgm:fillClrLst>
+    <dgm:linClrLst>
+      <a:schemeClr val="accent4"/>
+      <a:schemeClr val="accent5"/>
+    </dgm:linClrLst>
+    <dgm:effectClrLst/>
+    <dgm:txLinClrLst/>
+    <dgm:txFillClrLst/>
+    <dgm:txEffectClrLst/>
+  </dgm:styleLbl>
   <dgm:styleLbl name="lnNode1">
-    <dgm:fillClrLst meth="repeat">
-      <a:schemeClr val="accent1"/>
+    <dgm:fillClrLst>
+      <a:schemeClr val="accent4"/>
+      <a:schemeClr val="accent5"/>
     </dgm:fillClrLst>
     <dgm:linClrLst meth="repeat">
       <a:schemeClr val="lt1"/>
@@ -163,8 +167,11 @@
     <dgm:txEffectClrLst/>
   </dgm:styleLbl>
   <dgm:styleLbl name="vennNode1">
-    <dgm:fillClrLst meth="repeat">
-      <a:schemeClr val="accent1">
+    <dgm:fillClrLst>
+      <a:schemeClr val="accent4">
+        <a:alpha val="50000"/>
+      </a:schemeClr>
+      <a:schemeClr val="accent5">
         <a:alpha val="50000"/>
       </a:schemeClr>
     </dgm:fillClrLst>
@@ -177,7 +184,31 @@
     <dgm:txEffectClrLst/>
   </dgm:styleLbl>
   <dgm:styleLbl name="node2">
-    <dgm:fillClrLst meth="repeat">
+    <dgm:fillClrLst>
+      <a:schemeClr val="accent5"/>
+    </dgm:fillClrLst>
+    <dgm:linClrLst meth="repeat">
+      <a:schemeClr val="lt1"/>
+    </dgm:linClrLst>
+    <dgm:effectClrLst/>
+    <dgm:txLinClrLst/>
+    <dgm:txFillClrLst/>
+    <dgm:txEffectClrLst/>
+  </dgm:styleLbl>
+  <dgm:styleLbl name="node3">
+    <dgm:fillClrLst>
+      <a:schemeClr val="accent6"/>
+    </dgm:fillClrLst>
+    <dgm:linClrLst meth="repeat">
+      <a:schemeClr val="lt1"/>
+    </dgm:linClrLst>
+    <dgm:effectClrLst/>
+    <dgm:txLinClrLst/>
+    <dgm:txFillClrLst/>
+    <dgm:txEffectClrLst/>
+  </dgm:styleLbl>
+  <dgm:styleLbl name="node4">
+    <dgm:fillClrLst>
       <a:schemeClr val="accent1"/>
     </dgm:fillClrLst>
     <dgm:linClrLst meth="repeat">
@@ -188,33 +219,12 @@
     <dgm:txFillClrLst/>
     <dgm:txEffectClrLst/>
   </dgm:styleLbl>
-  <dgm:styleLbl name="node3">
-    <dgm:fillClrLst meth="repeat">
-      <a:schemeClr val="accent1"/>
-    </dgm:fillClrLst>
-    <dgm:linClrLst meth="repeat">
-      <a:schemeClr val="lt1"/>
-    </dgm:linClrLst>
-    <dgm:effectClrLst/>
-    <dgm:txLinClrLst/>
-    <dgm:txFillClrLst/>
-    <dgm:txEffectClrLst/>
-  </dgm:styleLbl>
-  <dgm:styleLbl name="node4">
-    <dgm:fillClrLst meth="repeat">
-      <a:schemeClr val="accent1"/>
-    </dgm:fillClrLst>
-    <dgm:linClrLst meth="repeat">
-      <a:schemeClr val="lt1"/>
-    </dgm:linClrLst>
-    <dgm:effectClrLst/>
-    <dgm:txLinClrLst/>
-    <dgm:txFillClrLst/>
-    <dgm:txEffectClrLst/>
-  </dgm:styleLbl>
   <dgm:styleLbl name="fgImgPlace1">
-    <dgm:fillClrLst meth="repeat">
-      <a:schemeClr val="accent1">
+    <dgm:fillClrLst>
+      <a:schemeClr val="accent4">
+        <a:tint val="50000"/>
+      </a:schemeClr>
+      <a:schemeClr val="accent5">
         <a:tint val="50000"/>
       </a:schemeClr>
     </dgm:fillClrLst>
@@ -229,9 +239,12 @@
     <dgm:txEffectClrLst/>
   </dgm:styleLbl>
   <dgm:styleLbl name="alignImgPlace1">
-    <dgm:fillClrLst meth="repeat">
-      <a:schemeClr val="accent1">
+    <dgm:fillClrLst>
+      <a:schemeClr val="accent4">
         <a:tint val="50000"/>
+      </a:schemeClr>
+      <a:schemeClr val="accent5">
+        <a:tint val="20000"/>
       </a:schemeClr>
     </dgm:fillClrLst>
     <dgm:linClrLst meth="repeat">
@@ -245,9 +258,12 @@
     <dgm:txEffectClrLst/>
   </dgm:styleLbl>
   <dgm:styleLbl name="bgImgPlace1">
-    <dgm:fillClrLst meth="repeat">
-      <a:schemeClr val="accent1">
+    <dgm:fillClrLst>
+      <a:schemeClr val="accent4">
         <a:tint val="50000"/>
+      </a:schemeClr>
+      <a:schemeClr val="accent5">
+        <a:tint val="20000"/>
       </a:schemeClr>
     </dgm:fillClrLst>
     <dgm:linClrLst meth="repeat">
@@ -261,14 +277,84 @@
     <dgm:txEffectClrLst/>
   </dgm:styleLbl>
   <dgm:styleLbl name="sibTrans2D1">
-    <dgm:fillClrLst meth="repeat">
-      <a:schemeClr val="accent1">
-        <a:tint val="60000"/>
-      </a:schemeClr>
+    <dgm:fillClrLst>
+      <a:schemeClr val="accent4"/>
+      <a:schemeClr val="accent5"/>
     </dgm:fillClrLst>
     <dgm:linClrLst meth="repeat">
-      <a:schemeClr val="accent1">
-        <a:tint val="60000"/>
+      <a:schemeClr val="lt1"/>
+    </dgm:linClrLst>
+    <dgm:effectClrLst/>
+    <dgm:txLinClrLst/>
+    <dgm:txFillClrLst/>
+    <dgm:txEffectClrLst/>
+  </dgm:styleLbl>
+  <dgm:styleLbl name="fgSibTrans2D1">
+    <dgm:fillClrLst>
+      <a:schemeClr val="accent4"/>
+      <a:schemeClr val="accent5"/>
+    </dgm:fillClrLst>
+    <dgm:linClrLst meth="repeat">
+      <a:schemeClr val="lt1"/>
+    </dgm:linClrLst>
+    <dgm:effectClrLst/>
+    <dgm:txLinClrLst/>
+    <dgm:txFillClrLst meth="repeat">
+      <a:schemeClr val="lt1"/>
+    </dgm:txFillClrLst>
+    <dgm:txEffectClrLst/>
+  </dgm:styleLbl>
+  <dgm:styleLbl name="bgSibTrans2D1">
+    <dgm:fillClrLst>
+      <a:schemeClr val="accent4"/>
+      <a:schemeClr val="accent5"/>
+    </dgm:fillClrLst>
+    <dgm:linClrLst meth="repeat">
+      <a:schemeClr val="lt1"/>
+    </dgm:linClrLst>
+    <dgm:effectClrLst/>
+    <dgm:txLinClrLst/>
+    <dgm:txFillClrLst meth="repeat">
+      <a:schemeClr val="lt1"/>
+    </dgm:txFillClrLst>
+    <dgm:txEffectClrLst/>
+  </dgm:styleLbl>
+  <dgm:styleLbl name="sibTrans1D1">
+    <dgm:fillClrLst/>
+    <dgm:linClrLst>
+      <a:schemeClr val="accent4"/>
+      <a:schemeClr val="accent5"/>
+    </dgm:linClrLst>
+    <dgm:effectClrLst/>
+    <dgm:txLinClrLst/>
+    <dgm:txFillClrLst meth="repeat">
+      <a:schemeClr val="tx1"/>
+    </dgm:txFillClrLst>
+    <dgm:txEffectClrLst/>
+  </dgm:styleLbl>
+  <dgm:styleLbl name="callout">
+    <dgm:fillClrLst meth="repeat">
+      <a:schemeClr val="accent4"/>
+    </dgm:fillClrLst>
+    <dgm:linClrLst meth="repeat">
+      <a:schemeClr val="accent4">
+        <a:tint val="50000"/>
+      </a:schemeClr>
+    </dgm:linClrLst>
+    <dgm:effectClrLst/>
+    <dgm:txLinClrLst/>
+    <dgm:txFillClrLst meth="repeat">
+      <a:schemeClr val="tx1"/>
+    </dgm:txFillClrLst>
+    <dgm:txEffectClrLst/>
+  </dgm:styleLbl>
+  <dgm:styleLbl name="asst0">
+    <dgm:fillClrLst meth="repeat">
+      <a:schemeClr val="accent4"/>
+    </dgm:fillClrLst>
+    <dgm:linClrLst meth="repeat">
+      <a:schemeClr val="lt1">
+        <a:shade val="80000"/>
       </a:schemeClr>
     </dgm:linClrLst>
     <dgm:effectClrLst/>
@@ -276,15 +362,13 @@
     <dgm:txFillClrLst/>
     <dgm:txEffectClrLst/>
   </dgm:styleLbl>
-  <dgm:styleLbl name="fgSibTrans2D1">
+  <dgm:styleLbl name="asst1">
     <dgm:fillClrLst meth="repeat">
-      <a:schemeClr val="accent1">
-        <a:tint val="60000"/>
-      </a:schemeClr>
+      <a:schemeClr val="accent5"/>
     </dgm:fillClrLst>
     <dgm:linClrLst meth="repeat">
-      <a:schemeClr val="accent1">
-        <a:tint val="60000"/>
+      <a:schemeClr val="lt1">
+        <a:shade val="80000"/>
       </a:schemeClr>
     </dgm:linClrLst>
     <dgm:effectClrLst/>
@@ -292,25 +376,145 @@
     <dgm:txFillClrLst/>
     <dgm:txEffectClrLst/>
   </dgm:styleLbl>
-  <dgm:styleLbl name="bgSibTrans2D1">
-    <dgm:fillClrLst meth="repeat">
-      <a:schemeClr val="accent1">
-        <a:tint val="60000"/>
-      </a:schemeClr>
+  <dgm:styleLbl name="asst2">
+    <dgm:fillClrLst>
+      <a:schemeClr val="accent6"/>
     </dgm:fillClrLst>
     <dgm:linClrLst meth="repeat">
-      <a:schemeClr val="accent1">
-        <a:tint val="60000"/>
-      </a:schemeClr>
+      <a:schemeClr val="lt1"/>
     </dgm:linClrLst>
     <dgm:effectClrLst/>
     <dgm:txLinClrLst/>
     <dgm:txFillClrLst/>
     <dgm:txEffectClrLst/>
   </dgm:styleLbl>
-  <dgm:styleLbl name="sibTrans1D1">
+  <dgm:styleLbl name="asst3">
+    <dgm:fillClrLst>
+      <a:schemeClr val="accent1"/>
+    </dgm:fillClrLst>
+    <dgm:linClrLst meth="repeat">
+      <a:schemeClr val="lt1"/>
+    </dgm:linClrLst>
+    <dgm:effectClrLst/>
+    <dgm:txLinClrLst/>
+    <dgm:txFillClrLst/>
+    <dgm:txEffectClrLst/>
+  </dgm:styleLbl>
+  <dgm:styleLbl name="asst4">
+    <dgm:fillClrLst>
+      <a:schemeClr val="accent2"/>
+    </dgm:fillClrLst>
+    <dgm:linClrLst meth="repeat">
+      <a:schemeClr val="lt1"/>
+    </dgm:linClrLst>
+    <dgm:effectClrLst/>
+    <dgm:txLinClrLst/>
+    <dgm:txFillClrLst/>
+    <dgm:txEffectClrLst/>
+  </dgm:styleLbl>
+  <dgm:styleLbl name="parChTrans2D1">
     <dgm:fillClrLst meth="repeat">
-      <a:schemeClr val="accent1"/>
+      <a:schemeClr val="accent4"/>
+    </dgm:fillClrLst>
+    <dgm:linClrLst meth="repeat">
+      <a:schemeClr val="lt1"/>
+    </dgm:linClrLst>
+    <dgm:effectClrLst/>
+    <dgm:txLinClrLst/>
+    <dgm:txFillClrLst meth="repeat">
+      <a:schemeClr val="lt1"/>
+    </dgm:txFillClrLst>
+    <dgm:txEffectClrLst/>
+  </dgm:styleLbl>
+  <dgm:styleLbl name="parChTrans2D2">
+    <dgm:fillClrLst meth="repeat">
+      <a:schemeClr val="accent5"/>
+    </dgm:fillClrLst>
+    <dgm:linClrLst meth="repeat">
+      <a:schemeClr val="lt1"/>
+    </dgm:linClrLst>
+    <dgm:effectClrLst/>
+    <dgm:txLinClrLst/>
+    <dgm:txFillClrLst/>
+    <dgm:txEffectClrLst/>
+  </dgm:styleLbl>
+  <dgm:styleLbl name="parChTrans2D3">
+    <dgm:fillClrLst meth="repeat">
+      <a:schemeClr val="accent5"/>
+    </dgm:fillClrLst>
+    <dgm:linClrLst meth="repeat">
+      <a:schemeClr val="lt1"/>
+    </dgm:linClrLst>
+    <dgm:effectClrLst/>
+    <dgm:txLinClrLst/>
+    <dgm:txFillClrLst/>
+    <dgm:txEffectClrLst/>
+  </dgm:styleLbl>
+  <dgm:styleLbl name="parChTrans2D4">
+    <dgm:fillClrLst meth="repeat">
+      <a:schemeClr val="accent6"/>
+    </dgm:fillClrLst>
+    <dgm:linClrLst meth="repeat">
+      <a:schemeClr val="lt1"/>
+    </dgm:linClrLst>
+    <dgm:effectClrLst/>
+    <dgm:txLinClrLst/>
+    <dgm:txFillClrLst meth="repeat">
+      <a:schemeClr val="lt1"/>
+    </dgm:txFillClrLst>
+    <dgm:txEffectClrLst/>
+  </dgm:styleLbl>
+  <dgm:styleLbl name="parChTrans1D1">
+    <dgm:fillClrLst meth="repeat">
+      <a:schemeClr val="accent4"/>
+    </dgm:fillClrLst>
+    <dgm:linClrLst meth="repeat">
+      <a:schemeClr val="accent4"/>
+    </dgm:linClrLst>
+    <dgm:effectClrLst/>
+    <dgm:txLinClrLst/>
+    <dgm:txFillClrLst meth="repeat">
+      <a:schemeClr val="tx1"/>
+    </dgm:txFillClrLst>
+    <dgm:txEffectClrLst/>
+  </dgm:styleLbl>
+  <dgm:styleLbl name="parChTrans1D2">
+    <dgm:fillClrLst meth="repeat">
+      <a:schemeClr val="accent4">
+        <a:tint val="90000"/>
+      </a:schemeClr>
+    </dgm:fillClrLst>
+    <dgm:linClrLst meth="repeat">
+      <a:schemeClr val="accent5"/>
+    </dgm:linClrLst>
+    <dgm:effectClrLst/>
+    <dgm:txLinClrLst/>
+    <dgm:txFillClrLst meth="repeat">
+      <a:schemeClr val="tx1"/>
+    </dgm:txFillClrLst>
+    <dgm:txEffectClrLst/>
+  </dgm:styleLbl>
+  <dgm:styleLbl name="parChTrans1D3">
+    <dgm:fillClrLst meth="repeat">
+      <a:schemeClr val="accent4">
+        <a:tint val="70000"/>
+      </a:schemeClr>
+    </dgm:fillClrLst>
+    <dgm:linClrLst meth="repeat">
+      <a:schemeClr val="accent6"/>
+    </dgm:linClrLst>
+    <dgm:effectClrLst/>
+    <dgm:txLinClrLst/>
+    <dgm:txFillClrLst meth="repeat">
+      <a:schemeClr val="tx1"/>
+    </dgm:txFillClrLst>
+    <dgm:txEffectClrLst/>
+  </dgm:styleLbl>
+  <dgm:styleLbl name="parChTrans1D4">
+    <dgm:fillClrLst meth="repeat">
+      <a:schemeClr val="accent4">
+        <a:tint val="50000"/>
+      </a:schemeClr>
     </dgm:fillClrLst>
     <dgm:linClrLst meth="repeat">
       <a:schemeClr val="accent1"/>
@@ -322,213 +526,274 @@
     </dgm:txFillClrLst>
     <dgm:txEffectClrLst/>
   </dgm:styleLbl>
-  <dgm:styleLbl name="callout">
-    <dgm:fillClrLst meth="repeat">
-      <a:schemeClr val="accent1"/>
-    </dgm:fillClrLst>
-    <dgm:linClrLst meth="repeat">
-      <a:schemeClr val="accent1">
-        <a:tint val="50000"/>
-      </a:schemeClr>
-    </dgm:linClrLst>
-    <dgm:effectClrLst/>
-    <dgm:txLinClrLst/>
-    <dgm:txFillClrLst meth="repeat">
-      <a:schemeClr val="tx1"/>
-    </dgm:txFillClrLst>
-    <dgm:txEffectClrLst/>
-  </dgm:styleLbl>
-  <dgm:styleLbl name="asst0">
-    <dgm:fillClrLst meth="repeat">
-      <a:schemeClr val="accent1"/>
-    </dgm:fillClrLst>
-    <dgm:linClrLst meth="repeat">
-      <a:schemeClr val="lt1"/>
-    </dgm:linClrLst>
-    <dgm:effectClrLst/>
-    <dgm:txLinClrLst/>
-    <dgm:txFillClrLst/>
-    <dgm:txEffectClrLst/>
-  </dgm:styleLbl>
-  <dgm:styleLbl name="asst1">
-    <dgm:fillClrLst meth="repeat">
-      <a:schemeClr val="accent1"/>
-    </dgm:fillClrLst>
-    <dgm:linClrLst meth="repeat">
-      <a:schemeClr val="lt1"/>
-    </dgm:linClrLst>
-    <dgm:effectClrLst/>
-    <dgm:txLinClrLst/>
-    <dgm:txFillClrLst/>
-    <dgm:txEffectClrLst/>
-  </dgm:styleLbl>
-  <dgm:styleLbl name="asst2">
-    <dgm:fillClrLst meth="repeat">
-      <a:schemeClr val="accent1"/>
-    </dgm:fillClrLst>
-    <dgm:linClrLst meth="repeat">
-      <a:schemeClr val="lt1"/>
-    </dgm:linClrLst>
-    <dgm:effectClrLst/>
-    <dgm:txLinClrLst/>
-    <dgm:txFillClrLst/>
-    <dgm:txEffectClrLst/>
-  </dgm:styleLbl>
-  <dgm:styleLbl name="asst3">
-    <dgm:fillClrLst meth="repeat">
-      <a:schemeClr val="accent1"/>
-    </dgm:fillClrLst>
-    <dgm:linClrLst meth="repeat">
-      <a:schemeClr val="lt1"/>
-    </dgm:linClrLst>
-    <dgm:effectClrLst/>
-    <dgm:txLinClrLst/>
-    <dgm:txFillClrLst/>
-    <dgm:txEffectClrLst/>
-  </dgm:styleLbl>
-  <dgm:styleLbl name="asst4">
-    <dgm:fillClrLst meth="repeat">
-      <a:schemeClr val="accent1"/>
-    </dgm:fillClrLst>
-    <dgm:linClrLst meth="repeat">
-      <a:schemeClr val="lt1"/>
-    </dgm:linClrLst>
-    <dgm:effectClrLst/>
-    <dgm:txLinClrLst/>
-    <dgm:txFillClrLst/>
-    <dgm:txEffectClrLst/>
-  </dgm:styleLbl>
-  <dgm:styleLbl name="parChTrans2D1">
-    <dgm:fillClrLst meth="repeat">
-      <a:schemeClr val="accent1">
-        <a:tint val="60000"/>
-      </a:schemeClr>
-    </dgm:fillClrLst>
-    <dgm:linClrLst meth="repeat">
-      <a:schemeClr val="accent1">
-        <a:tint val="60000"/>
-      </a:schemeClr>
-    </dgm:linClrLst>
-    <dgm:effectClrLst/>
-    <dgm:txLinClrLst/>
-    <dgm:txFillClrLst meth="repeat">
-      <a:schemeClr val="lt1"/>
-    </dgm:txFillClrLst>
-    <dgm:txEffectClrLst/>
-  </dgm:styleLbl>
-  <dgm:styleLbl name="parChTrans2D2">
-    <dgm:fillClrLst meth="repeat">
-      <a:schemeClr val="accent1"/>
-    </dgm:fillClrLst>
-    <dgm:linClrLst meth="repeat">
-      <a:schemeClr val="accent1"/>
-    </dgm:linClrLst>
-    <dgm:effectClrLst/>
-    <dgm:txLinClrLst/>
-    <dgm:txFillClrLst meth="repeat">
-      <a:schemeClr val="lt1"/>
-    </dgm:txFillClrLst>
-    <dgm:txEffectClrLst/>
-  </dgm:styleLbl>
-  <dgm:styleLbl name="parChTrans2D3">
-    <dgm:fillClrLst meth="repeat">
-      <a:schemeClr val="accent1"/>
-    </dgm:fillClrLst>
-    <dgm:linClrLst meth="repeat">
-      <a:schemeClr val="accent1"/>
-    </dgm:linClrLst>
-    <dgm:effectClrLst/>
-    <dgm:txLinClrLst/>
-    <dgm:txFillClrLst meth="repeat">
-      <a:schemeClr val="lt1"/>
-    </dgm:txFillClrLst>
-    <dgm:txEffectClrLst/>
-  </dgm:styleLbl>
-  <dgm:styleLbl name="parChTrans2D4">
-    <dgm:fillClrLst meth="repeat">
-      <a:schemeClr val="accent1"/>
-    </dgm:fillClrLst>
-    <dgm:linClrLst meth="repeat">
-      <a:schemeClr val="accent1"/>
-    </dgm:linClrLst>
-    <dgm:effectClrLst/>
-    <dgm:txLinClrLst/>
-    <dgm:txFillClrLst meth="repeat">
-      <a:schemeClr val="lt1"/>
-    </dgm:txFillClrLst>
-    <dgm:txEffectClrLst/>
-  </dgm:styleLbl>
-  <dgm:styleLbl name="parChTrans1D1">
-    <dgm:fillClrLst meth="repeat">
-      <a:schemeClr val="accent1"/>
-    </dgm:fillClrLst>
-    <dgm:linClrLst meth="repeat">
-      <a:schemeClr val="accent1">
-        <a:shade val="60000"/>
-      </a:schemeClr>
-    </dgm:linClrLst>
-    <dgm:effectClrLst/>
-    <dgm:txLinClrLst/>
-    <dgm:txFillClrLst meth="repeat">
-      <a:schemeClr val="tx1"/>
-    </dgm:txFillClrLst>
-    <dgm:txEffectClrLst/>
-  </dgm:styleLbl>
-  <dgm:styleLbl name="parChTrans1D2">
-    <dgm:fillClrLst meth="repeat">
-      <a:schemeClr val="accent1"/>
-    </dgm:fillClrLst>
-    <dgm:linClrLst meth="repeat">
-      <a:schemeClr val="accent1">
-        <a:shade val="60000"/>
-      </a:schemeClr>
-    </dgm:linClrLst>
-    <dgm:effectClrLst/>
-    <dgm:txLinClrLst/>
-    <dgm:txFillClrLst meth="repeat">
-      <a:schemeClr val="tx1"/>
-    </dgm:txFillClrLst>
-    <dgm:txEffectClrLst/>
-  </dgm:styleLbl>
-  <dgm:styleLbl name="parChTrans1D3">
-    <dgm:fillClrLst meth="repeat">
-      <a:schemeClr val="accent1"/>
-    </dgm:fillClrLst>
-    <dgm:linClrLst meth="repeat">
-      <a:schemeClr val="accent1">
-        <a:shade val="80000"/>
-      </a:schemeClr>
-    </dgm:linClrLst>
-    <dgm:effectClrLst/>
-    <dgm:txLinClrLst/>
-    <dgm:txFillClrLst meth="repeat">
-      <a:schemeClr val="tx1"/>
-    </dgm:txFillClrLst>
-    <dgm:txEffectClrLst/>
-  </dgm:styleLbl>
-  <dgm:styleLbl name="parChTrans1D4">
-    <dgm:fillClrLst meth="repeat">
-      <a:schemeClr val="accent1"/>
-    </dgm:fillClrLst>
-    <dgm:linClrLst meth="repeat">
-      <a:schemeClr val="accent1">
-        <a:shade val="80000"/>
-      </a:schemeClr>
-    </dgm:linClrLst>
-    <dgm:effectClrLst/>
-    <dgm:txLinClrLst/>
-    <dgm:txFillClrLst meth="repeat">
-      <a:schemeClr val="tx1"/>
-    </dgm:txFillClrLst>
-    <dgm:txEffectClrLst/>
-  </dgm:styleLbl>
   <dgm:styleLbl name="fgAcc1">
     <dgm:fillClrLst meth="repeat">
       <a:schemeClr val="lt1">
         <a:alpha val="90000"/>
       </a:schemeClr>
     </dgm:fillClrLst>
+    <dgm:linClrLst>
+      <a:schemeClr val="accent4"/>
+      <a:schemeClr val="accent5"/>
+    </dgm:linClrLst>
+    <dgm:effectClrLst/>
+    <dgm:txLinClrLst/>
+    <dgm:txFillClrLst meth="repeat">
+      <a:schemeClr val="dk1"/>
+    </dgm:txFillClrLst>
+    <dgm:txEffectClrLst/>
+  </dgm:styleLbl>
+  <dgm:styleLbl name="conFgAcc1">
+    <dgm:fillClrLst meth="repeat">
+      <a:schemeClr val="lt1">
+        <a:alpha val="90000"/>
+      </a:schemeClr>
+    </dgm:fillClrLst>
+    <dgm:linClrLst>
+      <a:schemeClr val="accent4"/>
+      <a:schemeClr val="accent5"/>
+    </dgm:linClrLst>
+    <dgm:effectClrLst/>
+    <dgm:txLinClrLst/>
+    <dgm:txFillClrLst meth="repeat">
+      <a:schemeClr val="dk1"/>
+    </dgm:txFillClrLst>
+    <dgm:txEffectClrLst/>
+  </dgm:styleLbl>
+  <dgm:styleLbl name="alignAcc1">
+    <dgm:fillClrLst meth="repeat">
+      <a:schemeClr val="lt1">
+        <a:alpha val="90000"/>
+      </a:schemeClr>
+    </dgm:fillClrLst>
+    <dgm:linClrLst>
+      <a:schemeClr val="accent4"/>
+      <a:schemeClr val="accent5"/>
+    </dgm:linClrLst>
+    <dgm:effectClrLst/>
+    <dgm:txLinClrLst/>
+    <dgm:txFillClrLst meth="repeat">
+      <a:schemeClr val="dk1"/>
+    </dgm:txFillClrLst>
+    <dgm:txEffectClrLst/>
+  </dgm:styleLbl>
+  <dgm:styleLbl name="trAlignAcc1">
+    <dgm:fillClrLst meth="repeat">
+      <a:schemeClr val="lt1">
+        <a:alpha val="40000"/>
+      </a:schemeClr>
+    </dgm:fillClrLst>
     <dgm:linClrLst meth="repeat">
+      <a:schemeClr val="accent4"/>
+    </dgm:linClrLst>
+    <dgm:effectClrLst/>
+    <dgm:txLinClrLst/>
+    <dgm:txFillClrLst meth="repeat">
+      <a:schemeClr val="dk1"/>
+    </dgm:txFillClrLst>
+    <dgm:txEffectClrLst/>
+  </dgm:styleLbl>
+  <dgm:styleLbl name="bgAcc1">
+    <dgm:fillClrLst meth="repeat">
+      <a:schemeClr val="lt1">
+        <a:alpha val="90000"/>
+      </a:schemeClr>
+    </dgm:fillClrLst>
+    <dgm:linClrLst>
+      <a:schemeClr val="accent4"/>
+      <a:schemeClr val="accent5"/>
+    </dgm:linClrLst>
+    <dgm:effectClrLst/>
+    <dgm:txLinClrLst/>
+    <dgm:txFillClrLst meth="repeat">
+      <a:schemeClr val="dk1"/>
+    </dgm:txFillClrLst>
+    <dgm:txEffectClrLst/>
+  </dgm:styleLbl>
+  <dgm:styleLbl name="solidFgAcc1">
+    <dgm:fillClrLst meth="repeat">
+      <a:schemeClr val="lt1"/>
+    </dgm:fillClrLst>
+    <dgm:linClrLst>
+      <a:schemeClr val="accent4"/>
+      <a:schemeClr val="accent5"/>
+    </dgm:linClrLst>
+    <dgm:effectClrLst/>
+    <dgm:txLinClrLst/>
+    <dgm:txFillClrLst meth="repeat">
+      <a:schemeClr val="dk1"/>
+    </dgm:txFillClrLst>
+    <dgm:txEffectClrLst/>
+  </dgm:styleLbl>
+  <dgm:styleLbl name="solidAlignAcc1">
+    <dgm:fillClrLst meth="repeat">
+      <a:schemeClr val="lt1"/>
+    </dgm:fillClrLst>
+    <dgm:linClrLst>
+      <a:schemeClr val="accent4"/>
+      <a:schemeClr val="accent5"/>
+    </dgm:linClrLst>
+    <dgm:effectClrLst/>
+    <dgm:txLinClrLst/>
+    <dgm:txFillClrLst meth="repeat">
+      <a:schemeClr val="dk1"/>
+    </dgm:txFillClrLst>
+    <dgm:txEffectClrLst/>
+  </dgm:styleLbl>
+  <dgm:styleLbl name="solidBgAcc1">
+    <dgm:fillClrLst meth="repeat">
+      <a:schemeClr val="lt1"/>
+    </dgm:fillClrLst>
+    <dgm:linClrLst>
+      <a:schemeClr val="accent4"/>
+      <a:schemeClr val="accent5"/>
+    </dgm:linClrLst>
+    <dgm:effectClrLst/>
+    <dgm:txLinClrLst/>
+    <dgm:txFillClrLst meth="repeat">
+      <a:schemeClr val="dk1"/>
+    </dgm:txFillClrLst>
+    <dgm:txEffectClrLst/>
+  </dgm:styleLbl>
+  <dgm:styleLbl name="fgAccFollowNode1">
+    <dgm:fillClrLst>
+      <a:schemeClr val="accent4">
+        <a:tint val="40000"/>
+        <a:alpha val="90000"/>
+      </a:schemeClr>
+      <a:schemeClr val="accent5">
+        <a:tint val="40000"/>
+        <a:alpha val="90000"/>
+      </a:schemeClr>
+    </dgm:fillClrLst>
+    <dgm:linClrLst>
+      <a:schemeClr val="accent4">
+        <a:tint val="40000"/>
+        <a:alpha val="90000"/>
+      </a:schemeClr>
+      <a:schemeClr val="accent5">
+        <a:tint val="40000"/>
+        <a:alpha val="90000"/>
+      </a:schemeClr>
+    </dgm:linClrLst>
+    <dgm:effectClrLst/>
+    <dgm:txLinClrLst/>
+    <dgm:txFillClrLst meth="repeat">
+      <a:schemeClr val="dk1"/>
+    </dgm:txFillClrLst>
+    <dgm:txEffectClrLst/>
+  </dgm:styleLbl>
+  <dgm:styleLbl name="alignAccFollowNode1">
+    <dgm:fillClrLst>
+      <a:schemeClr val="accent4">
+        <a:tint val="40000"/>
+        <a:alpha val="90000"/>
+      </a:schemeClr>
+      <a:schemeClr val="accent5">
+        <a:tint val="40000"/>
+        <a:alpha val="90000"/>
+      </a:schemeClr>
+    </dgm:fillClrLst>
+    <dgm:linClrLst>
+      <a:schemeClr val="accent4">
+        <a:tint val="40000"/>
+        <a:alpha val="90000"/>
+      </a:schemeClr>
+      <a:schemeClr val="accent5">
+        <a:tint val="40000"/>
+        <a:alpha val="90000"/>
+      </a:schemeClr>
+    </dgm:linClrLst>
+    <dgm:effectClrLst/>
+    <dgm:txLinClrLst/>
+    <dgm:txFillClrLst meth="repeat">
+      <a:schemeClr val="dk1"/>
+    </dgm:txFillClrLst>
+    <dgm:txEffectClrLst/>
+  </dgm:styleLbl>
+  <dgm:styleLbl name="bgAccFollowNode1">
+    <dgm:fillClrLst>
+      <a:schemeClr val="accent4">
+        <a:tint val="40000"/>
+        <a:alpha val="90000"/>
+      </a:schemeClr>
+      <a:schemeClr val="accent5">
+        <a:tint val="40000"/>
+        <a:alpha val="90000"/>
+      </a:schemeClr>
+    </dgm:fillClrLst>
+    <dgm:linClrLst>
+      <a:schemeClr val="accent4">
+        <a:tint val="40000"/>
+        <a:alpha val="90000"/>
+      </a:schemeClr>
+      <a:schemeClr val="accent5">
+        <a:tint val="40000"/>
+        <a:alpha val="90000"/>
+      </a:schemeClr>
+    </dgm:linClrLst>
+    <dgm:effectClrLst/>
+    <dgm:txLinClrLst/>
+    <dgm:txFillClrLst meth="repeat">
+      <a:schemeClr val="dk1"/>
+    </dgm:txFillClrLst>
+    <dgm:txEffectClrLst/>
+  </dgm:styleLbl>
+  <dgm:styleLbl name="fgAcc0">
+    <dgm:fillClrLst meth="repeat">
+      <a:schemeClr val="lt1">
+        <a:alpha val="90000"/>
+      </a:schemeClr>
+    </dgm:fillClrLst>
+    <dgm:linClrLst>
+      <a:schemeClr val="accent3"/>
+    </dgm:linClrLst>
+    <dgm:effectClrLst/>
+    <dgm:txLinClrLst/>
+    <dgm:txFillClrLst meth="repeat">
+      <a:schemeClr val="dk1"/>
+    </dgm:txFillClrLst>
+    <dgm:txEffectClrLst/>
+  </dgm:styleLbl>
+  <dgm:styleLbl name="fgAcc2">
+    <dgm:fillClrLst meth="repeat">
+      <a:schemeClr val="lt1">
+        <a:alpha val="90000"/>
+      </a:schemeClr>
+    </dgm:fillClrLst>
+    <dgm:linClrLst>
+      <a:schemeClr val="accent5"/>
+    </dgm:linClrLst>
+    <dgm:effectClrLst/>
+    <dgm:txLinClrLst/>
+    <dgm:txFillClrLst meth="repeat">
+      <a:schemeClr val="dk1"/>
+    </dgm:txFillClrLst>
+    <dgm:txEffectClrLst/>
+  </dgm:styleLbl>
+  <dgm:styleLbl name="fgAcc3">
+    <dgm:fillClrLst meth="repeat">
+      <a:schemeClr val="lt1">
+        <a:alpha val="90000"/>
+      </a:schemeClr>
+    </dgm:fillClrLst>
+    <dgm:linClrLst>
+      <a:schemeClr val="accent6"/>
+    </dgm:linClrLst>
+    <dgm:effectClrLst/>
+    <dgm:txLinClrLst/>
+    <dgm:txFillClrLst meth="repeat">
+      <a:schemeClr val="dk1"/>
+    </dgm:txFillClrLst>
+    <dgm:txEffectClrLst/>
+  </dgm:styleLbl>
+  <dgm:styleLbl name="fgAcc4">
+    <dgm:fillClrLst meth="repeat">
+      <a:schemeClr val="lt1">
+        <a:alpha val="90000"/>
+      </a:schemeClr>
+    </dgm:fillClrLst>
+    <dgm:linClrLst>
       <a:schemeClr val="accent1"/>
     </dgm:linClrLst>
     <dgm:effectClrLst/>
@@ -538,14 +803,14 @@
     </dgm:txFillClrLst>
     <dgm:txEffectClrLst/>
   </dgm:styleLbl>
-  <dgm:styleLbl name="conFgAcc1">
+  <dgm:styleLbl name="bgShp">
     <dgm:fillClrLst meth="repeat">
-      <a:schemeClr val="lt1">
-        <a:alpha val="90000"/>
+      <a:schemeClr val="accent4">
+        <a:tint val="40000"/>
       </a:schemeClr>
     </dgm:fillClrLst>
     <dgm:linClrLst meth="repeat">
-      <a:schemeClr val="accent1"/>
+      <a:schemeClr val="dk1"/>
     </dgm:linClrLst>
     <dgm:effectClrLst/>
     <dgm:txLinClrLst/>
@@ -554,244 +819,14 @@
     </dgm:txFillClrLst>
     <dgm:txEffectClrLst/>
   </dgm:styleLbl>
-  <dgm:styleLbl name="alignAcc1">
+  <dgm:styleLbl name="dkBgShp">
     <dgm:fillClrLst meth="repeat">
-      <a:schemeClr val="lt1">
-        <a:alpha val="90000"/>
+      <a:schemeClr val="accent4">
+        <a:shade val="90000"/>
       </a:schemeClr>
     </dgm:fillClrLst>
     <dgm:linClrLst meth="repeat">
-      <a:schemeClr val="accent1"/>
-    </dgm:linClrLst>
-    <dgm:effectClrLst/>
-    <dgm:txLinClrLst/>
-    <dgm:txFillClrLst meth="repeat">
       <a:schemeClr val="dk1"/>
-    </dgm:txFillClrLst>
-    <dgm:txEffectClrLst/>
-  </dgm:styleLbl>
-  <dgm:styleLbl name="trAlignAcc1">
-    <dgm:fillClrLst meth="repeat">
-      <a:schemeClr val="lt1">
-        <a:alpha val="40000"/>
-      </a:schemeClr>
-    </dgm:fillClrLst>
-    <dgm:linClrLst meth="repeat">
-      <a:schemeClr val="accent1"/>
-    </dgm:linClrLst>
-    <dgm:effectClrLst/>
-    <dgm:txLinClrLst/>
-    <dgm:txFillClrLst meth="repeat">
-      <a:schemeClr val="dk1"/>
-    </dgm:txFillClrLst>
-    <dgm:txEffectClrLst/>
-  </dgm:styleLbl>
-  <dgm:styleLbl name="bgAcc1">
-    <dgm:fillClrLst meth="repeat">
-      <a:schemeClr val="lt1">
-        <a:alpha val="90000"/>
-      </a:schemeClr>
-    </dgm:fillClrLst>
-    <dgm:linClrLst meth="repeat">
-      <a:schemeClr val="accent1"/>
-    </dgm:linClrLst>
-    <dgm:effectClrLst/>
-    <dgm:txLinClrLst/>
-    <dgm:txFillClrLst meth="repeat">
-      <a:schemeClr val="dk1"/>
-    </dgm:txFillClrLst>
-    <dgm:txEffectClrLst/>
-  </dgm:styleLbl>
-  <dgm:styleLbl name="solidFgAcc1">
-    <dgm:fillClrLst meth="repeat">
-      <a:schemeClr val="lt1"/>
-    </dgm:fillClrLst>
-    <dgm:linClrLst meth="repeat">
-      <a:schemeClr val="accent1"/>
-    </dgm:linClrLst>
-    <dgm:effectClrLst/>
-    <dgm:txLinClrLst/>
-    <dgm:txFillClrLst meth="repeat">
-      <a:schemeClr val="dk1"/>
-    </dgm:txFillClrLst>
-    <dgm:txEffectClrLst/>
-  </dgm:styleLbl>
-  <dgm:styleLbl name="solidAlignAcc1">
-    <dgm:fillClrLst meth="repeat">
-      <a:schemeClr val="lt1"/>
-    </dgm:fillClrLst>
-    <dgm:linClrLst meth="repeat">
-      <a:schemeClr val="accent1"/>
-    </dgm:linClrLst>
-    <dgm:effectClrLst/>
-    <dgm:txLinClrLst/>
-    <dgm:txFillClrLst meth="repeat">
-      <a:schemeClr val="dk1"/>
-    </dgm:txFillClrLst>
-    <dgm:txEffectClrLst/>
-  </dgm:styleLbl>
-  <dgm:styleLbl name="solidBgAcc1">
-    <dgm:fillClrLst meth="repeat">
-      <a:schemeClr val="lt1"/>
-    </dgm:fillClrLst>
-    <dgm:linClrLst meth="repeat">
-      <a:schemeClr val="accent1"/>
-    </dgm:linClrLst>
-    <dgm:effectClrLst/>
-    <dgm:txLinClrLst/>
-    <dgm:txFillClrLst meth="repeat">
-      <a:schemeClr val="dk1"/>
-    </dgm:txFillClrLst>
-    <dgm:txEffectClrLst/>
-  </dgm:styleLbl>
-  <dgm:styleLbl name="fgAccFollowNode1">
-    <dgm:fillClrLst meth="repeat">
-      <a:schemeClr val="accent1">
-        <a:alpha val="90000"/>
-        <a:tint val="40000"/>
-      </a:schemeClr>
-    </dgm:fillClrLst>
-    <dgm:linClrLst meth="repeat">
-      <a:schemeClr val="accent1">
-        <a:alpha val="90000"/>
-        <a:tint val="40000"/>
-      </a:schemeClr>
-    </dgm:linClrLst>
-    <dgm:effectClrLst/>
-    <dgm:txLinClrLst/>
-    <dgm:txFillClrLst meth="repeat">
-      <a:schemeClr val="dk1"/>
-    </dgm:txFillClrLst>
-    <dgm:txEffectClrLst/>
-  </dgm:styleLbl>
-  <dgm:styleLbl name="alignAccFollowNode1">
-    <dgm:fillClrLst meth="repeat">
-      <a:schemeClr val="accent1">
-        <a:alpha val="90000"/>
-        <a:tint val="40000"/>
-      </a:schemeClr>
-    </dgm:fillClrLst>
-    <dgm:linClrLst meth="repeat">
-      <a:schemeClr val="accent1">
-        <a:alpha val="90000"/>
-        <a:tint val="40000"/>
-      </a:schemeClr>
-    </dgm:linClrLst>
-    <dgm:effectClrLst/>
-    <dgm:txLinClrLst/>
-    <dgm:txFillClrLst meth="repeat">
-      <a:schemeClr val="dk1"/>
-    </dgm:txFillClrLst>
-    <dgm:txEffectClrLst/>
-  </dgm:styleLbl>
-  <dgm:styleLbl name="bgAccFollowNode1">
-    <dgm:fillClrLst meth="repeat">
-      <a:schemeClr val="accent1">
-        <a:alpha val="90000"/>
-        <a:tint val="40000"/>
-      </a:schemeClr>
-    </dgm:fillClrLst>
-    <dgm:linClrLst meth="repeat">
-      <a:schemeClr val="accent1">
-        <a:alpha val="90000"/>
-        <a:tint val="40000"/>
-      </a:schemeClr>
-    </dgm:linClrLst>
-    <dgm:effectClrLst/>
-    <dgm:txLinClrLst/>
-    <dgm:txFillClrLst meth="repeat">
-      <a:schemeClr val="dk1"/>
-    </dgm:txFillClrLst>
-    <dgm:txEffectClrLst/>
-  </dgm:styleLbl>
-  <dgm:styleLbl name="fgAcc0">
-    <dgm:fillClrLst meth="repeat">
-      <a:schemeClr val="lt1">
-        <a:alpha val="90000"/>
-      </a:schemeClr>
-    </dgm:fillClrLst>
-    <dgm:linClrLst meth="repeat">
-      <a:schemeClr val="accent1"/>
-    </dgm:linClrLst>
-    <dgm:effectClrLst/>
-    <dgm:txLinClrLst/>
-    <dgm:txFillClrLst meth="repeat">
-      <a:schemeClr val="dk1"/>
-    </dgm:txFillClrLst>
-    <dgm:txEffectClrLst/>
-  </dgm:styleLbl>
-  <dgm:styleLbl name="fgAcc2">
-    <dgm:fillClrLst meth="repeat">
-      <a:schemeClr val="lt1">
-        <a:alpha val="90000"/>
-      </a:schemeClr>
-    </dgm:fillClrLst>
-    <dgm:linClrLst meth="repeat">
-      <a:schemeClr val="accent1"/>
-    </dgm:linClrLst>
-    <dgm:effectClrLst/>
-    <dgm:txLinClrLst/>
-    <dgm:txFillClrLst meth="repeat">
-      <a:schemeClr val="dk1"/>
-    </dgm:txFillClrLst>
-    <dgm:txEffectClrLst/>
-  </dgm:styleLbl>
-  <dgm:styleLbl name="fgAcc3">
-    <dgm:fillClrLst meth="repeat">
-      <a:schemeClr val="lt1">
-        <a:alpha val="90000"/>
-      </a:schemeClr>
-    </dgm:fillClrLst>
-    <dgm:linClrLst meth="repeat">
-      <a:schemeClr val="accent1"/>
-    </dgm:linClrLst>
-    <dgm:effectClrLst/>
-    <dgm:txLinClrLst/>
-    <dgm:txFillClrLst meth="repeat">
-      <a:schemeClr val="dk1"/>
-    </dgm:txFillClrLst>
-    <dgm:txEffectClrLst/>
-  </dgm:styleLbl>
-  <dgm:styleLbl name="fgAcc4">
-    <dgm:fillClrLst meth="repeat">
-      <a:schemeClr val="lt1">
-        <a:alpha val="90000"/>
-      </a:schemeClr>
-    </dgm:fillClrLst>
-    <dgm:linClrLst meth="repeat">
-      <a:schemeClr val="accent1"/>
-    </dgm:linClrLst>
-    <dgm:effectClrLst/>
-    <dgm:txLinClrLst/>
-    <dgm:txFillClrLst meth="repeat">
-      <a:schemeClr val="dk1"/>
-    </dgm:txFillClrLst>
-    <dgm:txEffectClrLst/>
-  </dgm:styleLbl>
-  <dgm:styleLbl name="bgShp">
-    <dgm:fillClrLst meth="repeat">
-      <a:schemeClr val="accent1">
-        <a:tint val="40000"/>
-      </a:schemeClr>
-    </dgm:fillClrLst>
-    <dgm:linClrLst meth="repeat">
-      <a:schemeClr val="accent1"/>
-    </dgm:linClrLst>
-    <dgm:effectClrLst/>
-    <dgm:txLinClrLst/>
-    <dgm:txFillClrLst meth="repeat">
-      <a:schemeClr val="dk1"/>
-    </dgm:txFillClrLst>
-    <dgm:txEffectClrLst/>
-  </dgm:styleLbl>
-  <dgm:styleLbl name="dkBgShp">
-    <dgm:fillClrLst meth="repeat">
-      <a:schemeClr val="accent1">
-        <a:shade val="80000"/>
-      </a:schemeClr>
-    </dgm:fillClrLst>
-    <dgm:linClrLst meth="repeat">
-      <a:schemeClr val="accent1"/>
     </dgm:linClrLst>
     <dgm:effectClrLst/>
     <dgm:txLinClrLst/>
@@ -802,13 +837,13 @@
   </dgm:styleLbl>
   <dgm:styleLbl name="trBgShp">
     <dgm:fillClrLst meth="repeat">
-      <a:schemeClr val="accent1">
+      <a:schemeClr val="accent4">
         <a:tint val="50000"/>
         <a:alpha val="40000"/>
       </a:schemeClr>
     </dgm:fillClrLst>
     <dgm:linClrLst meth="repeat">
-      <a:schemeClr val="accent1"/>
+      <a:schemeClr val="accent4"/>
     </dgm:linClrLst>
     <dgm:effectClrLst/>
     <dgm:txLinClrLst/>
@@ -819,8 +854,8 @@
   </dgm:styleLbl>
   <dgm:styleLbl name="fgShp">
     <dgm:fillClrLst meth="repeat">
-      <a:schemeClr val="accent1">
-        <a:tint val="60000"/>
+      <a:schemeClr val="accent4">
+        <a:tint val="40000"/>
       </a:schemeClr>
     </dgm:fillClrLst>
     <dgm:linClrLst meth="repeat">
@@ -858,7 +893,7 @@
 <dgm:dataModel xmlns:dgm="http://schemas.openxmlformats.org/drawingml/2006/diagram" xmlns:a="http://schemas.openxmlformats.org/drawingml/2006/main">
   <dgm:ptLst>
     <dgm:pt modelId="{71A059E4-E5A2-430A-8FF1-F9398AAC2421}" type="doc">
-      <dgm:prSet loTypeId="urn:microsoft.com/office/officeart/2005/8/layout/radial2" loCatId="relationship" qsTypeId="urn:microsoft.com/office/officeart/2005/8/quickstyle/simple1" qsCatId="simple" csTypeId="urn:microsoft.com/office/officeart/2005/8/colors/accent1_2" csCatId="accent1" phldr="1"/>
+      <dgm:prSet loTypeId="urn:microsoft.com/office/officeart/2005/8/layout/radial2" loCatId="relationship" qsTypeId="urn:microsoft.com/office/officeart/2005/8/quickstyle/simple1" qsCatId="simple" csTypeId="urn:microsoft.com/office/officeart/2005/8/colors/colorful4" csCatId="colorful" phldr="1"/>
       <dgm:spPr/>
       <dgm:t>
         <a:bodyPr/>
@@ -1059,7 +1094,7 @@
       </dgm:t>
     </dgm:pt>
     <dgm:pt modelId="{840C0A0A-6AE1-4E29-80AD-6F392FD03EDC}">
-      <dgm:prSet/>
+      <dgm:prSet custT="1"/>
       <dgm:spPr/>
       <dgm:t>
         <a:bodyPr/>
@@ -1067,16 +1102,20 @@
         <a:p>
           <a:pPr rtl="0"/>
           <a:r>
-            <a:rPr lang="en-US" dirty="0" err="1" smtClean="0">
+            <a:rPr lang="en-US" sz="1000" b="0" dirty="0" err="1" smtClean="0">
               <a:solidFill>
-                <a:schemeClr val="tx2"/>
+                <a:schemeClr val="accent5">
+                  <a:lumMod val="75000"/>
+                </a:schemeClr>
               </a:solidFill>
             </a:rPr>
             <a:t>Autofac</a:t>
           </a:r>
-          <a:endParaRPr lang="en-GB" dirty="0">
+          <a:endParaRPr lang="en-GB" sz="1000" b="0" dirty="0">
             <a:solidFill>
-              <a:schemeClr val="tx2"/>
+              <a:schemeClr val="accent5">
+                <a:lumMod val="75000"/>
+              </a:schemeClr>
             </a:solidFill>
           </a:endParaRPr>
         </a:p>
@@ -1105,7 +1144,7 @@
       </dgm:t>
     </dgm:pt>
     <dgm:pt modelId="{9710EA1C-7EEC-48B2-85EE-77153699644B}">
-      <dgm:prSet/>
+      <dgm:prSet custT="1"/>
       <dgm:spPr/>
       <dgm:t>
         <a:bodyPr/>
@@ -1113,16 +1152,20 @@
         <a:p>
           <a:pPr rtl="0"/>
           <a:r>
-            <a:rPr lang="en-US" dirty="0" smtClean="0">
+            <a:rPr lang="en-US" sz="1000" b="0" smtClean="0">
               <a:solidFill>
-                <a:schemeClr val="tx2"/>
+                <a:schemeClr val="accent5">
+                  <a:lumMod val="75000"/>
+                </a:schemeClr>
               </a:solidFill>
             </a:rPr>
             <a:t>Castle Windsor</a:t>
           </a:r>
-          <a:endParaRPr lang="en-GB" dirty="0">
+          <a:endParaRPr lang="en-GB" sz="1000" b="0" dirty="0">
             <a:solidFill>
-              <a:schemeClr val="tx2"/>
+              <a:schemeClr val="accent5">
+                <a:lumMod val="75000"/>
+              </a:schemeClr>
             </a:solidFill>
           </a:endParaRPr>
         </a:p>
@@ -1151,7 +1194,7 @@
       </dgm:t>
     </dgm:pt>
     <dgm:pt modelId="{02D5456C-D591-4104-8404-435F26A9BB17}">
-      <dgm:prSet/>
+      <dgm:prSet custT="1"/>
       <dgm:spPr/>
       <dgm:t>
         <a:bodyPr/>
@@ -1159,16 +1202,20 @@
         <a:p>
           <a:pPr rtl="0"/>
           <a:r>
-            <a:rPr lang="en-US" dirty="0" err="1" smtClean="0">
+            <a:rPr lang="en-US" sz="1000" b="0" smtClean="0">
               <a:solidFill>
-                <a:schemeClr val="tx2"/>
+                <a:schemeClr val="accent5">
+                  <a:lumMod val="75000"/>
+                </a:schemeClr>
               </a:solidFill>
             </a:rPr>
             <a:t>StructureMap</a:t>
           </a:r>
-          <a:endParaRPr lang="en-GB" dirty="0">
+          <a:endParaRPr lang="en-GB" sz="1000" b="0" dirty="0">
             <a:solidFill>
-              <a:schemeClr val="tx2"/>
+              <a:schemeClr val="accent5">
+                <a:lumMod val="75000"/>
+              </a:schemeClr>
             </a:solidFill>
           </a:endParaRPr>
         </a:p>
@@ -1197,7 +1244,7 @@
       </dgm:t>
     </dgm:pt>
     <dgm:pt modelId="{38321BEE-3435-44CB-A9D9-2959C64ECFF5}">
-      <dgm:prSet/>
+      <dgm:prSet custT="1"/>
       <dgm:spPr/>
       <dgm:t>
         <a:bodyPr/>
@@ -1205,16 +1252,20 @@
         <a:p>
           <a:pPr rtl="0"/>
           <a:r>
-            <a:rPr lang="en-US" dirty="0" smtClean="0">
+            <a:rPr lang="en-US" sz="1000" b="0" smtClean="0">
               <a:solidFill>
-                <a:schemeClr val="tx2"/>
+                <a:schemeClr val="accent5">
+                  <a:lumMod val="75000"/>
+                </a:schemeClr>
               </a:solidFill>
             </a:rPr>
             <a:t>Unity</a:t>
           </a:r>
-          <a:endParaRPr lang="en-GB" dirty="0">
+          <a:endParaRPr lang="en-GB" sz="1000" b="0" dirty="0">
             <a:solidFill>
-              <a:schemeClr val="tx2"/>
+              <a:schemeClr val="accent5">
+                <a:lumMod val="75000"/>
+              </a:schemeClr>
             </a:solidFill>
           </a:endParaRPr>
         </a:p>
@@ -1243,7 +1294,7 @@
       </dgm:t>
     </dgm:pt>
     <dgm:pt modelId="{FF281A5A-7EAD-4ECD-977A-B15E0AD51E26}">
-      <dgm:prSet/>
+      <dgm:prSet custT="1"/>
       <dgm:spPr/>
       <dgm:t>
         <a:bodyPr/>
@@ -1251,16 +1302,20 @@
         <a:p>
           <a:pPr rtl="0"/>
           <a:r>
-            <a:rPr lang="en-US" dirty="0" smtClean="0">
+            <a:rPr lang="en-US" sz="1000" b="0" dirty="0" smtClean="0">
               <a:solidFill>
-                <a:schemeClr val="tx2"/>
+                <a:schemeClr val="accent4">
+                  <a:lumMod val="75000"/>
+                </a:schemeClr>
               </a:solidFill>
             </a:rPr>
             <a:t>Log4Net</a:t>
           </a:r>
-          <a:endParaRPr lang="en-GB" dirty="0">
+          <a:endParaRPr lang="en-GB" sz="1000" b="0" dirty="0">
             <a:solidFill>
-              <a:schemeClr val="tx2"/>
+              <a:schemeClr val="accent4">
+                <a:lumMod val="75000"/>
+              </a:schemeClr>
             </a:solidFill>
           </a:endParaRPr>
         </a:p>
@@ -1289,7 +1344,7 @@
       </dgm:t>
     </dgm:pt>
     <dgm:pt modelId="{028A59AA-CBFB-4127-BC76-D50D05DBFC5F}">
-      <dgm:prSet/>
+      <dgm:prSet custT="1"/>
       <dgm:spPr/>
       <dgm:t>
         <a:bodyPr/>
@@ -1297,16 +1352,20 @@
         <a:p>
           <a:pPr rtl="0"/>
           <a:r>
-            <a:rPr lang="en-US" dirty="0" smtClean="0">
+            <a:rPr lang="en-US" sz="1000" b="0" dirty="0" smtClean="0">
               <a:solidFill>
-                <a:schemeClr val="tx2"/>
+                <a:schemeClr val="tx2">
+                  <a:lumMod val="75000"/>
+                </a:schemeClr>
               </a:solidFill>
             </a:rPr>
             <a:t>Commands</a:t>
           </a:r>
-          <a:endParaRPr lang="en-GB" dirty="0">
+          <a:endParaRPr lang="en-GB" sz="1000" b="0" dirty="0">
             <a:solidFill>
-              <a:schemeClr val="tx2"/>
+              <a:schemeClr val="tx2">
+                <a:lumMod val="75000"/>
+              </a:schemeClr>
             </a:solidFill>
           </a:endParaRPr>
         </a:p>
@@ -1335,7 +1394,7 @@
       </dgm:t>
     </dgm:pt>
     <dgm:pt modelId="{7CA392C3-D9E4-42CB-BFA7-B6C53B65D5C8}">
-      <dgm:prSet/>
+      <dgm:prSet custT="1"/>
       <dgm:spPr/>
       <dgm:t>
         <a:bodyPr/>
@@ -1343,16 +1402,20 @@
         <a:p>
           <a:pPr rtl="0"/>
           <a:r>
-            <a:rPr lang="en-US" dirty="0" smtClean="0">
+            <a:rPr lang="en-US" sz="1000" b="0" dirty="0" smtClean="0">
               <a:solidFill>
-                <a:schemeClr val="tx2"/>
+                <a:schemeClr val="tx2">
+                  <a:lumMod val="75000"/>
+                </a:schemeClr>
               </a:solidFill>
             </a:rPr>
             <a:t>Domain</a:t>
           </a:r>
-          <a:endParaRPr lang="en-GB" dirty="0">
+          <a:endParaRPr lang="en-GB" sz="1000" b="0" dirty="0">
             <a:solidFill>
-              <a:schemeClr val="tx2"/>
+              <a:schemeClr val="tx2">
+                <a:lumMod val="75000"/>
+              </a:schemeClr>
             </a:solidFill>
           </a:endParaRPr>
         </a:p>
@@ -1370,6 +1433,106 @@
       </dgm:t>
     </dgm:pt>
     <dgm:pt modelId="{D7969AA2-C3BE-4C7F-A4F8-CE1389A4E1C2}" type="sibTrans" cxnId="{7F93696C-17BB-4851-91C5-7D28AB1CE32C}">
+      <dgm:prSet/>
+      <dgm:spPr/>
+      <dgm:t>
+        <a:bodyPr/>
+        <a:lstStyle/>
+        <a:p>
+          <a:endParaRPr lang="en-GB"/>
+        </a:p>
+      </dgm:t>
+    </dgm:pt>
+    <dgm:pt modelId="{3447004D-6F57-4FC5-96B5-C8D0B7E8FEF8}">
+      <dgm:prSet custT="1"/>
+      <dgm:spPr/>
+      <dgm:t>
+        <a:bodyPr/>
+        <a:lstStyle/>
+        <a:p>
+          <a:pPr rtl="0"/>
+          <a:r>
+            <a:rPr lang="en-US" sz="1000" b="0" dirty="0" smtClean="0">
+              <a:solidFill>
+                <a:schemeClr val="tx2">
+                  <a:lumMod val="75000"/>
+                </a:schemeClr>
+              </a:solidFill>
+            </a:rPr>
+            <a:t>Repository</a:t>
+          </a:r>
+          <a:endParaRPr lang="en-GB" sz="1000" b="0" dirty="0">
+            <a:solidFill>
+              <a:schemeClr val="tx2">
+                <a:lumMod val="75000"/>
+              </a:schemeClr>
+            </a:solidFill>
+          </a:endParaRPr>
+        </a:p>
+      </dgm:t>
+    </dgm:pt>
+    <dgm:pt modelId="{17DA82D2-E5BC-4776-8E2F-397C179C95DB}" type="parTrans" cxnId="{5015904B-1809-499F-A16C-607AC91C6270}">
+      <dgm:prSet/>
+      <dgm:spPr/>
+      <dgm:t>
+        <a:bodyPr/>
+        <a:lstStyle/>
+        <a:p>
+          <a:endParaRPr lang="en-GB"/>
+        </a:p>
+      </dgm:t>
+    </dgm:pt>
+    <dgm:pt modelId="{EEAB5E8D-5949-403C-A91C-1063EDF0B679}" type="sibTrans" cxnId="{5015904B-1809-499F-A16C-607AC91C6270}">
+      <dgm:prSet/>
+      <dgm:spPr/>
+      <dgm:t>
+        <a:bodyPr/>
+        <a:lstStyle/>
+        <a:p>
+          <a:endParaRPr lang="en-GB"/>
+        </a:p>
+      </dgm:t>
+    </dgm:pt>
+    <dgm:pt modelId="{4A1E6FB0-FB70-413E-90A3-696A490812D1}">
+      <dgm:prSet custT="1"/>
+      <dgm:spPr/>
+      <dgm:t>
+        <a:bodyPr/>
+        <a:lstStyle/>
+        <a:p>
+          <a:pPr rtl="0"/>
+          <a:r>
+            <a:rPr lang="en-US" sz="1000" b="0" i="1" dirty="0" smtClean="0">
+              <a:solidFill>
+                <a:schemeClr val="tx2">
+                  <a:lumMod val="75000"/>
+                </a:schemeClr>
+              </a:solidFill>
+            </a:rPr>
+            <a:t>File System</a:t>
+          </a:r>
+          <a:endParaRPr lang="en-GB" sz="1000" b="0" i="1" dirty="0">
+            <a:solidFill>
+              <a:schemeClr val="tx2">
+                <a:lumMod val="75000"/>
+              </a:schemeClr>
+            </a:solidFill>
+          </a:endParaRPr>
+        </a:p>
+      </dgm:t>
+    </dgm:pt>
+    <dgm:pt modelId="{E9ED75C0-18E4-47E6-AA44-8A8A10A5CE71}" type="parTrans" cxnId="{9222F1FF-B709-4D6B-A2C3-9F54D2F0D450}">
+      <dgm:prSet/>
+      <dgm:spPr/>
+      <dgm:t>
+        <a:bodyPr/>
+        <a:lstStyle/>
+        <a:p>
+          <a:endParaRPr lang="en-GB"/>
+        </a:p>
+      </dgm:t>
+    </dgm:pt>
+    <dgm:pt modelId="{67F4203E-E21D-4018-AD26-4F02CE02BC43}" type="sibTrans" cxnId="{9222F1FF-B709-4D6B-A2C3-9F54D2F0D450}">
       <dgm:prSet/>
       <dgm:spPr/>
       <dgm:t>
@@ -1390,40 +1553,79 @@
         </dgm:presLayoutVars>
       </dgm:prSet>
       <dgm:spPr/>
+      <dgm:t>
+        <a:bodyPr/>
+        <a:lstStyle/>
+        <a:p>
+          <a:endParaRPr lang="en-GB"/>
+        </a:p>
+      </dgm:t>
     </dgm:pt>
     <dgm:pt modelId="{13265ED7-7B77-4F07-918F-876EDE483898}" type="pres">
       <dgm:prSet presAssocID="{71A059E4-E5A2-430A-8FF1-F9398AAC2421}" presName="cycle" presStyleCnt="0"/>
       <dgm:spPr/>
+      <dgm:t>
+        <a:bodyPr/>
+        <a:lstStyle/>
+        <a:p>
+          <a:endParaRPr lang="en-GB"/>
+        </a:p>
+      </dgm:t>
     </dgm:pt>
     <dgm:pt modelId="{78D1608B-1DF8-40F7-9027-360B5A0F0188}" type="pres">
       <dgm:prSet presAssocID="{71A059E4-E5A2-430A-8FF1-F9398AAC2421}" presName="centerShape" presStyleCnt="0"/>
       <dgm:spPr/>
+      <dgm:t>
+        <a:bodyPr/>
+        <a:lstStyle/>
+        <a:p>
+          <a:endParaRPr lang="en-GB"/>
+        </a:p>
+      </dgm:t>
     </dgm:pt>
     <dgm:pt modelId="{D2A9ED7B-3DCF-4AD2-8ABF-C239829B62D1}" type="pres">
       <dgm:prSet presAssocID="{71A059E4-E5A2-430A-8FF1-F9398AAC2421}" presName="connSite" presStyleLbl="node1" presStyleIdx="0" presStyleCnt="6"/>
       <dgm:spPr/>
+      <dgm:t>
+        <a:bodyPr/>
+        <a:lstStyle/>
+        <a:p>
+          <a:endParaRPr lang="en-GB"/>
+        </a:p>
+      </dgm:t>
     </dgm:pt>
     <dgm:pt modelId="{DB350F9D-D1D1-4864-997F-8B457C87486B}" type="pres">
       <dgm:prSet presAssocID="{71A059E4-E5A2-430A-8FF1-F9398AAC2421}" presName="visible" presStyleLbl="node1" presStyleIdx="0" presStyleCnt="6" custScaleX="114246" custScaleY="118331"/>
-      <dgm:spPr>
-        <a:solidFill>
-          <a:schemeClr val="bg1"/>
-        </a:solidFill>
-        <a:ln>
-          <a:solidFill>
-            <a:schemeClr val="tx2"/>
-          </a:solidFill>
-        </a:ln>
-        <a:effectLst/>
-      </dgm:spPr>
+      <dgm:spPr/>
+      <dgm:t>
+        <a:bodyPr/>
+        <a:lstStyle/>
+        <a:p>
+          <a:endParaRPr lang="en-GB"/>
+        </a:p>
+      </dgm:t>
     </dgm:pt>
     <dgm:pt modelId="{4710D380-44A3-4F58-8EE1-CB03CBC8FA0F}" type="pres">
       <dgm:prSet presAssocID="{F212D2F4-EB78-497F-8B1B-38A997446927}" presName="Name25" presStyleLbl="parChTrans1D1" presStyleIdx="0" presStyleCnt="5"/>
       <dgm:spPr/>
+      <dgm:t>
+        <a:bodyPr/>
+        <a:lstStyle/>
+        <a:p>
+          <a:endParaRPr lang="en-GB"/>
+        </a:p>
+      </dgm:t>
     </dgm:pt>
     <dgm:pt modelId="{8B7F1B7E-938A-4683-8691-A46216D06FA0}" type="pres">
       <dgm:prSet presAssocID="{20F002F5-B476-4484-BDBC-E1704CEDE259}" presName="node" presStyleCnt="0"/>
       <dgm:spPr/>
+      <dgm:t>
+        <a:bodyPr/>
+        <a:lstStyle/>
+        <a:p>
+          <a:endParaRPr lang="en-GB"/>
+        </a:p>
+      </dgm:t>
     </dgm:pt>
     <dgm:pt modelId="{BCAD45A3-2659-426E-A577-6BB66BA2921F}" type="pres">
       <dgm:prSet presAssocID="{20F002F5-B476-4484-BDBC-E1704CEDE259}" presName="parentNode" presStyleLbl="node1" presStyleIdx="1" presStyleCnt="6" custLinFactX="-100000" custLinFactNeighborX="-163889" custLinFactNeighborY="65139">
@@ -1448,14 +1650,35 @@
         </dgm:presLayoutVars>
       </dgm:prSet>
       <dgm:spPr/>
+      <dgm:t>
+        <a:bodyPr/>
+        <a:lstStyle/>
+        <a:p>
+          <a:endParaRPr lang="en-GB"/>
+        </a:p>
+      </dgm:t>
     </dgm:pt>
     <dgm:pt modelId="{9D418000-BCAE-40F6-976D-FDCB6DE53090}" type="pres">
       <dgm:prSet presAssocID="{D6C3B4B7-5959-4E1E-A717-8518DF6169A1}" presName="Name25" presStyleLbl="parChTrans1D1" presStyleIdx="1" presStyleCnt="5"/>
       <dgm:spPr/>
+      <dgm:t>
+        <a:bodyPr/>
+        <a:lstStyle/>
+        <a:p>
+          <a:endParaRPr lang="en-GB"/>
+        </a:p>
+      </dgm:t>
     </dgm:pt>
     <dgm:pt modelId="{7ABDE443-5800-4A71-AF2B-832EFD66C229}" type="pres">
       <dgm:prSet presAssocID="{A574C59F-2016-4DAE-BAB8-5E077D6CFB59}" presName="node" presStyleCnt="0"/>
       <dgm:spPr/>
+      <dgm:t>
+        <a:bodyPr/>
+        <a:lstStyle/>
+        <a:p>
+          <a:endParaRPr lang="en-GB"/>
+        </a:p>
+      </dgm:t>
     </dgm:pt>
     <dgm:pt modelId="{C4D7BBCE-5C74-4CFB-82F2-5D70E19751DC}" type="pres">
       <dgm:prSet presAssocID="{A574C59F-2016-4DAE-BAB8-5E077D6CFB59}" presName="parentNode" presStyleLbl="node1" presStyleIdx="2" presStyleCnt="6" custLinFactX="-20719" custLinFactNeighborX="-100000" custLinFactNeighborY="-46815">
@@ -1491,10 +1714,24 @@
     <dgm:pt modelId="{76BA4605-796D-4AD3-BDA5-823550D2F212}" type="pres">
       <dgm:prSet presAssocID="{F7B48B73-B0C4-4FA2-9AE8-15C89D3EF691}" presName="Name25" presStyleLbl="parChTrans1D1" presStyleIdx="2" presStyleCnt="5"/>
       <dgm:spPr/>
+      <dgm:t>
+        <a:bodyPr/>
+        <a:lstStyle/>
+        <a:p>
+          <a:endParaRPr lang="en-GB"/>
+        </a:p>
+      </dgm:t>
     </dgm:pt>
     <dgm:pt modelId="{42CE0272-B0FD-4F42-B83D-B7150918567A}" type="pres">
       <dgm:prSet presAssocID="{610C3ACF-7A84-4679-8074-58B66812FD4D}" presName="node" presStyleCnt="0"/>
       <dgm:spPr/>
+      <dgm:t>
+        <a:bodyPr/>
+        <a:lstStyle/>
+        <a:p>
+          <a:endParaRPr lang="en-GB"/>
+        </a:p>
+      </dgm:t>
     </dgm:pt>
     <dgm:pt modelId="{0FEF36F9-A68C-4708-8960-E6CEE6145183}" type="pres">
       <dgm:prSet presAssocID="{610C3ACF-7A84-4679-8074-58B66812FD4D}" presName="parentNode" presStyleLbl="node1" presStyleIdx="3" presStyleCnt="6">
@@ -1519,14 +1756,35 @@
         </dgm:presLayoutVars>
       </dgm:prSet>
       <dgm:spPr/>
+      <dgm:t>
+        <a:bodyPr/>
+        <a:lstStyle/>
+        <a:p>
+          <a:endParaRPr lang="en-GB"/>
+        </a:p>
+      </dgm:t>
     </dgm:pt>
     <dgm:pt modelId="{2E0175CA-335B-4D47-82F8-6013A6414A49}" type="pres">
       <dgm:prSet presAssocID="{47D198E4-914C-4E44-AF10-28A7BFAF45B5}" presName="Name25" presStyleLbl="parChTrans1D1" presStyleIdx="3" presStyleCnt="5"/>
       <dgm:spPr/>
+      <dgm:t>
+        <a:bodyPr/>
+        <a:lstStyle/>
+        <a:p>
+          <a:endParaRPr lang="en-GB"/>
+        </a:p>
+      </dgm:t>
     </dgm:pt>
     <dgm:pt modelId="{D29506FF-8378-4EA0-B1D8-7D67CBB9CA80}" type="pres">
       <dgm:prSet presAssocID="{EF6D1E2B-B2B3-4F87-96E5-793543E9F43F}" presName="node" presStyleCnt="0"/>
       <dgm:spPr/>
+      <dgm:t>
+        <a:bodyPr/>
+        <a:lstStyle/>
+        <a:p>
+          <a:endParaRPr lang="en-GB"/>
+        </a:p>
+      </dgm:t>
     </dgm:pt>
     <dgm:pt modelId="{2B38D02F-7CB3-4561-9A8D-9A0B5265137D}" type="pres">
       <dgm:prSet presAssocID="{EF6D1E2B-B2B3-4F87-96E5-793543E9F43F}" presName="parentNode" presStyleLbl="node1" presStyleIdx="4" presStyleCnt="6" custLinFactNeighborX="-98921" custLinFactNeighborY="48726">
@@ -1562,10 +1820,24 @@
     <dgm:pt modelId="{3B1DF92B-4E6E-427D-9DB5-879DE876B8D7}" type="pres">
       <dgm:prSet presAssocID="{158AA3B2-C4EF-4C57-8A17-99172590D02C}" presName="Name25" presStyleLbl="parChTrans1D1" presStyleIdx="4" presStyleCnt="5"/>
       <dgm:spPr/>
+      <dgm:t>
+        <a:bodyPr/>
+        <a:lstStyle/>
+        <a:p>
+          <a:endParaRPr lang="en-GB"/>
+        </a:p>
+      </dgm:t>
     </dgm:pt>
     <dgm:pt modelId="{C02D39A7-792C-4CED-B1BD-03AB0E24F870}" type="pres">
       <dgm:prSet presAssocID="{F8233197-C2FC-4783-9446-285F150FB514}" presName="node" presStyleCnt="0"/>
       <dgm:spPr/>
+      <dgm:t>
+        <a:bodyPr/>
+        <a:lstStyle/>
+        <a:p>
+          <a:endParaRPr lang="en-GB"/>
+        </a:p>
+      </dgm:t>
     </dgm:pt>
     <dgm:pt modelId="{D9F67394-CD8D-4FE3-ACC0-7377068B02C2}" type="pres">
       <dgm:prSet presAssocID="{F8233197-C2FC-4783-9446-285F150FB514}" presName="parentNode" presStyleLbl="node1" presStyleIdx="5" presStyleCnt="6" custLinFactX="-100000" custLinFactNeighborX="-163889" custLinFactNeighborY="-52330">
@@ -1590,6 +1862,13 @@
         </dgm:presLayoutVars>
       </dgm:prSet>
       <dgm:spPr/>
+      <dgm:t>
+        <a:bodyPr/>
+        <a:lstStyle/>
+        <a:p>
+          <a:endParaRPr lang="en-GB"/>
+        </a:p>
+      </dgm:t>
     </dgm:pt>
   </dgm:ptLst>
   <dgm:cxnLst>
@@ -1600,13 +1879,16 @@
     <dgm:cxn modelId="{510B8A85-67F9-4FF6-A67B-12E7331B24DC}" type="presOf" srcId="{028A59AA-CBFB-4127-BC76-D50D05DBFC5F}" destId="{1EE562A9-3F5F-4C57-86C6-834EE5BAB1A6}" srcOrd="0" destOrd="0" presId="urn:microsoft.com/office/officeart/2005/8/layout/radial2"/>
     <dgm:cxn modelId="{FF659C51-A24E-43F9-B1DC-C00B1EB4E864}" srcId="{EF6D1E2B-B2B3-4F87-96E5-793543E9F43F}" destId="{9710EA1C-7EEC-48B2-85EE-77153699644B}" srcOrd="1" destOrd="0" parTransId="{EDC0110E-5047-48D9-BE58-F954247A1EDD}" sibTransId="{88A46AF2-E5B7-44BB-85B3-6CE6A32E6047}"/>
     <dgm:cxn modelId="{DC21B904-B97D-459B-AFA0-6D4830C00CEA}" type="presOf" srcId="{610C3ACF-7A84-4679-8074-58B66812FD4D}" destId="{0FEF36F9-A68C-4708-8960-E6CEE6145183}" srcOrd="0" destOrd="0" presId="urn:microsoft.com/office/officeart/2005/8/layout/radial2"/>
+    <dgm:cxn modelId="{41A5AB71-10EC-4AE3-A67A-40B4BBB2A95D}" type="presOf" srcId="{3447004D-6F57-4FC5-96B5-C8D0B7E8FEF8}" destId="{1EE562A9-3F5F-4C57-86C6-834EE5BAB1A6}" srcOrd="0" destOrd="2" presId="urn:microsoft.com/office/officeart/2005/8/layout/radial2"/>
     <dgm:cxn modelId="{259001A6-4DB8-41AF-80F4-6DA95AA9E905}" srcId="{71A059E4-E5A2-430A-8FF1-F9398AAC2421}" destId="{EF6D1E2B-B2B3-4F87-96E5-793543E9F43F}" srcOrd="3" destOrd="0" parTransId="{47D198E4-914C-4E44-AF10-28A7BFAF45B5}" sibTransId="{B53D6E05-C5A1-4AC1-9156-F7CDF28FD62A}"/>
+    <dgm:cxn modelId="{9222F1FF-B709-4D6B-A2C3-9F54D2F0D450}" srcId="{3447004D-6F57-4FC5-96B5-C8D0B7E8FEF8}" destId="{4A1E6FB0-FB70-413E-90A3-696A490812D1}" srcOrd="0" destOrd="0" parTransId="{E9ED75C0-18E4-47E6-AA44-8A8A10A5CE71}" sibTransId="{67F4203E-E21D-4018-AD26-4F02CE02BC43}"/>
     <dgm:cxn modelId="{7F8BC0F1-19DB-4A19-9A4F-C7B0BA0A5427}" type="presOf" srcId="{EF6D1E2B-B2B3-4F87-96E5-793543E9F43F}" destId="{2B38D02F-7CB3-4561-9A8D-9A0B5265137D}" srcOrd="0" destOrd="0" presId="urn:microsoft.com/office/officeart/2005/8/layout/radial2"/>
     <dgm:cxn modelId="{DEF84037-344C-4D09-8AB7-774ABF1F5FB4}" type="presOf" srcId="{840C0A0A-6AE1-4E29-80AD-6F392FD03EDC}" destId="{74305B94-8BC0-473D-8661-BDDEE7828265}" srcOrd="0" destOrd="0" presId="urn:microsoft.com/office/officeart/2005/8/layout/radial2"/>
     <dgm:cxn modelId="{A9058FB2-3894-42FD-BF49-83C1336C4889}" type="presOf" srcId="{F212D2F4-EB78-497F-8B1B-38A997446927}" destId="{4710D380-44A3-4F58-8EE1-CB03CBC8FA0F}" srcOrd="0" destOrd="0" presId="urn:microsoft.com/office/officeart/2005/8/layout/radial2"/>
     <dgm:cxn modelId="{FB895669-8954-4DA1-BD1D-D12749C32E61}" type="presOf" srcId="{A574C59F-2016-4DAE-BAB8-5E077D6CFB59}" destId="{C4D7BBCE-5C74-4CFB-82F2-5D70E19751DC}" srcOrd="0" destOrd="0" presId="urn:microsoft.com/office/officeart/2005/8/layout/radial2"/>
     <dgm:cxn modelId="{C71EEA8A-647C-4CD8-8CC7-B98BB98647F4}" srcId="{71A059E4-E5A2-430A-8FF1-F9398AAC2421}" destId="{20F002F5-B476-4484-BDBC-E1704CEDE259}" srcOrd="0" destOrd="0" parTransId="{F212D2F4-EB78-497F-8B1B-38A997446927}" sibTransId="{E2913B88-62F9-4A78-846D-0BE7730062B4}"/>
     <dgm:cxn modelId="{816203E0-CADD-4449-B24E-2CFB9E5D85F6}" type="presOf" srcId="{D6C3B4B7-5959-4E1E-A717-8518DF6169A1}" destId="{9D418000-BCAE-40F6-976D-FDCB6DE53090}" srcOrd="0" destOrd="0" presId="urn:microsoft.com/office/officeart/2005/8/layout/radial2"/>
+    <dgm:cxn modelId="{5015904B-1809-499F-A16C-607AC91C6270}" srcId="{610C3ACF-7A84-4679-8074-58B66812FD4D}" destId="{3447004D-6F57-4FC5-96B5-C8D0B7E8FEF8}" srcOrd="2" destOrd="0" parTransId="{17DA82D2-E5BC-4776-8E2F-397C179C95DB}" sibTransId="{EEAB5E8D-5949-403C-A91C-1063EDF0B679}"/>
     <dgm:cxn modelId="{6B96FFF0-4175-43CC-92BF-CCEE23EA3BA8}" type="presOf" srcId="{38321BEE-3435-44CB-A9D9-2959C64ECFF5}" destId="{74305B94-8BC0-473D-8661-BDDEE7828265}" srcOrd="0" destOrd="3" presId="urn:microsoft.com/office/officeart/2005/8/layout/radial2"/>
     <dgm:cxn modelId="{0CA09654-ED5C-4373-8811-B0814340A958}" type="presOf" srcId="{7CA392C3-D9E4-42CB-BFA7-B6C53B65D5C8}" destId="{1EE562A9-3F5F-4C57-86C6-834EE5BAB1A6}" srcOrd="0" destOrd="1" presId="urn:microsoft.com/office/officeart/2005/8/layout/radial2"/>
     <dgm:cxn modelId="{194377A2-C782-4B01-8F04-450B3B6A5EFE}" srcId="{71A059E4-E5A2-430A-8FF1-F9398AAC2421}" destId="{A574C59F-2016-4DAE-BAB8-5E077D6CFB59}" srcOrd="1" destOrd="0" parTransId="{D6C3B4B7-5959-4E1E-A717-8518DF6169A1}" sibTransId="{9035C3CA-AA9A-43BD-AF58-F729C64B63A6}"/>
@@ -1614,6 +1896,7 @@
     <dgm:cxn modelId="{1D0C445A-AE10-4154-A100-0110D24B51FD}" type="presOf" srcId="{02D5456C-D591-4104-8404-435F26A9BB17}" destId="{74305B94-8BC0-473D-8661-BDDEE7828265}" srcOrd="0" destOrd="2" presId="urn:microsoft.com/office/officeart/2005/8/layout/radial2"/>
     <dgm:cxn modelId="{547F9757-2EFC-45DF-86AC-2D49EEFF1D35}" srcId="{EF6D1E2B-B2B3-4F87-96E5-793543E9F43F}" destId="{38321BEE-3435-44CB-A9D9-2959C64ECFF5}" srcOrd="3" destOrd="0" parTransId="{53D6883F-BC2F-4CD4-B086-3BF378B79BFB}" sibTransId="{622F2370-C2AB-4D02-AD0E-3256665F50E1}"/>
     <dgm:cxn modelId="{EA72CE8A-C5C8-41BA-87EF-04FEB826049A}" type="presOf" srcId="{47D198E4-914C-4E44-AF10-28A7BFAF45B5}" destId="{2E0175CA-335B-4D47-82F8-6013A6414A49}" srcOrd="0" destOrd="0" presId="urn:microsoft.com/office/officeart/2005/8/layout/radial2"/>
+    <dgm:cxn modelId="{C5601473-894C-4ADB-B6CE-DF4A01FF02F3}" type="presOf" srcId="{4A1E6FB0-FB70-413E-90A3-696A490812D1}" destId="{1EE562A9-3F5F-4C57-86C6-834EE5BAB1A6}" srcOrd="0" destOrd="3" presId="urn:microsoft.com/office/officeart/2005/8/layout/radial2"/>
     <dgm:cxn modelId="{86A3B69C-8AD4-4A7F-A1DA-D7F47E1BB8A2}" srcId="{71A059E4-E5A2-430A-8FF1-F9398AAC2421}" destId="{610C3ACF-7A84-4679-8074-58B66812FD4D}" srcOrd="2" destOrd="0" parTransId="{F7B48B73-B0C4-4FA2-9AE8-15C89D3EF691}" sibTransId="{C052F008-3677-4699-979C-2DC157FD7BF6}"/>
     <dgm:cxn modelId="{D20E6C10-C2F5-401C-A743-C318FCF8EFF4}" srcId="{EF6D1E2B-B2B3-4F87-96E5-793543E9F43F}" destId="{02D5456C-D591-4104-8404-435F26A9BB17}" srcOrd="2" destOrd="0" parTransId="{A63945C3-F0D5-43CF-B667-C39522337D24}" sibTransId="{99DFB1AC-2BC9-4D63-B1DC-514215A97C2B}"/>
     <dgm:cxn modelId="{AE1F4FF9-ABBE-46C3-90ED-874DE46F98DF}" srcId="{EF6D1E2B-B2B3-4F87-96E5-793543E9F43F}" destId="{840C0A0A-6AE1-4E29-80AD-6F392FD03EDC}" srcOrd="0" destOrd="0" parTransId="{7985C48D-DA9C-4EF1-A976-122884D4E844}" sibTransId="{ED2ABAA5-E174-4632-BEAE-F7886E9E35F4}"/>
@@ -1696,8 +1979,7 @@
         <a:noFill/>
         <a:ln w="25400" cap="flat" cmpd="sng" algn="ctr">
           <a:solidFill>
-            <a:schemeClr val="accent1">
-              <a:shade val="60000"/>
+            <a:schemeClr val="accent4">
               <a:hueOff val="0"/>
               <a:satOff val="0"/>
               <a:lumOff val="0"/>
@@ -1751,8 +2033,7 @@
         <a:noFill/>
         <a:ln w="25400" cap="flat" cmpd="sng" algn="ctr">
           <a:solidFill>
-            <a:schemeClr val="accent1">
-              <a:shade val="60000"/>
+            <a:schemeClr val="accent4">
               <a:hueOff val="0"/>
               <a:satOff val="0"/>
               <a:lumOff val="0"/>
@@ -1806,8 +2087,7 @@
         <a:noFill/>
         <a:ln w="25400" cap="flat" cmpd="sng" algn="ctr">
           <a:solidFill>
-            <a:schemeClr val="accent1">
-              <a:shade val="60000"/>
+            <a:schemeClr val="accent4">
               <a:hueOff val="0"/>
               <a:satOff val="0"/>
               <a:lumOff val="0"/>
@@ -1861,8 +2141,7 @@
         <a:noFill/>
         <a:ln w="25400" cap="flat" cmpd="sng" algn="ctr">
           <a:solidFill>
-            <a:schemeClr val="accent1">
-              <a:shade val="60000"/>
+            <a:schemeClr val="accent4">
               <a:hueOff val="0"/>
               <a:satOff val="0"/>
               <a:lumOff val="0"/>
@@ -1916,8 +2195,7 @@
         <a:noFill/>
         <a:ln w="25400" cap="flat" cmpd="sng" algn="ctr">
           <a:solidFill>
-            <a:schemeClr val="accent1">
-              <a:shade val="60000"/>
+            <a:schemeClr val="accent4">
               <a:hueOff val="0"/>
               <a:satOff val="0"/>
               <a:lumOff val="0"/>
@@ -1955,11 +2233,21 @@
           <a:avLst/>
         </a:prstGeom>
         <a:solidFill>
-          <a:schemeClr val="bg1"/>
+          <a:schemeClr val="accent4">
+            <a:hueOff val="0"/>
+            <a:satOff val="0"/>
+            <a:lumOff val="0"/>
+            <a:alphaOff val="0"/>
+          </a:schemeClr>
         </a:solidFill>
         <a:ln w="25400" cap="flat" cmpd="sng" algn="ctr">
           <a:solidFill>
-            <a:schemeClr val="tx2"/>
+            <a:schemeClr val="lt1">
+              <a:hueOff val="0"/>
+              <a:satOff val="0"/>
+              <a:lumOff val="0"/>
+              <a:alphaOff val="0"/>
+            </a:schemeClr>
           </a:solidFill>
           <a:prstDash val="solid"/>
         </a:ln>
@@ -1994,10 +2282,10 @@
           <a:avLst/>
         </a:prstGeom>
         <a:solidFill>
-          <a:schemeClr val="accent1">
-            <a:hueOff val="0"/>
-            <a:satOff val="0"/>
-            <a:lumOff val="0"/>
+          <a:schemeClr val="accent4">
+            <a:hueOff val="-892954"/>
+            <a:satOff val="5380"/>
+            <a:lumOff val="431"/>
             <a:alphaOff val="0"/>
           </a:schemeClr>
         </a:solidFill>
@@ -2071,10 +2359,10 @@
           <a:avLst/>
         </a:prstGeom>
         <a:solidFill>
-          <a:schemeClr val="accent1">
-            <a:hueOff val="0"/>
-            <a:satOff val="0"/>
-            <a:lumOff val="0"/>
+          <a:schemeClr val="accent4">
+            <a:hueOff val="-1785908"/>
+            <a:satOff val="10760"/>
+            <a:lumOff val="862"/>
             <a:alphaOff val="0"/>
           </a:schemeClr>
         </a:solidFill>
@@ -2171,7 +2459,7 @@
         </a:bodyPr>
         <a:lstStyle/>
         <a:p>
-          <a:pPr marL="114300" lvl="1" indent="-114300" algn="l" defTabSz="622300" rtl="0">
+          <a:pPr marL="57150" lvl="1" indent="-57150" algn="l" defTabSz="444500" rtl="0">
             <a:lnSpc>
               <a:spcPct val="90000"/>
             </a:lnSpc>
@@ -2184,16 +2472,20 @@
             <a:buChar char="••"/>
           </a:pPr>
           <a:r>
-            <a:rPr lang="en-US" sz="1400" kern="1200" dirty="0" smtClean="0">
+            <a:rPr lang="en-US" sz="1000" b="0" kern="1200" dirty="0" smtClean="0">
               <a:solidFill>
-                <a:schemeClr val="tx2"/>
+                <a:schemeClr val="accent4">
+                  <a:lumMod val="75000"/>
+                </a:schemeClr>
               </a:solidFill>
             </a:rPr>
             <a:t>Log4Net</a:t>
           </a:r>
-          <a:endParaRPr lang="en-GB" sz="1400" kern="1200" dirty="0">
+          <a:endParaRPr lang="en-GB" sz="1000" b="0" kern="1200" dirty="0">
             <a:solidFill>
-              <a:schemeClr val="tx2"/>
+              <a:schemeClr val="accent4">
+                <a:lumMod val="75000"/>
+              </a:schemeClr>
             </a:solidFill>
           </a:endParaRPr>
         </a:p>
@@ -2217,10 +2509,10 @@
           <a:avLst/>
         </a:prstGeom>
         <a:solidFill>
-          <a:schemeClr val="accent1">
-            <a:hueOff val="0"/>
-            <a:satOff val="0"/>
-            <a:lumOff val="0"/>
+          <a:schemeClr val="accent4">
+            <a:hueOff val="-2678862"/>
+            <a:satOff val="16139"/>
+            <a:lumOff val="1294"/>
             <a:alphaOff val="0"/>
           </a:schemeClr>
         </a:solidFill>
@@ -2317,7 +2609,7 @@
         </a:bodyPr>
         <a:lstStyle/>
         <a:p>
-          <a:pPr marL="114300" lvl="1" indent="-114300" algn="l" defTabSz="622300" rtl="0">
+          <a:pPr marL="57150" lvl="1" indent="-57150" algn="l" defTabSz="444500" rtl="0">
             <a:lnSpc>
               <a:spcPct val="90000"/>
             </a:lnSpc>
@@ -2330,21 +2622,25 @@
             <a:buChar char="••"/>
           </a:pPr>
           <a:r>
-            <a:rPr lang="en-US" sz="1400" kern="1200" dirty="0" smtClean="0">
+            <a:rPr lang="en-US" sz="1000" b="0" kern="1200" dirty="0" smtClean="0">
               <a:solidFill>
-                <a:schemeClr val="tx2"/>
+                <a:schemeClr val="tx2">
+                  <a:lumMod val="75000"/>
+                </a:schemeClr>
               </a:solidFill>
             </a:rPr>
             <a:t>Commands</a:t>
           </a:r>
-          <a:endParaRPr lang="en-GB" sz="1400" kern="1200" dirty="0">
+          <a:endParaRPr lang="en-GB" sz="1000" b="0" kern="1200" dirty="0">
             <a:solidFill>
-              <a:schemeClr val="tx2"/>
+              <a:schemeClr val="tx2">
+                <a:lumMod val="75000"/>
+              </a:schemeClr>
             </a:solidFill>
           </a:endParaRPr>
         </a:p>
         <a:p>
-          <a:pPr marL="114300" lvl="1" indent="-114300" algn="l" defTabSz="622300" rtl="0">
+          <a:pPr marL="57150" lvl="1" indent="-57150" algn="l" defTabSz="444500" rtl="0">
             <a:lnSpc>
               <a:spcPct val="90000"/>
             </a:lnSpc>
@@ -2357,16 +2653,82 @@
             <a:buChar char="••"/>
           </a:pPr>
           <a:r>
-            <a:rPr lang="en-US" sz="1400" kern="1200" dirty="0" smtClean="0">
+            <a:rPr lang="en-US" sz="1000" b="0" kern="1200" dirty="0" smtClean="0">
               <a:solidFill>
-                <a:schemeClr val="tx2"/>
+                <a:schemeClr val="tx2">
+                  <a:lumMod val="75000"/>
+                </a:schemeClr>
               </a:solidFill>
             </a:rPr>
             <a:t>Domain</a:t>
           </a:r>
-          <a:endParaRPr lang="en-GB" sz="1400" kern="1200" dirty="0">
+          <a:endParaRPr lang="en-GB" sz="1000" b="0" kern="1200" dirty="0">
             <a:solidFill>
-              <a:schemeClr val="tx2"/>
+              <a:schemeClr val="tx2">
+                <a:lumMod val="75000"/>
+              </a:schemeClr>
+            </a:solidFill>
+          </a:endParaRPr>
+        </a:p>
+        <a:p>
+          <a:pPr marL="57150" lvl="1" indent="-57150" algn="l" defTabSz="444500" rtl="0">
+            <a:lnSpc>
+              <a:spcPct val="90000"/>
+            </a:lnSpc>
+            <a:spcBef>
+              <a:spcPct val="0"/>
+            </a:spcBef>
+            <a:spcAft>
+              <a:spcPct val="15000"/>
+            </a:spcAft>
+            <a:buChar char="••"/>
+          </a:pPr>
+          <a:r>
+            <a:rPr lang="en-US" sz="1000" b="0" kern="1200" dirty="0" smtClean="0">
+              <a:solidFill>
+                <a:schemeClr val="tx2">
+                  <a:lumMod val="75000"/>
+                </a:schemeClr>
+              </a:solidFill>
+            </a:rPr>
+            <a:t>Repository</a:t>
+          </a:r>
+          <a:endParaRPr lang="en-GB" sz="1000" b="0" kern="1200" dirty="0">
+            <a:solidFill>
+              <a:schemeClr val="tx2">
+                <a:lumMod val="75000"/>
+              </a:schemeClr>
+            </a:solidFill>
+          </a:endParaRPr>
+        </a:p>
+        <a:p>
+          <a:pPr marL="114300" lvl="2" indent="-57150" algn="l" defTabSz="444500" rtl="0">
+            <a:lnSpc>
+              <a:spcPct val="90000"/>
+            </a:lnSpc>
+            <a:spcBef>
+              <a:spcPct val="0"/>
+            </a:spcBef>
+            <a:spcAft>
+              <a:spcPct val="15000"/>
+            </a:spcAft>
+            <a:buChar char="••"/>
+          </a:pPr>
+          <a:r>
+            <a:rPr lang="en-US" sz="1000" b="0" i="1" kern="1200" dirty="0" smtClean="0">
+              <a:solidFill>
+                <a:schemeClr val="tx2">
+                  <a:lumMod val="75000"/>
+                </a:schemeClr>
+              </a:solidFill>
+            </a:rPr>
+            <a:t>File System</a:t>
+          </a:r>
+          <a:endParaRPr lang="en-GB" sz="1000" b="0" i="1" kern="1200" dirty="0">
+            <a:solidFill>
+              <a:schemeClr val="tx2">
+                <a:lumMod val="75000"/>
+              </a:schemeClr>
             </a:solidFill>
           </a:endParaRPr>
         </a:p>
@@ -2390,10 +2752,10 @@
           <a:avLst/>
         </a:prstGeom>
         <a:solidFill>
-          <a:schemeClr val="accent1">
-            <a:hueOff val="0"/>
-            <a:satOff val="0"/>
-            <a:lumOff val="0"/>
+          <a:schemeClr val="accent4">
+            <a:hueOff val="-3571816"/>
+            <a:satOff val="21519"/>
+            <a:lumOff val="1725"/>
             <a:alphaOff val="0"/>
           </a:schemeClr>
         </a:solidFill>
@@ -2490,7 +2852,7 @@
         </a:bodyPr>
         <a:lstStyle/>
         <a:p>
-          <a:pPr marL="114300" lvl="1" indent="-114300" algn="l" defTabSz="622300" rtl="0">
+          <a:pPr marL="57150" lvl="1" indent="-57150" algn="l" defTabSz="444500" rtl="0">
             <a:lnSpc>
               <a:spcPct val="90000"/>
             </a:lnSpc>
@@ -2503,21 +2865,25 @@
             <a:buChar char="••"/>
           </a:pPr>
           <a:r>
-            <a:rPr lang="en-US" sz="1400" kern="1200" dirty="0" err="1" smtClean="0">
+            <a:rPr lang="en-US" sz="1000" b="0" kern="1200" dirty="0" err="1" smtClean="0">
               <a:solidFill>
-                <a:schemeClr val="tx2"/>
+                <a:schemeClr val="accent5">
+                  <a:lumMod val="75000"/>
+                </a:schemeClr>
               </a:solidFill>
             </a:rPr>
             <a:t>Autofac</a:t>
           </a:r>
-          <a:endParaRPr lang="en-GB" sz="1400" kern="1200" dirty="0">
+          <a:endParaRPr lang="en-GB" sz="1000" b="0" kern="1200" dirty="0">
             <a:solidFill>
-              <a:schemeClr val="tx2"/>
+              <a:schemeClr val="accent5">
+                <a:lumMod val="75000"/>
+              </a:schemeClr>
             </a:solidFill>
           </a:endParaRPr>
         </a:p>
         <a:p>
-          <a:pPr marL="114300" lvl="1" indent="-114300" algn="l" defTabSz="622300" rtl="0">
+          <a:pPr marL="57150" lvl="1" indent="-57150" algn="l" defTabSz="444500" rtl="0">
             <a:lnSpc>
               <a:spcPct val="90000"/>
             </a:lnSpc>
@@ -2530,21 +2896,25 @@
             <a:buChar char="••"/>
           </a:pPr>
           <a:r>
-            <a:rPr lang="en-US" sz="1400" kern="1200" dirty="0" smtClean="0">
+            <a:rPr lang="en-US" sz="1000" b="0" kern="1200" smtClean="0">
               <a:solidFill>
-                <a:schemeClr val="tx2"/>
+                <a:schemeClr val="accent5">
+                  <a:lumMod val="75000"/>
+                </a:schemeClr>
               </a:solidFill>
             </a:rPr>
             <a:t>Castle Windsor</a:t>
           </a:r>
-          <a:endParaRPr lang="en-GB" sz="1400" kern="1200" dirty="0">
+          <a:endParaRPr lang="en-GB" sz="1000" b="0" kern="1200" dirty="0">
             <a:solidFill>
-              <a:schemeClr val="tx2"/>
+              <a:schemeClr val="accent5">
+                <a:lumMod val="75000"/>
+              </a:schemeClr>
             </a:solidFill>
           </a:endParaRPr>
         </a:p>
         <a:p>
-          <a:pPr marL="114300" lvl="1" indent="-114300" algn="l" defTabSz="622300" rtl="0">
+          <a:pPr marL="57150" lvl="1" indent="-57150" algn="l" defTabSz="444500" rtl="0">
             <a:lnSpc>
               <a:spcPct val="90000"/>
             </a:lnSpc>
@@ -2557,21 +2927,25 @@
             <a:buChar char="••"/>
           </a:pPr>
           <a:r>
-            <a:rPr lang="en-US" sz="1400" kern="1200" dirty="0" err="1" smtClean="0">
+            <a:rPr lang="en-US" sz="1000" b="0" kern="1200" smtClean="0">
               <a:solidFill>
-                <a:schemeClr val="tx2"/>
+                <a:schemeClr val="accent5">
+                  <a:lumMod val="75000"/>
+                </a:schemeClr>
               </a:solidFill>
             </a:rPr>
             <a:t>StructureMap</a:t>
           </a:r>
-          <a:endParaRPr lang="en-GB" sz="1400" kern="1200" dirty="0">
+          <a:endParaRPr lang="en-GB" sz="1000" b="0" kern="1200" dirty="0">
             <a:solidFill>
-              <a:schemeClr val="tx2"/>
+              <a:schemeClr val="accent5">
+                <a:lumMod val="75000"/>
+              </a:schemeClr>
             </a:solidFill>
           </a:endParaRPr>
         </a:p>
         <a:p>
-          <a:pPr marL="114300" lvl="1" indent="-114300" algn="l" defTabSz="622300" rtl="0">
+          <a:pPr marL="57150" lvl="1" indent="-57150" algn="l" defTabSz="444500" rtl="0">
             <a:lnSpc>
               <a:spcPct val="90000"/>
             </a:lnSpc>
@@ -2584,16 +2958,20 @@
             <a:buChar char="••"/>
           </a:pPr>
           <a:r>
-            <a:rPr lang="en-US" sz="1400" kern="1200" dirty="0" smtClean="0">
+            <a:rPr lang="en-US" sz="1000" b="0" kern="1200" smtClean="0">
               <a:solidFill>
-                <a:schemeClr val="tx2"/>
+                <a:schemeClr val="accent5">
+                  <a:lumMod val="75000"/>
+                </a:schemeClr>
               </a:solidFill>
             </a:rPr>
             <a:t>Unity</a:t>
           </a:r>
-          <a:endParaRPr lang="en-GB" sz="1400" kern="1200" dirty="0">
+          <a:endParaRPr lang="en-GB" sz="1000" b="0" kern="1200" dirty="0">
             <a:solidFill>
-              <a:schemeClr val="tx2"/>
+              <a:schemeClr val="accent5">
+                <a:lumMod val="75000"/>
+              </a:schemeClr>
             </a:solidFill>
           </a:endParaRPr>
         </a:p>
@@ -2617,10 +2995,10 @@
           <a:avLst/>
         </a:prstGeom>
         <a:solidFill>
-          <a:schemeClr val="accent1">
-            <a:hueOff val="0"/>
-            <a:satOff val="0"/>
-            <a:lumOff val="0"/>
+          <a:schemeClr val="accent4">
+            <a:hueOff val="-4464770"/>
+            <a:satOff val="26899"/>
+            <a:lumOff val="2156"/>
             <a:alphaOff val="0"/>
           </a:schemeClr>
         </a:solidFill>
@@ -7058,7 +7436,7 @@
           <p:nvPr>
             <p:extLst>
               <p:ext uri="{D42A27DB-BD31-4B8C-83A1-F6EECF244321}">
-                <p14:modId xmlns:p14="http://schemas.microsoft.com/office/powerpoint/2010/main" val="1160372160"/>
+                <p14:modId xmlns:p14="http://schemas.microsoft.com/office/powerpoint/2010/main" val="1421627469"/>
               </p:ext>
             </p:extLst>
           </p:nvPr>
@@ -7098,14 +7476,14 @@
             <a:r>
               <a:rPr lang="en-US" sz="4000" dirty="0" smtClean="0">
                 <a:solidFill>
-                  <a:schemeClr val="tx2"/>
+                  <a:schemeClr val="bg1"/>
                 </a:solidFill>
               </a:rPr>
               <a:t>Cavity</a:t>
             </a:r>
             <a:endParaRPr lang="en-GB" sz="4000" dirty="0">
               <a:solidFill>
-                <a:schemeClr val="tx2"/>
+                <a:schemeClr val="bg1"/>
               </a:solidFill>
             </a:endParaRPr>
           </a:p>

</xml_diff>

<commit_message>
Pulling Repository code into it's own library.
</commit_message>
<xml_diff>
--- a/src/Diagrams/Packages.pptx
+++ b/src/Diagrams/Packages.pptx
@@ -1026,8 +1026,8 @@
         <a:p>
           <a:pPr rtl="0"/>
           <a:r>
-            <a:rPr lang="en-US" dirty="0" smtClean="0"/>
-            <a:t>Service Location</a:t>
+            <a:rPr lang="en-US" smtClean="0"/>
+            <a:t>Testing</a:t>
           </a:r>
           <a:endParaRPr lang="en-GB" dirty="0"/>
         </a:p>
@@ -1045,44 +1045,6 @@
       </dgm:t>
     </dgm:pt>
     <dgm:pt modelId="{B53D6E05-C5A1-4AC1-9156-F7CDF28FD62A}" type="sibTrans" cxnId="{259001A6-4DB8-41AF-80F4-6DA95AA9E905}">
-      <dgm:prSet/>
-      <dgm:spPr/>
-      <dgm:t>
-        <a:bodyPr/>
-        <a:lstStyle/>
-        <a:p>
-          <a:endParaRPr lang="en-GB"/>
-        </a:p>
-      </dgm:t>
-    </dgm:pt>
-    <dgm:pt modelId="{F8233197-C2FC-4783-9446-285F150FB514}">
-      <dgm:prSet/>
-      <dgm:spPr/>
-      <dgm:t>
-        <a:bodyPr/>
-        <a:lstStyle/>
-        <a:p>
-          <a:pPr rtl="0"/>
-          <a:r>
-            <a:rPr lang="en-US" dirty="0" smtClean="0"/>
-            <a:t>Unit Testing</a:t>
-          </a:r>
-          <a:endParaRPr lang="en-GB" dirty="0"/>
-        </a:p>
-      </dgm:t>
-    </dgm:pt>
-    <dgm:pt modelId="{158AA3B2-C4EF-4C57-8A17-99172590D02C}" type="parTrans" cxnId="{2E15CD54-9A6B-4AF8-A9B4-F9589A7AE5DB}">
-      <dgm:prSet/>
-      <dgm:spPr/>
-      <dgm:t>
-        <a:bodyPr/>
-        <a:lstStyle/>
-        <a:p>
-          <a:endParaRPr lang="en-GB"/>
-        </a:p>
-      </dgm:t>
-    </dgm:pt>
-    <dgm:pt modelId="{D3BCA176-153A-4B97-8705-C871B5503455}" type="sibTrans" cxnId="{2E15CD54-9A6B-4AF8-A9B4-F9589A7AE5DB}">
       <dgm:prSet/>
       <dgm:spPr/>
       <dgm:t>
@@ -1202,7 +1164,7 @@
         <a:p>
           <a:pPr rtl="0"/>
           <a:r>
-            <a:rPr lang="en-US" sz="1000" b="0" smtClean="0">
+            <a:rPr lang="en-US" sz="1000" b="0" dirty="0" err="1" smtClean="0">
               <a:solidFill>
                 <a:schemeClr val="accent5">
                   <a:lumMod val="75000"/>
@@ -1252,7 +1214,7 @@
         <a:p>
           <a:pPr rtl="0"/>
           <a:r>
-            <a:rPr lang="en-US" sz="1000" b="0" smtClean="0">
+            <a:rPr lang="en-US" sz="1000" b="0" dirty="0" smtClean="0">
               <a:solidFill>
                 <a:schemeClr val="accent5">
                   <a:lumMod val="75000"/>
@@ -1543,6 +1505,185 @@
         </a:p>
       </dgm:t>
     </dgm:pt>
+    <dgm:pt modelId="{8BE338AF-A0A2-49A2-B73D-208347F2E462}">
+      <dgm:prSet custT="1"/>
+      <dgm:spPr/>
+      <dgm:t>
+        <a:bodyPr/>
+        <a:lstStyle/>
+        <a:p>
+          <a:pPr rtl="0"/>
+          <a:r>
+            <a:rPr lang="en-US" sz="1000" dirty="0" smtClean="0">
+              <a:solidFill>
+                <a:schemeClr val="accent5"/>
+              </a:solidFill>
+            </a:rPr>
+            <a:t>HTTP</a:t>
+          </a:r>
+          <a:endParaRPr lang="en-GB" sz="1000" dirty="0">
+            <a:solidFill>
+              <a:schemeClr val="accent5"/>
+            </a:solidFill>
+          </a:endParaRPr>
+        </a:p>
+      </dgm:t>
+    </dgm:pt>
+    <dgm:pt modelId="{11DB809F-2EB7-4961-96F3-6961A9B557E7}" type="parTrans" cxnId="{6E9A0419-46C3-4431-8805-4DDAB70F6854}">
+      <dgm:prSet/>
+      <dgm:spPr/>
+      <dgm:t>
+        <a:bodyPr/>
+        <a:lstStyle/>
+        <a:p>
+          <a:endParaRPr lang="en-GB"/>
+        </a:p>
+      </dgm:t>
+    </dgm:pt>
+    <dgm:pt modelId="{131C0413-A7D5-4F0E-8F4F-74CE93C16919}" type="sibTrans" cxnId="{6E9A0419-46C3-4431-8805-4DDAB70F6854}">
+      <dgm:prSet/>
+      <dgm:spPr/>
+      <dgm:t>
+        <a:bodyPr/>
+        <a:lstStyle/>
+        <a:p>
+          <a:endParaRPr lang="en-GB"/>
+        </a:p>
+      </dgm:t>
+    </dgm:pt>
+    <dgm:pt modelId="{BCB9F004-C3C1-4E3C-B6DC-F53AED53D70F}">
+      <dgm:prSet custT="1"/>
+      <dgm:spPr/>
+      <dgm:t>
+        <a:bodyPr/>
+        <a:lstStyle/>
+        <a:p>
+          <a:pPr rtl="0"/>
+          <a:r>
+            <a:rPr lang="en-US" sz="1000" dirty="0" smtClean="0">
+              <a:solidFill>
+                <a:schemeClr val="accent5"/>
+              </a:solidFill>
+            </a:rPr>
+            <a:t>Repository</a:t>
+          </a:r>
+          <a:endParaRPr lang="en-GB" sz="1000" dirty="0">
+            <a:solidFill>
+              <a:schemeClr val="accent5"/>
+            </a:solidFill>
+          </a:endParaRPr>
+        </a:p>
+      </dgm:t>
+    </dgm:pt>
+    <dgm:pt modelId="{AD83EFF9-B013-4BCC-B483-FE01B01C3E6B}" type="parTrans" cxnId="{BFB71832-B626-4BD4-930E-6298F29305F7}">
+      <dgm:prSet/>
+      <dgm:spPr/>
+      <dgm:t>
+        <a:bodyPr/>
+        <a:lstStyle/>
+        <a:p>
+          <a:endParaRPr lang="en-GB"/>
+        </a:p>
+      </dgm:t>
+    </dgm:pt>
+    <dgm:pt modelId="{41F0EEEF-BEFB-4ACC-8523-DDB7A6262922}" type="sibTrans" cxnId="{BFB71832-B626-4BD4-930E-6298F29305F7}">
+      <dgm:prSet/>
+      <dgm:spPr/>
+      <dgm:t>
+        <a:bodyPr/>
+        <a:lstStyle/>
+        <a:p>
+          <a:endParaRPr lang="en-GB"/>
+        </a:p>
+      </dgm:t>
+    </dgm:pt>
+    <dgm:pt modelId="{31215E46-ABA6-4BAA-8553-A65AE7DF7913}">
+      <dgm:prSet custT="1"/>
+      <dgm:spPr/>
+      <dgm:t>
+        <a:bodyPr/>
+        <a:lstStyle/>
+        <a:p>
+          <a:pPr rtl="0"/>
+          <a:r>
+            <a:rPr lang="en-US" sz="1000" dirty="0" smtClean="0">
+              <a:solidFill>
+                <a:schemeClr val="accent5"/>
+              </a:solidFill>
+            </a:rPr>
+            <a:t>Unit</a:t>
+          </a:r>
+          <a:endParaRPr lang="en-GB" sz="1000" dirty="0">
+            <a:solidFill>
+              <a:schemeClr val="accent5"/>
+            </a:solidFill>
+          </a:endParaRPr>
+        </a:p>
+      </dgm:t>
+    </dgm:pt>
+    <dgm:pt modelId="{1727AB60-245E-49D8-9A57-D19FC51E6349}" type="parTrans" cxnId="{8C536857-3E0E-4E86-B0E3-B3EAB2AA9B83}">
+      <dgm:prSet/>
+      <dgm:spPr/>
+      <dgm:t>
+        <a:bodyPr/>
+        <a:lstStyle/>
+        <a:p>
+          <a:endParaRPr lang="en-GB"/>
+        </a:p>
+      </dgm:t>
+    </dgm:pt>
+    <dgm:pt modelId="{584E1165-2406-4A31-A354-D0676125101D}" type="sibTrans" cxnId="{8C536857-3E0E-4E86-B0E3-B3EAB2AA9B83}">
+      <dgm:prSet/>
+      <dgm:spPr/>
+      <dgm:t>
+        <a:bodyPr/>
+        <a:lstStyle/>
+        <a:p>
+          <a:endParaRPr lang="en-GB"/>
+        </a:p>
+      </dgm:t>
+    </dgm:pt>
+    <dgm:pt modelId="{B12A0242-2433-4029-AD85-F814892D4ED7}">
+      <dgm:prSet/>
+      <dgm:spPr/>
+      <dgm:t>
+        <a:bodyPr/>
+        <a:lstStyle/>
+        <a:p>
+          <a:r>
+            <a:rPr lang="en-US" smtClean="0"/>
+            <a:t>Service </a:t>
+          </a:r>
+          <a:r>
+            <a:rPr lang="en-US" dirty="0" smtClean="0"/>
+            <a:t>Location</a:t>
+          </a:r>
+          <a:endParaRPr lang="en-GB"/>
+        </a:p>
+      </dgm:t>
+    </dgm:pt>
+    <dgm:pt modelId="{B97E0F6D-775B-4977-B7A5-E38A8D0E7A89}" type="parTrans" cxnId="{41BC33BB-E23F-440D-A5BE-ABFD8C057A4F}">
+      <dgm:prSet/>
+      <dgm:spPr/>
+      <dgm:t>
+        <a:bodyPr/>
+        <a:lstStyle/>
+        <a:p>
+          <a:endParaRPr lang="en-GB"/>
+        </a:p>
+      </dgm:t>
+    </dgm:pt>
+    <dgm:pt modelId="{AE6B9780-60B4-4544-9DA9-142128284F4A}" type="sibTrans" cxnId="{41BC33BB-E23F-440D-A5BE-ABFD8C057A4F}">
+      <dgm:prSet/>
+      <dgm:spPr/>
+      <dgm:t>
+        <a:bodyPr/>
+        <a:lstStyle/>
+        <a:p>
+          <a:endParaRPr lang="en-GB"/>
+        </a:p>
+      </dgm:t>
+    </dgm:pt>
     <dgm:pt modelId="{47E43A2D-9040-4B0A-897F-F7A679782C00}" type="pres">
       <dgm:prSet presAssocID="{71A059E4-E5A2-430A-8FF1-F9398AAC2421}" presName="composite" presStyleCnt="0">
         <dgm:presLayoutVars>
@@ -1628,7 +1769,7 @@
       </dgm:t>
     </dgm:pt>
     <dgm:pt modelId="{BCAD45A3-2659-426E-A577-6BB66BA2921F}" type="pres">
-      <dgm:prSet presAssocID="{20F002F5-B476-4484-BDBC-E1704CEDE259}" presName="parentNode" presStyleLbl="node1" presStyleIdx="1" presStyleCnt="6" custLinFactX="-100000" custLinFactNeighborX="-163889" custLinFactNeighborY="65139">
+      <dgm:prSet presAssocID="{20F002F5-B476-4484-BDBC-E1704CEDE259}" presName="parentNode" presStyleLbl="node1" presStyleIdx="1" presStyleCnt="6" custLinFactX="-100000" custLinFactNeighborX="-151646" custLinFactNeighborY="86905">
         <dgm:presLayoutVars>
           <dgm:chMax val="1"/>
           <dgm:bulletEnabled val="1"/>
@@ -1644,7 +1785,7 @@
       </dgm:t>
     </dgm:pt>
     <dgm:pt modelId="{B3AA3372-BF6F-4DA3-AAB0-4BA5110F34EF}" type="pres">
-      <dgm:prSet presAssocID="{20F002F5-B476-4484-BDBC-E1704CEDE259}" presName="childNode" presStyleLbl="revTx" presStyleIdx="0" presStyleCnt="3">
+      <dgm:prSet presAssocID="{20F002F5-B476-4484-BDBC-E1704CEDE259}" presName="childNode" presStyleLbl="revTx" presStyleIdx="0" presStyleCnt="4">
         <dgm:presLayoutVars>
           <dgm:bulletEnabled val="1"/>
         </dgm:presLayoutVars>
@@ -1681,7 +1822,7 @@
       </dgm:t>
     </dgm:pt>
     <dgm:pt modelId="{C4D7BBCE-5C74-4CFB-82F2-5D70E19751DC}" type="pres">
-      <dgm:prSet presAssocID="{A574C59F-2016-4DAE-BAB8-5E077D6CFB59}" presName="parentNode" presStyleLbl="node1" presStyleIdx="2" presStyleCnt="6" custLinFactX="-20719" custLinFactNeighborX="-100000" custLinFactNeighborY="-46815">
+      <dgm:prSet presAssocID="{A574C59F-2016-4DAE-BAB8-5E077D6CFB59}" presName="parentNode" presStyleLbl="node1" presStyleIdx="2" presStyleCnt="6" custLinFactX="-37338" custLinFactNeighborX="-100000" custLinFactNeighborY="-73189">
         <dgm:presLayoutVars>
           <dgm:chMax val="1"/>
           <dgm:bulletEnabled val="1"/>
@@ -1697,7 +1838,7 @@
       </dgm:t>
     </dgm:pt>
     <dgm:pt modelId="{7A53C442-5E14-411A-A9BC-FCED8EE7841C}" type="pres">
-      <dgm:prSet presAssocID="{A574C59F-2016-4DAE-BAB8-5E077D6CFB59}" presName="childNode" presStyleLbl="revTx" presStyleIdx="0" presStyleCnt="3">
+      <dgm:prSet presAssocID="{A574C59F-2016-4DAE-BAB8-5E077D6CFB59}" presName="childNode" presStyleLbl="revTx" presStyleIdx="0" presStyleCnt="4">
         <dgm:presLayoutVars>
           <dgm:bulletEnabled val="1"/>
         </dgm:presLayoutVars>
@@ -1734,7 +1875,7 @@
       </dgm:t>
     </dgm:pt>
     <dgm:pt modelId="{0FEF36F9-A68C-4708-8960-E6CEE6145183}" type="pres">
-      <dgm:prSet presAssocID="{610C3ACF-7A84-4679-8074-58B66812FD4D}" presName="parentNode" presStyleLbl="node1" presStyleIdx="3" presStyleCnt="6">
+      <dgm:prSet presAssocID="{610C3ACF-7A84-4679-8074-58B66812FD4D}" presName="parentNode" presStyleLbl="node1" presStyleIdx="3" presStyleCnt="6" custLinFactNeighborX="14955" custLinFactNeighborY="-87911">
         <dgm:presLayoutVars>
           <dgm:chMax val="1"/>
           <dgm:bulletEnabled val="1"/>
@@ -1750,7 +1891,7 @@
       </dgm:t>
     </dgm:pt>
     <dgm:pt modelId="{1EE562A9-3F5F-4C57-86C6-834EE5BAB1A6}" type="pres">
-      <dgm:prSet presAssocID="{610C3ACF-7A84-4679-8074-58B66812FD4D}" presName="childNode" presStyleLbl="revTx" presStyleIdx="1" presStyleCnt="3">
+      <dgm:prSet presAssocID="{610C3ACF-7A84-4679-8074-58B66812FD4D}" presName="childNode" presStyleLbl="revTx" presStyleIdx="1" presStyleCnt="4">
         <dgm:presLayoutVars>
           <dgm:bulletEnabled val="1"/>
         </dgm:presLayoutVars>
@@ -1787,7 +1928,7 @@
       </dgm:t>
     </dgm:pt>
     <dgm:pt modelId="{2B38D02F-7CB3-4561-9A8D-9A0B5265137D}" type="pres">
-      <dgm:prSet presAssocID="{EF6D1E2B-B2B3-4F87-96E5-793543E9F43F}" presName="parentNode" presStyleLbl="node1" presStyleIdx="4" presStyleCnt="6" custLinFactNeighborX="-98921" custLinFactNeighborY="48726">
+      <dgm:prSet presAssocID="{EF6D1E2B-B2B3-4F87-96E5-793543E9F43F}" presName="parentNode" presStyleLbl="node1" presStyleIdx="4" presStyleCnt="6" custLinFactNeighborX="-52036" custLinFactNeighborY="-71614">
         <dgm:presLayoutVars>
           <dgm:chMax val="1"/>
           <dgm:bulletEnabled val="1"/>
@@ -1803,7 +1944,7 @@
       </dgm:t>
     </dgm:pt>
     <dgm:pt modelId="{74305B94-8BC0-473D-8661-BDDEE7828265}" type="pres">
-      <dgm:prSet presAssocID="{EF6D1E2B-B2B3-4F87-96E5-793543E9F43F}" presName="childNode" presStyleLbl="revTx" presStyleIdx="2" presStyleCnt="3">
+      <dgm:prSet presAssocID="{EF6D1E2B-B2B3-4F87-96E5-793543E9F43F}" presName="childNode" presStyleLbl="revTx" presStyleIdx="2" presStyleCnt="4">
         <dgm:presLayoutVars>
           <dgm:bulletEnabled val="1"/>
         </dgm:presLayoutVars>
@@ -1817,30 +1958,16 @@
         </a:p>
       </dgm:t>
     </dgm:pt>
-    <dgm:pt modelId="{3B1DF92B-4E6E-427D-9DB5-879DE876B8D7}" type="pres">
-      <dgm:prSet presAssocID="{158AA3B2-C4EF-4C57-8A17-99172590D02C}" presName="Name25" presStyleLbl="parChTrans1D1" presStyleIdx="4" presStyleCnt="5"/>
+    <dgm:pt modelId="{3974FB75-4CDA-4D57-8076-3F4705871C5D}" type="pres">
+      <dgm:prSet presAssocID="{B97E0F6D-775B-4977-B7A5-E38A8D0E7A89}" presName="Name25" presStyleLbl="parChTrans1D1" presStyleIdx="4" presStyleCnt="5"/>
       <dgm:spPr/>
-      <dgm:t>
-        <a:bodyPr/>
-        <a:lstStyle/>
-        <a:p>
-          <a:endParaRPr lang="en-GB"/>
-        </a:p>
-      </dgm:t>
     </dgm:pt>
-    <dgm:pt modelId="{C02D39A7-792C-4CED-B1BD-03AB0E24F870}" type="pres">
-      <dgm:prSet presAssocID="{F8233197-C2FC-4783-9446-285F150FB514}" presName="node" presStyleCnt="0"/>
+    <dgm:pt modelId="{6082B012-A7E4-4AE5-A9D5-1A8B4106AFBA}" type="pres">
+      <dgm:prSet presAssocID="{B12A0242-2433-4029-AD85-F814892D4ED7}" presName="node" presStyleCnt="0"/>
       <dgm:spPr/>
-      <dgm:t>
-        <a:bodyPr/>
-        <a:lstStyle/>
-        <a:p>
-          <a:endParaRPr lang="en-GB"/>
-        </a:p>
-      </dgm:t>
     </dgm:pt>
-    <dgm:pt modelId="{D9F67394-CD8D-4FE3-ACC0-7377068B02C2}" type="pres">
-      <dgm:prSet presAssocID="{F8233197-C2FC-4783-9446-285F150FB514}" presName="parentNode" presStyleLbl="node1" presStyleIdx="5" presStyleCnt="6" custLinFactX="-100000" custLinFactNeighborX="-163889" custLinFactNeighborY="-52330">
+    <dgm:pt modelId="{010887FA-6A36-4121-9EC6-0C758CF470F3}" type="pres">
+      <dgm:prSet presAssocID="{B12A0242-2433-4029-AD85-F814892D4ED7}" presName="parentNode" presStyleLbl="node1" presStyleIdx="5" presStyleCnt="6" custLinFactNeighborX="-74334" custLinFactNeighborY="-43122">
         <dgm:presLayoutVars>
           <dgm:chMax val="1"/>
           <dgm:bulletEnabled val="1"/>
@@ -1855,8 +1982,8 @@
         </a:p>
       </dgm:t>
     </dgm:pt>
-    <dgm:pt modelId="{72F58B4E-31CF-4984-A07A-C3A89FBA15C5}" type="pres">
-      <dgm:prSet presAssocID="{F8233197-C2FC-4783-9446-285F150FB514}" presName="childNode" presStyleLbl="revTx" presStyleIdx="2" presStyleCnt="3">
+    <dgm:pt modelId="{23FBB8E5-36B3-4135-9571-915845BBC3FD}" type="pres">
+      <dgm:prSet presAssocID="{B12A0242-2433-4029-AD85-F814892D4ED7}" presName="childNode" presStyleLbl="revTx" presStyleIdx="3" presStyleCnt="4">
         <dgm:presLayoutVars>
           <dgm:bulletEnabled val="1"/>
         </dgm:presLayoutVars>
@@ -1872,40 +1999,46 @@
     </dgm:pt>
   </dgm:ptLst>
   <dgm:cxnLst>
-    <dgm:cxn modelId="{5154F922-021F-41AF-8011-43108DCD62B2}" type="presOf" srcId="{F7B48B73-B0C4-4FA2-9AE8-15C89D3EF691}" destId="{76BA4605-796D-4AD3-BDA5-823550D2F212}" srcOrd="0" destOrd="0" presId="urn:microsoft.com/office/officeart/2005/8/layout/radial2"/>
-    <dgm:cxn modelId="{56AA2936-F13F-4B1F-B9A5-3D296282E55A}" srcId="{610C3ACF-7A84-4679-8074-58B66812FD4D}" destId="{028A59AA-CBFB-4127-BC76-D50D05DBFC5F}" srcOrd="0" destOrd="0" parTransId="{ABA3AA92-80FE-4BCA-A89A-496F04FA573D}" sibTransId="{FD4F982F-BC8D-4D68-AC6D-58F77D5DCBEC}"/>
-    <dgm:cxn modelId="{A193B033-718C-4392-83A3-665E39317F4D}" type="presOf" srcId="{20F002F5-B476-4484-BDBC-E1704CEDE259}" destId="{BCAD45A3-2659-426E-A577-6BB66BA2921F}" srcOrd="0" destOrd="0" presId="urn:microsoft.com/office/officeart/2005/8/layout/radial2"/>
-    <dgm:cxn modelId="{7F93696C-17BB-4851-91C5-7D28AB1CE32C}" srcId="{610C3ACF-7A84-4679-8074-58B66812FD4D}" destId="{7CA392C3-D9E4-42CB-BFA7-B6C53B65D5C8}" srcOrd="1" destOrd="0" parTransId="{F2D76B9D-CD09-42A4-9E5D-6A8971FD1C73}" sibTransId="{D7969AA2-C3BE-4C7F-A4F8-CE1389A4E1C2}"/>
+    <dgm:cxn modelId="{C8BA3B85-0B9F-4532-A4C4-CC4725F4CC81}" type="presOf" srcId="{71A059E4-E5A2-430A-8FF1-F9398AAC2421}" destId="{47E43A2D-9040-4B0A-897F-F7A679782C00}" srcOrd="0" destOrd="0" presId="urn:microsoft.com/office/officeart/2005/8/layout/radial2"/>
     <dgm:cxn modelId="{510B8A85-67F9-4FF6-A67B-12E7331B24DC}" type="presOf" srcId="{028A59AA-CBFB-4127-BC76-D50D05DBFC5F}" destId="{1EE562A9-3F5F-4C57-86C6-834EE5BAB1A6}" srcOrd="0" destOrd="0" presId="urn:microsoft.com/office/officeart/2005/8/layout/radial2"/>
-    <dgm:cxn modelId="{FF659C51-A24E-43F9-B1DC-C00B1EB4E864}" srcId="{EF6D1E2B-B2B3-4F87-96E5-793543E9F43F}" destId="{9710EA1C-7EEC-48B2-85EE-77153699644B}" srcOrd="1" destOrd="0" parTransId="{EDC0110E-5047-48D9-BE58-F954247A1EDD}" sibTransId="{88A46AF2-E5B7-44BB-85B3-6CE6A32E6047}"/>
-    <dgm:cxn modelId="{DC21B904-B97D-459B-AFA0-6D4830C00CEA}" type="presOf" srcId="{610C3ACF-7A84-4679-8074-58B66812FD4D}" destId="{0FEF36F9-A68C-4708-8960-E6CEE6145183}" srcOrd="0" destOrd="0" presId="urn:microsoft.com/office/officeart/2005/8/layout/radial2"/>
+    <dgm:cxn modelId="{1C5A92A1-C9E0-4A45-9924-50C358EE6B8F}" type="presOf" srcId="{38321BEE-3435-44CB-A9D9-2959C64ECFF5}" destId="{23FBB8E5-36B3-4135-9571-915845BBC3FD}" srcOrd="0" destOrd="3" presId="urn:microsoft.com/office/officeart/2005/8/layout/radial2"/>
+    <dgm:cxn modelId="{194377A2-C782-4B01-8F04-450B3B6A5EFE}" srcId="{71A059E4-E5A2-430A-8FF1-F9398AAC2421}" destId="{A574C59F-2016-4DAE-BAB8-5E077D6CFB59}" srcOrd="1" destOrd="0" parTransId="{D6C3B4B7-5959-4E1E-A717-8518DF6169A1}" sibTransId="{9035C3CA-AA9A-43BD-AF58-F729C64B63A6}"/>
     <dgm:cxn modelId="{41A5AB71-10EC-4AE3-A67A-40B4BBB2A95D}" type="presOf" srcId="{3447004D-6F57-4FC5-96B5-C8D0B7E8FEF8}" destId="{1EE562A9-3F5F-4C57-86C6-834EE5BAB1A6}" srcOrd="0" destOrd="2" presId="urn:microsoft.com/office/officeart/2005/8/layout/radial2"/>
     <dgm:cxn modelId="{259001A6-4DB8-41AF-80F4-6DA95AA9E905}" srcId="{71A059E4-E5A2-430A-8FF1-F9398AAC2421}" destId="{EF6D1E2B-B2B3-4F87-96E5-793543E9F43F}" srcOrd="3" destOrd="0" parTransId="{47D198E4-914C-4E44-AF10-28A7BFAF45B5}" sibTransId="{B53D6E05-C5A1-4AC1-9156-F7CDF28FD62A}"/>
+    <dgm:cxn modelId="{DC21B904-B97D-459B-AFA0-6D4830C00CEA}" type="presOf" srcId="{610C3ACF-7A84-4679-8074-58B66812FD4D}" destId="{0FEF36F9-A68C-4708-8960-E6CEE6145183}" srcOrd="0" destOrd="0" presId="urn:microsoft.com/office/officeart/2005/8/layout/radial2"/>
+    <dgm:cxn modelId="{5154F922-021F-41AF-8011-43108DCD62B2}" type="presOf" srcId="{F7B48B73-B0C4-4FA2-9AE8-15C89D3EF691}" destId="{76BA4605-796D-4AD3-BDA5-823550D2F212}" srcOrd="0" destOrd="0" presId="urn:microsoft.com/office/officeart/2005/8/layout/radial2"/>
+    <dgm:cxn modelId="{A193B033-718C-4392-83A3-665E39317F4D}" type="presOf" srcId="{20F002F5-B476-4484-BDBC-E1704CEDE259}" destId="{BCAD45A3-2659-426E-A577-6BB66BA2921F}" srcOrd="0" destOrd="0" presId="urn:microsoft.com/office/officeart/2005/8/layout/radial2"/>
+    <dgm:cxn modelId="{86A3B69C-8AD4-4A7F-A1DA-D7F47E1BB8A2}" srcId="{71A059E4-E5A2-430A-8FF1-F9398AAC2421}" destId="{610C3ACF-7A84-4679-8074-58B66812FD4D}" srcOrd="2" destOrd="0" parTransId="{F7B48B73-B0C4-4FA2-9AE8-15C89D3EF691}" sibTransId="{C052F008-3677-4699-979C-2DC157FD7BF6}"/>
+    <dgm:cxn modelId="{9365A353-A172-4995-904F-6A8FD2D73C6A}" type="presOf" srcId="{B97E0F6D-775B-4977-B7A5-E38A8D0E7A89}" destId="{3974FB75-4CDA-4D57-8076-3F4705871C5D}" srcOrd="0" destOrd="0" presId="urn:microsoft.com/office/officeart/2005/8/layout/radial2"/>
+    <dgm:cxn modelId="{5015904B-1809-499F-A16C-607AC91C6270}" srcId="{610C3ACF-7A84-4679-8074-58B66812FD4D}" destId="{3447004D-6F57-4FC5-96B5-C8D0B7E8FEF8}" srcOrd="2" destOrd="0" parTransId="{17DA82D2-E5BC-4776-8E2F-397C179C95DB}" sibTransId="{EEAB5E8D-5949-403C-A91C-1063EDF0B679}"/>
+    <dgm:cxn modelId="{547F9757-2EFC-45DF-86AC-2D49EEFF1D35}" srcId="{B12A0242-2433-4029-AD85-F814892D4ED7}" destId="{38321BEE-3435-44CB-A9D9-2959C64ECFF5}" srcOrd="3" destOrd="0" parTransId="{53D6883F-BC2F-4CD4-B086-3BF378B79BFB}" sibTransId="{622F2370-C2AB-4D02-AD0E-3256665F50E1}"/>
+    <dgm:cxn modelId="{0CA09654-ED5C-4373-8811-B0814340A958}" type="presOf" srcId="{7CA392C3-D9E4-42CB-BFA7-B6C53B65D5C8}" destId="{1EE562A9-3F5F-4C57-86C6-834EE5BAB1A6}" srcOrd="0" destOrd="1" presId="urn:microsoft.com/office/officeart/2005/8/layout/radial2"/>
+    <dgm:cxn modelId="{BFB71832-B626-4BD4-930E-6298F29305F7}" srcId="{EF6D1E2B-B2B3-4F87-96E5-793543E9F43F}" destId="{BCB9F004-C3C1-4E3C-B6DC-F53AED53D70F}" srcOrd="1" destOrd="0" parTransId="{AD83EFF9-B013-4BCC-B483-FE01B01C3E6B}" sibTransId="{41F0EEEF-BEFB-4ACC-8523-DDB7A6262922}"/>
+    <dgm:cxn modelId="{7F8BC0F1-19DB-4A19-9A4F-C7B0BA0A5427}" type="presOf" srcId="{EF6D1E2B-B2B3-4F87-96E5-793543E9F43F}" destId="{2B38D02F-7CB3-4561-9A8D-9A0B5265137D}" srcOrd="0" destOrd="0" presId="urn:microsoft.com/office/officeart/2005/8/layout/radial2"/>
+    <dgm:cxn modelId="{6A294E1C-9844-4F25-96C9-DAB2DE4217FF}" srcId="{A574C59F-2016-4DAE-BAB8-5E077D6CFB59}" destId="{FF281A5A-7EAD-4ECD-977A-B15E0AD51E26}" srcOrd="0" destOrd="0" parTransId="{83C6B936-D586-4DA2-B039-4C8E6D50A007}" sibTransId="{86F3C38E-355D-4000-B159-F537762A0845}"/>
+    <dgm:cxn modelId="{8750DBDD-E691-4869-BB31-AABBCF8717EC}" type="presOf" srcId="{02D5456C-D591-4104-8404-435F26A9BB17}" destId="{23FBB8E5-36B3-4135-9571-915845BBC3FD}" srcOrd="0" destOrd="2" presId="urn:microsoft.com/office/officeart/2005/8/layout/radial2"/>
+    <dgm:cxn modelId="{BFA4DBEE-CE9C-4034-968C-64769D9D5628}" type="presOf" srcId="{31215E46-ABA6-4BAA-8553-A65AE7DF7913}" destId="{74305B94-8BC0-473D-8661-BDDEE7828265}" srcOrd="0" destOrd="2" presId="urn:microsoft.com/office/officeart/2005/8/layout/radial2"/>
+    <dgm:cxn modelId="{5D77A46E-EFD3-4718-85A6-D3468123003D}" type="presOf" srcId="{FF281A5A-7EAD-4ECD-977A-B15E0AD51E26}" destId="{7A53C442-5E14-411A-A9BC-FCED8EE7841C}" srcOrd="0" destOrd="0" presId="urn:microsoft.com/office/officeart/2005/8/layout/radial2"/>
+    <dgm:cxn modelId="{62DE465B-0203-49E5-8C19-6648886AD9C2}" type="presOf" srcId="{8BE338AF-A0A2-49A2-B73D-208347F2E462}" destId="{74305B94-8BC0-473D-8661-BDDEE7828265}" srcOrd="0" destOrd="0" presId="urn:microsoft.com/office/officeart/2005/8/layout/radial2"/>
+    <dgm:cxn modelId="{FB895669-8954-4DA1-BD1D-D12749C32E61}" type="presOf" srcId="{A574C59F-2016-4DAE-BAB8-5E077D6CFB59}" destId="{C4D7BBCE-5C74-4CFB-82F2-5D70E19751DC}" srcOrd="0" destOrd="0" presId="urn:microsoft.com/office/officeart/2005/8/layout/radial2"/>
     <dgm:cxn modelId="{9222F1FF-B709-4D6B-A2C3-9F54D2F0D450}" srcId="{3447004D-6F57-4FC5-96B5-C8D0B7E8FEF8}" destId="{4A1E6FB0-FB70-413E-90A3-696A490812D1}" srcOrd="0" destOrd="0" parTransId="{E9ED75C0-18E4-47E6-AA44-8A8A10A5CE71}" sibTransId="{67F4203E-E21D-4018-AD26-4F02CE02BC43}"/>
-    <dgm:cxn modelId="{7F8BC0F1-19DB-4A19-9A4F-C7B0BA0A5427}" type="presOf" srcId="{EF6D1E2B-B2B3-4F87-96E5-793543E9F43F}" destId="{2B38D02F-7CB3-4561-9A8D-9A0B5265137D}" srcOrd="0" destOrd="0" presId="urn:microsoft.com/office/officeart/2005/8/layout/radial2"/>
-    <dgm:cxn modelId="{DEF84037-344C-4D09-8AB7-774ABF1F5FB4}" type="presOf" srcId="{840C0A0A-6AE1-4E29-80AD-6F392FD03EDC}" destId="{74305B94-8BC0-473D-8661-BDDEE7828265}" srcOrd="0" destOrd="0" presId="urn:microsoft.com/office/officeart/2005/8/layout/radial2"/>
+    <dgm:cxn modelId="{8C536857-3E0E-4E86-B0E3-B3EAB2AA9B83}" srcId="{EF6D1E2B-B2B3-4F87-96E5-793543E9F43F}" destId="{31215E46-ABA6-4BAA-8553-A65AE7DF7913}" srcOrd="2" destOrd="0" parTransId="{1727AB60-245E-49D8-9A57-D19FC51E6349}" sibTransId="{584E1165-2406-4A31-A354-D0676125101D}"/>
+    <dgm:cxn modelId="{C71EEA8A-647C-4CD8-8CC7-B98BB98647F4}" srcId="{71A059E4-E5A2-430A-8FF1-F9398AAC2421}" destId="{20F002F5-B476-4484-BDBC-E1704CEDE259}" srcOrd="0" destOrd="0" parTransId="{F212D2F4-EB78-497F-8B1B-38A997446927}" sibTransId="{E2913B88-62F9-4A78-846D-0BE7730062B4}"/>
+    <dgm:cxn modelId="{56AA2936-F13F-4B1F-B9A5-3D296282E55A}" srcId="{610C3ACF-7A84-4679-8074-58B66812FD4D}" destId="{028A59AA-CBFB-4127-BC76-D50D05DBFC5F}" srcOrd="0" destOrd="0" parTransId="{ABA3AA92-80FE-4BCA-A89A-496F04FA573D}" sibTransId="{FD4F982F-BC8D-4D68-AC6D-58F77D5DCBEC}"/>
+    <dgm:cxn modelId="{C5601473-894C-4ADB-B6CE-DF4A01FF02F3}" type="presOf" srcId="{4A1E6FB0-FB70-413E-90A3-696A490812D1}" destId="{1EE562A9-3F5F-4C57-86C6-834EE5BAB1A6}" srcOrd="0" destOrd="3" presId="urn:microsoft.com/office/officeart/2005/8/layout/radial2"/>
+    <dgm:cxn modelId="{9BACC6AC-186C-48B9-921C-3290E8D1B4A1}" type="presOf" srcId="{9710EA1C-7EEC-48B2-85EE-77153699644B}" destId="{23FBB8E5-36B3-4135-9571-915845BBC3FD}" srcOrd="0" destOrd="1" presId="urn:microsoft.com/office/officeart/2005/8/layout/radial2"/>
+    <dgm:cxn modelId="{E5F47930-4E37-4B36-BAB0-FFE81EE57773}" type="presOf" srcId="{BCB9F004-C3C1-4E3C-B6DC-F53AED53D70F}" destId="{74305B94-8BC0-473D-8661-BDDEE7828265}" srcOrd="0" destOrd="1" presId="urn:microsoft.com/office/officeart/2005/8/layout/radial2"/>
+    <dgm:cxn modelId="{D20E6C10-C2F5-401C-A743-C318FCF8EFF4}" srcId="{B12A0242-2433-4029-AD85-F814892D4ED7}" destId="{02D5456C-D591-4104-8404-435F26A9BB17}" srcOrd="2" destOrd="0" parTransId="{A63945C3-F0D5-43CF-B667-C39522337D24}" sibTransId="{99DFB1AC-2BC9-4D63-B1DC-514215A97C2B}"/>
     <dgm:cxn modelId="{A9058FB2-3894-42FD-BF49-83C1336C4889}" type="presOf" srcId="{F212D2F4-EB78-497F-8B1B-38A997446927}" destId="{4710D380-44A3-4F58-8EE1-CB03CBC8FA0F}" srcOrd="0" destOrd="0" presId="urn:microsoft.com/office/officeart/2005/8/layout/radial2"/>
-    <dgm:cxn modelId="{FB895669-8954-4DA1-BD1D-D12749C32E61}" type="presOf" srcId="{A574C59F-2016-4DAE-BAB8-5E077D6CFB59}" destId="{C4D7BBCE-5C74-4CFB-82F2-5D70E19751DC}" srcOrd="0" destOrd="0" presId="urn:microsoft.com/office/officeart/2005/8/layout/radial2"/>
-    <dgm:cxn modelId="{C71EEA8A-647C-4CD8-8CC7-B98BB98647F4}" srcId="{71A059E4-E5A2-430A-8FF1-F9398AAC2421}" destId="{20F002F5-B476-4484-BDBC-E1704CEDE259}" srcOrd="0" destOrd="0" parTransId="{F212D2F4-EB78-497F-8B1B-38A997446927}" sibTransId="{E2913B88-62F9-4A78-846D-0BE7730062B4}"/>
+    <dgm:cxn modelId="{EA72CE8A-C5C8-41BA-87EF-04FEB826049A}" type="presOf" srcId="{47D198E4-914C-4E44-AF10-28A7BFAF45B5}" destId="{2E0175CA-335B-4D47-82F8-6013A6414A49}" srcOrd="0" destOrd="0" presId="urn:microsoft.com/office/officeart/2005/8/layout/radial2"/>
+    <dgm:cxn modelId="{6F8A0B50-A415-436B-8DC0-6CAA6D2B1556}" type="presOf" srcId="{B12A0242-2433-4029-AD85-F814892D4ED7}" destId="{010887FA-6A36-4121-9EC6-0C758CF470F3}" srcOrd="0" destOrd="0" presId="urn:microsoft.com/office/officeart/2005/8/layout/radial2"/>
+    <dgm:cxn modelId="{4C1E36C0-0956-4F4E-9D09-E4FA239A7C3D}" type="presOf" srcId="{840C0A0A-6AE1-4E29-80AD-6F392FD03EDC}" destId="{23FBB8E5-36B3-4135-9571-915845BBC3FD}" srcOrd="0" destOrd="0" presId="urn:microsoft.com/office/officeart/2005/8/layout/radial2"/>
+    <dgm:cxn modelId="{41BC33BB-E23F-440D-A5BE-ABFD8C057A4F}" srcId="{71A059E4-E5A2-430A-8FF1-F9398AAC2421}" destId="{B12A0242-2433-4029-AD85-F814892D4ED7}" srcOrd="4" destOrd="0" parTransId="{B97E0F6D-775B-4977-B7A5-E38A8D0E7A89}" sibTransId="{AE6B9780-60B4-4544-9DA9-142128284F4A}"/>
+    <dgm:cxn modelId="{6E9A0419-46C3-4431-8805-4DDAB70F6854}" srcId="{EF6D1E2B-B2B3-4F87-96E5-793543E9F43F}" destId="{8BE338AF-A0A2-49A2-B73D-208347F2E462}" srcOrd="0" destOrd="0" parTransId="{11DB809F-2EB7-4961-96F3-6961A9B557E7}" sibTransId="{131C0413-A7D5-4F0E-8F4F-74CE93C16919}"/>
+    <dgm:cxn modelId="{7F93696C-17BB-4851-91C5-7D28AB1CE32C}" srcId="{610C3ACF-7A84-4679-8074-58B66812FD4D}" destId="{7CA392C3-D9E4-42CB-BFA7-B6C53B65D5C8}" srcOrd="1" destOrd="0" parTransId="{F2D76B9D-CD09-42A4-9E5D-6A8971FD1C73}" sibTransId="{D7969AA2-C3BE-4C7F-A4F8-CE1389A4E1C2}"/>
+    <dgm:cxn modelId="{FF659C51-A24E-43F9-B1DC-C00B1EB4E864}" srcId="{B12A0242-2433-4029-AD85-F814892D4ED7}" destId="{9710EA1C-7EEC-48B2-85EE-77153699644B}" srcOrd="1" destOrd="0" parTransId="{EDC0110E-5047-48D9-BE58-F954247A1EDD}" sibTransId="{88A46AF2-E5B7-44BB-85B3-6CE6A32E6047}"/>
     <dgm:cxn modelId="{816203E0-CADD-4449-B24E-2CFB9E5D85F6}" type="presOf" srcId="{D6C3B4B7-5959-4E1E-A717-8518DF6169A1}" destId="{9D418000-BCAE-40F6-976D-FDCB6DE53090}" srcOrd="0" destOrd="0" presId="urn:microsoft.com/office/officeart/2005/8/layout/radial2"/>
-    <dgm:cxn modelId="{5015904B-1809-499F-A16C-607AC91C6270}" srcId="{610C3ACF-7A84-4679-8074-58B66812FD4D}" destId="{3447004D-6F57-4FC5-96B5-C8D0B7E8FEF8}" srcOrd="2" destOrd="0" parTransId="{17DA82D2-E5BC-4776-8E2F-397C179C95DB}" sibTransId="{EEAB5E8D-5949-403C-A91C-1063EDF0B679}"/>
-    <dgm:cxn modelId="{6B96FFF0-4175-43CC-92BF-CCEE23EA3BA8}" type="presOf" srcId="{38321BEE-3435-44CB-A9D9-2959C64ECFF5}" destId="{74305B94-8BC0-473D-8661-BDDEE7828265}" srcOrd="0" destOrd="3" presId="urn:microsoft.com/office/officeart/2005/8/layout/radial2"/>
-    <dgm:cxn modelId="{0CA09654-ED5C-4373-8811-B0814340A958}" type="presOf" srcId="{7CA392C3-D9E4-42CB-BFA7-B6C53B65D5C8}" destId="{1EE562A9-3F5F-4C57-86C6-834EE5BAB1A6}" srcOrd="0" destOrd="1" presId="urn:microsoft.com/office/officeart/2005/8/layout/radial2"/>
-    <dgm:cxn modelId="{194377A2-C782-4B01-8F04-450B3B6A5EFE}" srcId="{71A059E4-E5A2-430A-8FF1-F9398AAC2421}" destId="{A574C59F-2016-4DAE-BAB8-5E077D6CFB59}" srcOrd="1" destOrd="0" parTransId="{D6C3B4B7-5959-4E1E-A717-8518DF6169A1}" sibTransId="{9035C3CA-AA9A-43BD-AF58-F729C64B63A6}"/>
-    <dgm:cxn modelId="{16A59023-B04D-4D81-8476-047ACDFDC183}" type="presOf" srcId="{158AA3B2-C4EF-4C57-8A17-99172590D02C}" destId="{3B1DF92B-4E6E-427D-9DB5-879DE876B8D7}" srcOrd="0" destOrd="0" presId="urn:microsoft.com/office/officeart/2005/8/layout/radial2"/>
-    <dgm:cxn modelId="{1D0C445A-AE10-4154-A100-0110D24B51FD}" type="presOf" srcId="{02D5456C-D591-4104-8404-435F26A9BB17}" destId="{74305B94-8BC0-473D-8661-BDDEE7828265}" srcOrd="0" destOrd="2" presId="urn:microsoft.com/office/officeart/2005/8/layout/radial2"/>
-    <dgm:cxn modelId="{547F9757-2EFC-45DF-86AC-2D49EEFF1D35}" srcId="{EF6D1E2B-B2B3-4F87-96E5-793543E9F43F}" destId="{38321BEE-3435-44CB-A9D9-2959C64ECFF5}" srcOrd="3" destOrd="0" parTransId="{53D6883F-BC2F-4CD4-B086-3BF378B79BFB}" sibTransId="{622F2370-C2AB-4D02-AD0E-3256665F50E1}"/>
-    <dgm:cxn modelId="{EA72CE8A-C5C8-41BA-87EF-04FEB826049A}" type="presOf" srcId="{47D198E4-914C-4E44-AF10-28A7BFAF45B5}" destId="{2E0175CA-335B-4D47-82F8-6013A6414A49}" srcOrd="0" destOrd="0" presId="urn:microsoft.com/office/officeart/2005/8/layout/radial2"/>
-    <dgm:cxn modelId="{C5601473-894C-4ADB-B6CE-DF4A01FF02F3}" type="presOf" srcId="{4A1E6FB0-FB70-413E-90A3-696A490812D1}" destId="{1EE562A9-3F5F-4C57-86C6-834EE5BAB1A6}" srcOrd="0" destOrd="3" presId="urn:microsoft.com/office/officeart/2005/8/layout/radial2"/>
-    <dgm:cxn modelId="{86A3B69C-8AD4-4A7F-A1DA-D7F47E1BB8A2}" srcId="{71A059E4-E5A2-430A-8FF1-F9398AAC2421}" destId="{610C3ACF-7A84-4679-8074-58B66812FD4D}" srcOrd="2" destOrd="0" parTransId="{F7B48B73-B0C4-4FA2-9AE8-15C89D3EF691}" sibTransId="{C052F008-3677-4699-979C-2DC157FD7BF6}"/>
-    <dgm:cxn modelId="{D20E6C10-C2F5-401C-A743-C318FCF8EFF4}" srcId="{EF6D1E2B-B2B3-4F87-96E5-793543E9F43F}" destId="{02D5456C-D591-4104-8404-435F26A9BB17}" srcOrd="2" destOrd="0" parTransId="{A63945C3-F0D5-43CF-B667-C39522337D24}" sibTransId="{99DFB1AC-2BC9-4D63-B1DC-514215A97C2B}"/>
-    <dgm:cxn modelId="{AE1F4FF9-ABBE-46C3-90ED-874DE46F98DF}" srcId="{EF6D1E2B-B2B3-4F87-96E5-793543E9F43F}" destId="{840C0A0A-6AE1-4E29-80AD-6F392FD03EDC}" srcOrd="0" destOrd="0" parTransId="{7985C48D-DA9C-4EF1-A976-122884D4E844}" sibTransId="{ED2ABAA5-E174-4632-BEAE-F7886E9E35F4}"/>
-    <dgm:cxn modelId="{2E15CD54-9A6B-4AF8-A9B4-F9589A7AE5DB}" srcId="{71A059E4-E5A2-430A-8FF1-F9398AAC2421}" destId="{F8233197-C2FC-4783-9446-285F150FB514}" srcOrd="4" destOrd="0" parTransId="{158AA3B2-C4EF-4C57-8A17-99172590D02C}" sibTransId="{D3BCA176-153A-4B97-8705-C871B5503455}"/>
-    <dgm:cxn modelId="{C8BA3B85-0B9F-4532-A4C4-CC4725F4CC81}" type="presOf" srcId="{71A059E4-E5A2-430A-8FF1-F9398AAC2421}" destId="{47E43A2D-9040-4B0A-897F-F7A679782C00}" srcOrd="0" destOrd="0" presId="urn:microsoft.com/office/officeart/2005/8/layout/radial2"/>
-    <dgm:cxn modelId="{5D77A46E-EFD3-4718-85A6-D3468123003D}" type="presOf" srcId="{FF281A5A-7EAD-4ECD-977A-B15E0AD51E26}" destId="{7A53C442-5E14-411A-A9BC-FCED8EE7841C}" srcOrd="0" destOrd="0" presId="urn:microsoft.com/office/officeart/2005/8/layout/radial2"/>
-    <dgm:cxn modelId="{330D25A2-8B88-4BBF-A6AD-CF1D46F8CC9F}" type="presOf" srcId="{F8233197-C2FC-4783-9446-285F150FB514}" destId="{D9F67394-CD8D-4FE3-ACC0-7377068B02C2}" srcOrd="0" destOrd="0" presId="urn:microsoft.com/office/officeart/2005/8/layout/radial2"/>
-    <dgm:cxn modelId="{6A294E1C-9844-4F25-96C9-DAB2DE4217FF}" srcId="{A574C59F-2016-4DAE-BAB8-5E077D6CFB59}" destId="{FF281A5A-7EAD-4ECD-977A-B15E0AD51E26}" srcOrd="0" destOrd="0" parTransId="{83C6B936-D586-4DA2-B039-4C8E6D50A007}" sibTransId="{86F3C38E-355D-4000-B159-F537762A0845}"/>
-    <dgm:cxn modelId="{789CFE6C-57B6-4487-93B9-240675B48381}" type="presOf" srcId="{9710EA1C-7EEC-48B2-85EE-77153699644B}" destId="{74305B94-8BC0-473D-8661-BDDEE7828265}" srcOrd="0" destOrd="1" presId="urn:microsoft.com/office/officeart/2005/8/layout/radial2"/>
+    <dgm:cxn modelId="{AE1F4FF9-ABBE-46C3-90ED-874DE46F98DF}" srcId="{B12A0242-2433-4029-AD85-F814892D4ED7}" destId="{840C0A0A-6AE1-4E29-80AD-6F392FD03EDC}" srcOrd="0" destOrd="0" parTransId="{7985C48D-DA9C-4EF1-A976-122884D4E844}" sibTransId="{ED2ABAA5-E174-4632-BEAE-F7886E9E35F4}"/>
     <dgm:cxn modelId="{6AEAEC09-C593-4505-BA75-DFF6033DAE79}" type="presParOf" srcId="{47E43A2D-9040-4B0A-897F-F7A679782C00}" destId="{13265ED7-7B77-4F07-918F-876EDE483898}" srcOrd="0" destOrd="0" presId="urn:microsoft.com/office/officeart/2005/8/layout/radial2"/>
     <dgm:cxn modelId="{DDEE6314-7CDD-4DBD-A674-421050B30DA1}" type="presParOf" srcId="{13265ED7-7B77-4F07-918F-876EDE483898}" destId="{78D1608B-1DF8-40F7-9027-360B5A0F0188}" srcOrd="0" destOrd="0" presId="urn:microsoft.com/office/officeart/2005/8/layout/radial2"/>
     <dgm:cxn modelId="{94972ED1-3E2F-4BF2-9BA4-63E5359616DD}" type="presParOf" srcId="{78D1608B-1DF8-40F7-9027-360B5A0F0188}" destId="{D2A9ED7B-3DCF-4AD2-8ABF-C239829B62D1}" srcOrd="0" destOrd="0" presId="urn:microsoft.com/office/officeart/2005/8/layout/radial2"/>
@@ -1926,10 +2059,10 @@
     <dgm:cxn modelId="{10519247-D5F0-47F1-89F5-A4F9B21CA51B}" type="presParOf" srcId="{13265ED7-7B77-4F07-918F-876EDE483898}" destId="{D29506FF-8378-4EA0-B1D8-7D67CBB9CA80}" srcOrd="8" destOrd="0" presId="urn:microsoft.com/office/officeart/2005/8/layout/radial2"/>
     <dgm:cxn modelId="{F5A41797-C6CD-4FEF-914B-B8020D9DD881}" type="presParOf" srcId="{D29506FF-8378-4EA0-B1D8-7D67CBB9CA80}" destId="{2B38D02F-7CB3-4561-9A8D-9A0B5265137D}" srcOrd="0" destOrd="0" presId="urn:microsoft.com/office/officeart/2005/8/layout/radial2"/>
     <dgm:cxn modelId="{FA5C670E-25F6-4ED0-A06F-57675E8BD7FD}" type="presParOf" srcId="{D29506FF-8378-4EA0-B1D8-7D67CBB9CA80}" destId="{74305B94-8BC0-473D-8661-BDDEE7828265}" srcOrd="1" destOrd="0" presId="urn:microsoft.com/office/officeart/2005/8/layout/radial2"/>
-    <dgm:cxn modelId="{B8446353-275C-456A-AAC6-F6B4EC490080}" type="presParOf" srcId="{13265ED7-7B77-4F07-918F-876EDE483898}" destId="{3B1DF92B-4E6E-427D-9DB5-879DE876B8D7}" srcOrd="9" destOrd="0" presId="urn:microsoft.com/office/officeart/2005/8/layout/radial2"/>
-    <dgm:cxn modelId="{ACB6BD50-874C-4056-B0B4-C0ED51DD3F75}" type="presParOf" srcId="{13265ED7-7B77-4F07-918F-876EDE483898}" destId="{C02D39A7-792C-4CED-B1BD-03AB0E24F870}" srcOrd="10" destOrd="0" presId="urn:microsoft.com/office/officeart/2005/8/layout/radial2"/>
-    <dgm:cxn modelId="{B43395C1-35DE-4193-B9CB-ECB0E7F32C3D}" type="presParOf" srcId="{C02D39A7-792C-4CED-B1BD-03AB0E24F870}" destId="{D9F67394-CD8D-4FE3-ACC0-7377068B02C2}" srcOrd="0" destOrd="0" presId="urn:microsoft.com/office/officeart/2005/8/layout/radial2"/>
-    <dgm:cxn modelId="{F8F27AFC-D21F-4DE8-9B26-14AB85AA1640}" type="presParOf" srcId="{C02D39A7-792C-4CED-B1BD-03AB0E24F870}" destId="{72F58B4E-31CF-4984-A07A-C3A89FBA15C5}" srcOrd="1" destOrd="0" presId="urn:microsoft.com/office/officeart/2005/8/layout/radial2"/>
+    <dgm:cxn modelId="{B3F22996-3075-4EBE-BA1B-8BE5B71B7306}" type="presParOf" srcId="{13265ED7-7B77-4F07-918F-876EDE483898}" destId="{3974FB75-4CDA-4D57-8076-3F4705871C5D}" srcOrd="9" destOrd="0" presId="urn:microsoft.com/office/officeart/2005/8/layout/radial2"/>
+    <dgm:cxn modelId="{50D61FBD-9E85-4C59-8395-356203F3619E}" type="presParOf" srcId="{13265ED7-7B77-4F07-918F-876EDE483898}" destId="{6082B012-A7E4-4AE5-A9D5-1A8B4106AFBA}" srcOrd="10" destOrd="0" presId="urn:microsoft.com/office/officeart/2005/8/layout/radial2"/>
+    <dgm:cxn modelId="{7AB24AC8-B261-4262-A187-94BFD0154C27}" type="presParOf" srcId="{6082B012-A7E4-4AE5-A9D5-1A8B4106AFBA}" destId="{010887FA-6A36-4121-9EC6-0C758CF470F3}" srcOrd="0" destOrd="0" presId="urn:microsoft.com/office/officeart/2005/8/layout/radial2"/>
+    <dgm:cxn modelId="{85095BA1-4C19-48BB-9BAC-BD477032C81F}" type="presParOf" srcId="{6082B012-A7E4-4AE5-A9D5-1A8B4106AFBA}" destId="{23FBB8E5-36B3-4135-9571-915845BBC3FD}" srcOrd="1" destOrd="0" presId="urn:microsoft.com/office/officeart/2005/8/layout/radial2"/>
   </dgm:cxnLst>
   <dgm:bg/>
   <dgm:whole/>
@@ -1949,15 +2082,15 @@
       <dsp:cNvGrpSpPr/>
     </dsp:nvGrpSpPr>
     <dsp:grpSpPr/>
-    <dsp:sp modelId="{3B1DF92B-4E6E-427D-9DB5-879DE876B8D7}">
+    <dsp:sp modelId="{3974FB75-4CDA-4D57-8076-3F4705871C5D}">
       <dsp:nvSpPr>
         <dsp:cNvPr id="0" name=""/>
         <dsp:cNvSpPr/>
       </dsp:nvSpPr>
       <dsp:spPr>
-        <a:xfrm rot="7091704">
-          <a:off x="736607" y="3612075"/>
-          <a:ext cx="920892" cy="40297"/>
+        <a:xfrm rot="3971614">
+          <a:off x="1656655" y="3647033"/>
+          <a:ext cx="963521" cy="40297"/>
         </a:xfrm>
         <a:custGeom>
           <a:avLst/>
@@ -1971,7 +2104,7 @@
                 <a:pt x="0" y="20148"/>
               </a:moveTo>
               <a:lnTo>
-                <a:pt x="920892" y="20148"/>
+                <a:pt x="963521" y="20148"/>
               </a:lnTo>
             </a:path>
           </a:pathLst>
@@ -2009,9 +2142,9 @@
         <dsp:cNvSpPr/>
       </dsp:nvSpPr>
       <dsp:spPr>
-        <a:xfrm rot="3155980">
-          <a:off x="1931612" y="3585654"/>
-          <a:ext cx="955150" cy="40297"/>
+        <a:xfrm rot="1072179">
+          <a:off x="2228190" y="2956605"/>
+          <a:ext cx="764989" cy="40297"/>
         </a:xfrm>
         <a:custGeom>
           <a:avLst/>
@@ -2025,7 +2158,7 @@
                 <a:pt x="0" y="20148"/>
               </a:moveTo>
               <a:lnTo>
-                <a:pt x="955150" y="20148"/>
+                <a:pt x="764989" y="20148"/>
               </a:lnTo>
             </a:path>
           </a:pathLst>
@@ -2063,9 +2196,9 @@
         <dsp:cNvSpPr/>
       </dsp:nvSpPr>
       <dsp:spPr>
-        <a:xfrm>
-          <a:off x="2246642" y="2664600"/>
-          <a:ext cx="1430915" cy="40297"/>
+        <a:xfrm rot="20544919">
+          <a:off x="2207636" y="2240745"/>
+          <a:ext cx="1669490" cy="40297"/>
         </a:xfrm>
         <a:custGeom>
           <a:avLst/>
@@ -2079,7 +2212,7 @@
                 <a:pt x="0" y="20148"/>
               </a:moveTo>
               <a:lnTo>
-                <a:pt x="1430915" y="20148"/>
+                <a:pt x="1669490" y="20148"/>
               </a:lnTo>
             </a:path>
           </a:pathLst>
@@ -2117,9 +2250,9 @@
         <dsp:cNvSpPr/>
       </dsp:nvSpPr>
       <dsp:spPr>
-        <a:xfrm rot="18181973">
-          <a:off x="1861679" y="1762620"/>
-          <a:ext cx="859577" cy="40297"/>
+        <a:xfrm rot="17752077">
+          <a:off x="1674118" y="1654434"/>
+          <a:ext cx="1041346" cy="40297"/>
         </a:xfrm>
         <a:custGeom>
           <a:avLst/>
@@ -2133,7 +2266,7 @@
                 <a:pt x="0" y="20148"/>
               </a:moveTo>
               <a:lnTo>
-                <a:pt x="859577" y="20148"/>
+                <a:pt x="1041346" y="20148"/>
               </a:lnTo>
             </a:path>
           </a:pathLst>
@@ -2171,9 +2304,9 @@
         <dsp:cNvSpPr/>
       </dsp:nvSpPr>
       <dsp:spPr>
-        <a:xfrm rot="14792263">
-          <a:off x="902112" y="1750423"/>
-          <a:ext cx="812175" cy="40297"/>
+        <a:xfrm rot="14839394">
+          <a:off x="1062612" y="1845873"/>
+          <a:ext cx="600552" cy="40297"/>
         </a:xfrm>
         <a:custGeom>
           <a:avLst/>
@@ -2187,7 +2320,7 @@
                 <a:pt x="0" y="20148"/>
               </a:moveTo>
               <a:lnTo>
-                <a:pt x="812175" y="20148"/>
+                <a:pt x="600552" y="20148"/>
               </a:lnTo>
             </a:path>
           </a:pathLst>
@@ -2275,7 +2408,7 @@
       </dsp:nvSpPr>
       <dsp:spPr>
         <a:xfrm>
-          <a:off x="540866" y="567510"/>
+          <a:off x="646935" y="756083"/>
           <a:ext cx="866363" cy="866363"/>
         </a:xfrm>
         <a:prstGeom prst="ellipse">
@@ -2341,7 +2474,7 @@
         </a:p>
       </dsp:txBody>
       <dsp:txXfrm>
-        <a:off x="667742" y="694386"/>
+        <a:off x="773811" y="882959"/>
         <a:ext cx="612611" cy="612611"/>
       </dsp:txXfrm>
     </dsp:sp>
@@ -2352,7 +2485,7 @@
       </dsp:nvSpPr>
       <dsp:spPr>
         <a:xfrm>
-          <a:off x="2314562" y="568934"/>
+          <a:off x="2160243" y="324034"/>
           <a:ext cx="928565" cy="928565"/>
         </a:xfrm>
         <a:prstGeom prst="ellipse">
@@ -2418,7 +2551,7 @@
         </a:p>
       </dsp:txBody>
       <dsp:txXfrm>
-        <a:off x="2450547" y="704919"/>
+        <a:off x="2296228" y="460019"/>
         <a:ext cx="656595" cy="656595"/>
       </dsp:txXfrm>
     </dsp:sp>
@@ -2429,7 +2562,7 @@
       </dsp:nvSpPr>
       <dsp:spPr>
         <a:xfrm>
-          <a:off x="3335984" y="568934"/>
+          <a:off x="3181665" y="324034"/>
           <a:ext cx="1392848" cy="928565"/>
         </a:xfrm>
         <a:prstGeom prst="rect">
@@ -2491,7 +2624,7 @@
         </a:p>
       </dsp:txBody>
       <dsp:txXfrm>
-        <a:off x="3335984" y="568934"/>
+        <a:off x="3181665" y="324034"/>
         <a:ext cx="1392848" cy="928565"/>
       </dsp:txXfrm>
     </dsp:sp>
@@ -2502,7 +2635,7 @@
       </dsp:nvSpPr>
       <dsp:spPr>
         <a:xfrm>
-          <a:off x="3677558" y="2220466"/>
+          <a:off x="3816425" y="1404155"/>
           <a:ext cx="928565" cy="928565"/>
         </a:xfrm>
         <a:prstGeom prst="ellipse">
@@ -2568,7 +2701,7 @@
         </a:p>
       </dsp:txBody>
       <dsp:txXfrm>
-        <a:off x="3813543" y="2356451"/>
+        <a:off x="3952410" y="1540140"/>
         <a:ext cx="656595" cy="656595"/>
       </dsp:txXfrm>
     </dsp:sp>
@@ -2579,7 +2712,7 @@
       </dsp:nvSpPr>
       <dsp:spPr>
         <a:xfrm>
-          <a:off x="4698980" y="2220466"/>
+          <a:off x="4837847" y="1404155"/>
           <a:ext cx="1392848" cy="928565"/>
         </a:xfrm>
         <a:prstGeom prst="rect">
@@ -2734,7 +2867,7 @@
         </a:p>
       </dsp:txBody>
       <dsp:txXfrm>
-        <a:off x="4698980" y="2220466"/>
+        <a:off x="4837847" y="1404155"/>
         <a:ext cx="1392848" cy="928565"/>
       </dsp:txXfrm>
     </dsp:sp>
@@ -2745,7 +2878,7 @@
       </dsp:nvSpPr>
       <dsp:spPr>
         <a:xfrm>
-          <a:off x="2516970" y="3889743"/>
+          <a:off x="2952328" y="2772307"/>
           <a:ext cx="928565" cy="928565"/>
         </a:xfrm>
         <a:prstGeom prst="ellipse">
@@ -2804,14 +2937,14 @@
             </a:spcAft>
           </a:pPr>
           <a:r>
-            <a:rPr lang="en-US" sz="1000" kern="1200" dirty="0" smtClean="0"/>
-            <a:t>Service Location</a:t>
+            <a:rPr lang="en-US" sz="1000" kern="1200" smtClean="0"/>
+            <a:t>Testing</a:t>
           </a:r>
           <a:endParaRPr lang="en-GB" sz="1000" kern="1200" dirty="0"/>
         </a:p>
       </dsp:txBody>
       <dsp:txXfrm>
-        <a:off x="2652955" y="4025728"/>
+        <a:off x="3088313" y="2908292"/>
         <a:ext cx="656595" cy="656595"/>
       </dsp:txXfrm>
     </dsp:sp>
@@ -2822,7 +2955,7 @@
       </dsp:nvSpPr>
       <dsp:spPr>
         <a:xfrm>
-          <a:off x="3538393" y="3889743"/>
+          <a:off x="3973751" y="2772307"/>
           <a:ext cx="1392848" cy="928565"/>
         </a:xfrm>
         <a:prstGeom prst="rect">
@@ -2865,20 +2998,16 @@
             <a:buChar char="••"/>
           </a:pPr>
           <a:r>
-            <a:rPr lang="en-US" sz="1000" b="0" kern="1200" dirty="0" err="1" smtClean="0">
+            <a:rPr lang="en-US" sz="1000" kern="1200" dirty="0" smtClean="0">
               <a:solidFill>
-                <a:schemeClr val="accent5">
-                  <a:lumMod val="75000"/>
-                </a:schemeClr>
+                <a:schemeClr val="accent5"/>
               </a:solidFill>
             </a:rPr>
-            <a:t>Autofac</a:t>
+            <a:t>HTTP</a:t>
           </a:r>
-          <a:endParaRPr lang="en-GB" sz="1000" b="0" kern="1200" dirty="0">
+          <a:endParaRPr lang="en-GB" sz="1000" kern="1200" dirty="0">
             <a:solidFill>
-              <a:schemeClr val="accent5">
-                <a:lumMod val="75000"/>
-              </a:schemeClr>
+              <a:schemeClr val="accent5"/>
             </a:solidFill>
           </a:endParaRPr>
         </a:p>
@@ -2896,20 +3025,16 @@
             <a:buChar char="••"/>
           </a:pPr>
           <a:r>
-            <a:rPr lang="en-US" sz="1000" b="0" kern="1200" smtClean="0">
+            <a:rPr lang="en-US" sz="1000" kern="1200" dirty="0" smtClean="0">
               <a:solidFill>
-                <a:schemeClr val="accent5">
-                  <a:lumMod val="75000"/>
-                </a:schemeClr>
+                <a:schemeClr val="accent5"/>
               </a:solidFill>
             </a:rPr>
-            <a:t>Castle Windsor</a:t>
+            <a:t>Repository</a:t>
           </a:r>
-          <a:endParaRPr lang="en-GB" sz="1000" b="0" kern="1200" dirty="0">
+          <a:endParaRPr lang="en-GB" sz="1000" kern="1200" dirty="0">
             <a:solidFill>
-              <a:schemeClr val="accent5">
-                <a:lumMod val="75000"/>
-              </a:schemeClr>
+              <a:schemeClr val="accent5"/>
             </a:solidFill>
           </a:endParaRPr>
         </a:p>
@@ -2927,68 +3052,33 @@
             <a:buChar char="••"/>
           </a:pPr>
           <a:r>
-            <a:rPr lang="en-US" sz="1000" b="0" kern="1200" smtClean="0">
+            <a:rPr lang="en-US" sz="1000" kern="1200" dirty="0" smtClean="0">
               <a:solidFill>
-                <a:schemeClr val="accent5">
-                  <a:lumMod val="75000"/>
-                </a:schemeClr>
+                <a:schemeClr val="accent5"/>
               </a:solidFill>
             </a:rPr>
-            <a:t>StructureMap</a:t>
+            <a:t>Unit</a:t>
           </a:r>
-          <a:endParaRPr lang="en-GB" sz="1000" b="0" kern="1200" dirty="0">
+          <a:endParaRPr lang="en-GB" sz="1000" kern="1200" dirty="0">
             <a:solidFill>
-              <a:schemeClr val="accent5">
-                <a:lumMod val="75000"/>
-              </a:schemeClr>
+              <a:schemeClr val="accent5"/>
             </a:solidFill>
           </a:endParaRPr>
         </a:p>
-        <a:p>
-          <a:pPr marL="57150" lvl="1" indent="-57150" algn="l" defTabSz="444500" rtl="0">
-            <a:lnSpc>
-              <a:spcPct val="90000"/>
-            </a:lnSpc>
-            <a:spcBef>
-              <a:spcPct val="0"/>
-            </a:spcBef>
-            <a:spcAft>
-              <a:spcPct val="15000"/>
-            </a:spcAft>
-            <a:buChar char="••"/>
-          </a:pPr>
-          <a:r>
-            <a:rPr lang="en-US" sz="1000" b="0" kern="1200" smtClean="0">
-              <a:solidFill>
-                <a:schemeClr val="accent5">
-                  <a:lumMod val="75000"/>
-                </a:schemeClr>
-              </a:solidFill>
-            </a:rPr>
-            <a:t>Unity</a:t>
-          </a:r>
-          <a:endParaRPr lang="en-GB" sz="1000" b="0" kern="1200" dirty="0">
-            <a:solidFill>
-              <a:schemeClr val="accent5">
-                <a:lumMod val="75000"/>
-              </a:schemeClr>
-            </a:solidFill>
-          </a:endParaRPr>
-        </a:p>
       </dsp:txBody>
       <dsp:txXfrm>
-        <a:off x="3538393" y="3889743"/>
+        <a:off x="3973751" y="2772307"/>
         <a:ext cx="1392848" cy="928565"/>
       </dsp:txXfrm>
     </dsp:sp>
-    <dsp:sp modelId="{D9F67394-CD8D-4FE3-ACC0-7377068B02C2}">
+    <dsp:sp modelId="{010887FA-6A36-4121-9EC6-0C758CF470F3}">
       <dsp:nvSpPr>
         <dsp:cNvPr id="0" name=""/>
         <dsp:cNvSpPr/>
       </dsp:nvSpPr>
       <dsp:spPr>
         <a:xfrm>
-          <a:off x="295859" y="3982945"/>
+          <a:off x="2056001" y="4068448"/>
           <a:ext cx="928565" cy="928565"/>
         </a:xfrm>
         <a:prstGeom prst="ellipse">
@@ -3035,7 +3125,7 @@
         </a:bodyPr>
         <a:lstStyle/>
         <a:p>
-          <a:pPr lvl="0" algn="ctr" defTabSz="444500" rtl="0">
+          <a:pPr lvl="0" algn="ctr" defTabSz="444500">
             <a:lnSpc>
               <a:spcPct val="90000"/>
             </a:lnSpc>
@@ -3047,15 +3137,185 @@
             </a:spcAft>
           </a:pPr>
           <a:r>
+            <a:rPr lang="en-US" sz="1000" kern="1200" smtClean="0"/>
+            <a:t>Service </a:t>
+          </a:r>
+          <a:r>
             <a:rPr lang="en-US" sz="1000" kern="1200" dirty="0" smtClean="0"/>
-            <a:t>Unit Testing</a:t>
+            <a:t>Location</a:t>
           </a:r>
-          <a:endParaRPr lang="en-GB" sz="1000" kern="1200" dirty="0"/>
+          <a:endParaRPr lang="en-GB" sz="1000" kern="1200"/>
         </a:p>
       </dsp:txBody>
       <dsp:txXfrm>
-        <a:off x="431844" y="4118930"/>
+        <a:off x="2191986" y="4204433"/>
         <a:ext cx="656595" cy="656595"/>
+      </dsp:txXfrm>
+    </dsp:sp>
+    <dsp:sp modelId="{23FBB8E5-36B3-4135-9571-915845BBC3FD}">
+      <dsp:nvSpPr>
+        <dsp:cNvPr id="0" name=""/>
+        <dsp:cNvSpPr/>
+      </dsp:nvSpPr>
+      <dsp:spPr>
+        <a:xfrm>
+          <a:off x="3077424" y="4068448"/>
+          <a:ext cx="1392848" cy="928565"/>
+        </a:xfrm>
+        <a:prstGeom prst="rect">
+          <a:avLst/>
+        </a:prstGeom>
+        <a:noFill/>
+        <a:ln>
+          <a:noFill/>
+        </a:ln>
+        <a:effectLst/>
+      </dsp:spPr>
+      <dsp:style>
+        <a:lnRef idx="0">
+          <a:scrgbClr r="0" g="0" b="0"/>
+        </a:lnRef>
+        <a:fillRef idx="0">
+          <a:scrgbClr r="0" g="0" b="0"/>
+        </a:fillRef>
+        <a:effectRef idx="0">
+          <a:scrgbClr r="0" g="0" b="0"/>
+        </a:effectRef>
+        <a:fontRef idx="minor"/>
+      </dsp:style>
+      <dsp:txBody>
+        <a:bodyPr spcFirstLastPara="0" vert="horz" wrap="square" lIns="0" tIns="0" rIns="0" bIns="0" numCol="1" spcCol="1270" anchor="ctr" anchorCtr="0">
+          <a:noAutofit/>
+        </a:bodyPr>
+        <a:lstStyle/>
+        <a:p>
+          <a:pPr marL="57150" lvl="1" indent="-57150" algn="l" defTabSz="444500" rtl="0">
+            <a:lnSpc>
+              <a:spcPct val="90000"/>
+            </a:lnSpc>
+            <a:spcBef>
+              <a:spcPct val="0"/>
+            </a:spcBef>
+            <a:spcAft>
+              <a:spcPct val="15000"/>
+            </a:spcAft>
+            <a:buChar char="••"/>
+          </a:pPr>
+          <a:r>
+            <a:rPr lang="en-US" sz="1000" b="0" kern="1200" dirty="0" err="1" smtClean="0">
+              <a:solidFill>
+                <a:schemeClr val="accent5">
+                  <a:lumMod val="75000"/>
+                </a:schemeClr>
+              </a:solidFill>
+            </a:rPr>
+            <a:t>Autofac</a:t>
+          </a:r>
+          <a:endParaRPr lang="en-GB" sz="1000" b="0" kern="1200" dirty="0">
+            <a:solidFill>
+              <a:schemeClr val="accent5">
+                <a:lumMod val="75000"/>
+              </a:schemeClr>
+            </a:solidFill>
+          </a:endParaRPr>
+        </a:p>
+        <a:p>
+          <a:pPr marL="57150" lvl="1" indent="-57150" algn="l" defTabSz="444500" rtl="0">
+            <a:lnSpc>
+              <a:spcPct val="90000"/>
+            </a:lnSpc>
+            <a:spcBef>
+              <a:spcPct val="0"/>
+            </a:spcBef>
+            <a:spcAft>
+              <a:spcPct val="15000"/>
+            </a:spcAft>
+            <a:buChar char="••"/>
+          </a:pPr>
+          <a:r>
+            <a:rPr lang="en-US" sz="1000" b="0" kern="1200" smtClean="0">
+              <a:solidFill>
+                <a:schemeClr val="accent5">
+                  <a:lumMod val="75000"/>
+                </a:schemeClr>
+              </a:solidFill>
+            </a:rPr>
+            <a:t>Castle Windsor</a:t>
+          </a:r>
+          <a:endParaRPr lang="en-GB" sz="1000" b="0" kern="1200" dirty="0">
+            <a:solidFill>
+              <a:schemeClr val="accent5">
+                <a:lumMod val="75000"/>
+              </a:schemeClr>
+            </a:solidFill>
+          </a:endParaRPr>
+        </a:p>
+        <a:p>
+          <a:pPr marL="57150" lvl="1" indent="-57150" algn="l" defTabSz="444500" rtl="0">
+            <a:lnSpc>
+              <a:spcPct val="90000"/>
+            </a:lnSpc>
+            <a:spcBef>
+              <a:spcPct val="0"/>
+            </a:spcBef>
+            <a:spcAft>
+              <a:spcPct val="15000"/>
+            </a:spcAft>
+            <a:buChar char="••"/>
+          </a:pPr>
+          <a:r>
+            <a:rPr lang="en-US" sz="1000" b="0" kern="1200" dirty="0" err="1" smtClean="0">
+              <a:solidFill>
+                <a:schemeClr val="accent5">
+                  <a:lumMod val="75000"/>
+                </a:schemeClr>
+              </a:solidFill>
+            </a:rPr>
+            <a:t>StructureMap</a:t>
+          </a:r>
+          <a:endParaRPr lang="en-GB" sz="1000" b="0" kern="1200" dirty="0">
+            <a:solidFill>
+              <a:schemeClr val="accent5">
+                <a:lumMod val="75000"/>
+              </a:schemeClr>
+            </a:solidFill>
+          </a:endParaRPr>
+        </a:p>
+        <a:p>
+          <a:pPr marL="57150" lvl="1" indent="-57150" algn="l" defTabSz="444500" rtl="0">
+            <a:lnSpc>
+              <a:spcPct val="90000"/>
+            </a:lnSpc>
+            <a:spcBef>
+              <a:spcPct val="0"/>
+            </a:spcBef>
+            <a:spcAft>
+              <a:spcPct val="15000"/>
+            </a:spcAft>
+            <a:buChar char="••"/>
+          </a:pPr>
+          <a:r>
+            <a:rPr lang="en-US" sz="1000" b="0" kern="1200" dirty="0" smtClean="0">
+              <a:solidFill>
+                <a:schemeClr val="accent5">
+                  <a:lumMod val="75000"/>
+                </a:schemeClr>
+              </a:solidFill>
+            </a:rPr>
+            <a:t>Unity</a:t>
+          </a:r>
+          <a:endParaRPr lang="en-GB" sz="1000" b="0" kern="1200" dirty="0">
+            <a:solidFill>
+              <a:schemeClr val="accent5">
+                <a:lumMod val="75000"/>
+              </a:schemeClr>
+            </a:solidFill>
+          </a:endParaRPr>
+        </a:p>
+      </dsp:txBody>
+      <dsp:txXfrm>
+        <a:off x="3077424" y="4068448"/>
+        <a:ext cx="1392848" cy="928565"/>
       </dsp:txXfrm>
     </dsp:sp>
   </dsp:spTree>
@@ -7436,13 +7696,13 @@
           <p:nvPr>
             <p:extLst>
               <p:ext uri="{D42A27DB-BD31-4B8C-83A1-F6EECF244321}">
-                <p14:modId xmlns:p14="http://schemas.microsoft.com/office/powerpoint/2010/main" val="1421627469"/>
+                <p14:modId xmlns:p14="http://schemas.microsoft.com/office/powerpoint/2010/main" val="4215175192"/>
               </p:ext>
             </p:extLst>
           </p:nvPr>
         </p:nvGraphicFramePr>
         <p:xfrm>
-          <a:off x="1691680" y="836712"/>
+          <a:off x="1619672" y="440668"/>
           <a:ext cx="6912768" cy="5400600"/>
         </p:xfrm>
         <a:graphic>
@@ -7459,7 +7719,7 @@
         </p:nvSpPr>
         <p:spPr>
           <a:xfrm>
-            <a:off x="2699792" y="3140968"/>
+            <a:off x="2627784" y="2793122"/>
             <a:ext cx="1440160" cy="707886"/>
           </a:xfrm>
           <a:prstGeom prst="rect">

</xml_diff>

<commit_message>
Pulling Transactions code into it's own library.
</commit_message>
<xml_diff>
--- a/src/Diagrams/Packages.pptx
+++ b/src/Diagrams/Packages.pptx
@@ -1769,7 +1769,7 @@
       </dgm:t>
     </dgm:pt>
     <dgm:pt modelId="{BCAD45A3-2659-426E-A577-6BB66BA2921F}" type="pres">
-      <dgm:prSet presAssocID="{20F002F5-B476-4484-BDBC-E1704CEDE259}" presName="parentNode" presStyleLbl="node1" presStyleIdx="1" presStyleCnt="6" custLinFactX="-100000" custLinFactNeighborX="-151646" custLinFactNeighborY="86905">
+      <dgm:prSet presAssocID="{20F002F5-B476-4484-BDBC-E1704CEDE259}" presName="parentNode" presStyleLbl="node1" presStyleIdx="1" presStyleCnt="6" custScaleX="66491" custScaleY="66485" custLinFactX="-100000" custLinFactNeighborX="-151646" custLinFactNeighborY="86905">
         <dgm:presLayoutVars>
           <dgm:chMax val="1"/>
           <dgm:bulletEnabled val="1"/>
@@ -1875,7 +1875,7 @@
       </dgm:t>
     </dgm:pt>
     <dgm:pt modelId="{0FEF36F9-A68C-4708-8960-E6CEE6145183}" type="pres">
-      <dgm:prSet presAssocID="{610C3ACF-7A84-4679-8074-58B66812FD4D}" presName="parentNode" presStyleLbl="node1" presStyleIdx="3" presStyleCnt="6" custLinFactNeighborX="14955" custLinFactNeighborY="-87911">
+      <dgm:prSet presAssocID="{610C3ACF-7A84-4679-8074-58B66812FD4D}" presName="parentNode" presStyleLbl="node1" presStyleIdx="3" presStyleCnt="6" custScaleX="55095" custScaleY="56884" custLinFactNeighborX="14955" custLinFactNeighborY="-87911">
         <dgm:presLayoutVars>
           <dgm:chMax val="1"/>
           <dgm:bulletEnabled val="1"/>
@@ -1928,7 +1928,7 @@
       </dgm:t>
     </dgm:pt>
     <dgm:pt modelId="{2B38D02F-7CB3-4561-9A8D-9A0B5265137D}" type="pres">
-      <dgm:prSet presAssocID="{EF6D1E2B-B2B3-4F87-96E5-793543E9F43F}" presName="parentNode" presStyleLbl="node1" presStyleIdx="4" presStyleCnt="6" custLinFactNeighborX="-52036" custLinFactNeighborY="-71614">
+      <dgm:prSet presAssocID="{EF6D1E2B-B2B3-4F87-96E5-793543E9F43F}" presName="parentNode" presStyleLbl="node1" presStyleIdx="4" presStyleCnt="6" custAng="0" custScaleX="77557" custScaleY="77539" custLinFactNeighborX="-73107" custLinFactNeighborY="-71243">
         <dgm:presLayoutVars>
           <dgm:chMax val="1"/>
           <dgm:bulletEnabled val="1"/>
@@ -1961,13 +1961,20 @@
     <dgm:pt modelId="{3974FB75-4CDA-4D57-8076-3F4705871C5D}" type="pres">
       <dgm:prSet presAssocID="{B97E0F6D-775B-4977-B7A5-E38A8D0E7A89}" presName="Name25" presStyleLbl="parChTrans1D1" presStyleIdx="4" presStyleCnt="5"/>
       <dgm:spPr/>
+      <dgm:t>
+        <a:bodyPr/>
+        <a:lstStyle/>
+        <a:p>
+          <a:endParaRPr lang="en-GB"/>
+        </a:p>
+      </dgm:t>
     </dgm:pt>
     <dgm:pt modelId="{6082B012-A7E4-4AE5-A9D5-1A8B4106AFBA}" type="pres">
       <dgm:prSet presAssocID="{B12A0242-2433-4029-AD85-F814892D4ED7}" presName="node" presStyleCnt="0"/>
       <dgm:spPr/>
     </dgm:pt>
     <dgm:pt modelId="{010887FA-6A36-4121-9EC6-0C758CF470F3}" type="pres">
-      <dgm:prSet presAssocID="{B12A0242-2433-4029-AD85-F814892D4ED7}" presName="parentNode" presStyleLbl="node1" presStyleIdx="5" presStyleCnt="6" custLinFactNeighborX="-74334" custLinFactNeighborY="-43122">
+      <dgm:prSet presAssocID="{B12A0242-2433-4029-AD85-F814892D4ED7}" presName="parentNode" presStyleLbl="node1" presStyleIdx="5" presStyleCnt="6" custScaleX="77539" custScaleY="77539" custLinFactNeighborX="-74334" custLinFactNeighborY="-43122">
         <dgm:presLayoutVars>
           <dgm:chMax val="1"/>
           <dgm:bulletEnabled val="1"/>
@@ -1999,46 +2006,46 @@
     </dgm:pt>
   </dgm:ptLst>
   <dgm:cxnLst>
+    <dgm:cxn modelId="{BFB71832-B626-4BD4-930E-6298F29305F7}" srcId="{EF6D1E2B-B2B3-4F87-96E5-793543E9F43F}" destId="{BCB9F004-C3C1-4E3C-B6DC-F53AED53D70F}" srcOrd="1" destOrd="0" parTransId="{AD83EFF9-B013-4BCC-B483-FE01B01C3E6B}" sibTransId="{41F0EEEF-BEFB-4ACC-8523-DDB7A6262922}"/>
+    <dgm:cxn modelId="{5154F922-021F-41AF-8011-43108DCD62B2}" type="presOf" srcId="{F7B48B73-B0C4-4FA2-9AE8-15C89D3EF691}" destId="{76BA4605-796D-4AD3-BDA5-823550D2F212}" srcOrd="0" destOrd="0" presId="urn:microsoft.com/office/officeart/2005/8/layout/radial2"/>
+    <dgm:cxn modelId="{56AA2936-F13F-4B1F-B9A5-3D296282E55A}" srcId="{610C3ACF-7A84-4679-8074-58B66812FD4D}" destId="{028A59AA-CBFB-4127-BC76-D50D05DBFC5F}" srcOrd="0" destOrd="0" parTransId="{ABA3AA92-80FE-4BCA-A89A-496F04FA573D}" sibTransId="{FD4F982F-BC8D-4D68-AC6D-58F77D5DCBEC}"/>
+    <dgm:cxn modelId="{A193B033-718C-4392-83A3-665E39317F4D}" type="presOf" srcId="{20F002F5-B476-4484-BDBC-E1704CEDE259}" destId="{BCAD45A3-2659-426E-A577-6BB66BA2921F}" srcOrd="0" destOrd="0" presId="urn:microsoft.com/office/officeart/2005/8/layout/radial2"/>
+    <dgm:cxn modelId="{7F93696C-17BB-4851-91C5-7D28AB1CE32C}" srcId="{610C3ACF-7A84-4679-8074-58B66812FD4D}" destId="{7CA392C3-D9E4-42CB-BFA7-B6C53B65D5C8}" srcOrd="1" destOrd="0" parTransId="{F2D76B9D-CD09-42A4-9E5D-6A8971FD1C73}" sibTransId="{D7969AA2-C3BE-4C7F-A4F8-CE1389A4E1C2}"/>
+    <dgm:cxn modelId="{8C536857-3E0E-4E86-B0E3-B3EAB2AA9B83}" srcId="{EF6D1E2B-B2B3-4F87-96E5-793543E9F43F}" destId="{31215E46-ABA6-4BAA-8553-A65AE7DF7913}" srcOrd="2" destOrd="0" parTransId="{1727AB60-245E-49D8-9A57-D19FC51E6349}" sibTransId="{584E1165-2406-4A31-A354-D0676125101D}"/>
+    <dgm:cxn modelId="{510B8A85-67F9-4FF6-A67B-12E7331B24DC}" type="presOf" srcId="{028A59AA-CBFB-4127-BC76-D50D05DBFC5F}" destId="{1EE562A9-3F5F-4C57-86C6-834EE5BAB1A6}" srcOrd="0" destOrd="0" presId="urn:microsoft.com/office/officeart/2005/8/layout/radial2"/>
+    <dgm:cxn modelId="{62DE465B-0203-49E5-8C19-6648886AD9C2}" type="presOf" srcId="{8BE338AF-A0A2-49A2-B73D-208347F2E462}" destId="{74305B94-8BC0-473D-8661-BDDEE7828265}" srcOrd="0" destOrd="0" presId="urn:microsoft.com/office/officeart/2005/8/layout/radial2"/>
+    <dgm:cxn modelId="{6E9A0419-46C3-4431-8805-4DDAB70F6854}" srcId="{EF6D1E2B-B2B3-4F87-96E5-793543E9F43F}" destId="{8BE338AF-A0A2-49A2-B73D-208347F2E462}" srcOrd="0" destOrd="0" parTransId="{11DB809F-2EB7-4961-96F3-6961A9B557E7}" sibTransId="{131C0413-A7D5-4F0E-8F4F-74CE93C16919}"/>
+    <dgm:cxn modelId="{FF659C51-A24E-43F9-B1DC-C00B1EB4E864}" srcId="{B12A0242-2433-4029-AD85-F814892D4ED7}" destId="{9710EA1C-7EEC-48B2-85EE-77153699644B}" srcOrd="1" destOrd="0" parTransId="{EDC0110E-5047-48D9-BE58-F954247A1EDD}" sibTransId="{88A46AF2-E5B7-44BB-85B3-6CE6A32E6047}"/>
+    <dgm:cxn modelId="{DC21B904-B97D-459B-AFA0-6D4830C00CEA}" type="presOf" srcId="{610C3ACF-7A84-4679-8074-58B66812FD4D}" destId="{0FEF36F9-A68C-4708-8960-E6CEE6145183}" srcOrd="0" destOrd="0" presId="urn:microsoft.com/office/officeart/2005/8/layout/radial2"/>
+    <dgm:cxn modelId="{41A5AB71-10EC-4AE3-A67A-40B4BBB2A95D}" type="presOf" srcId="{3447004D-6F57-4FC5-96B5-C8D0B7E8FEF8}" destId="{1EE562A9-3F5F-4C57-86C6-834EE5BAB1A6}" srcOrd="0" destOrd="2" presId="urn:microsoft.com/office/officeart/2005/8/layout/radial2"/>
+    <dgm:cxn modelId="{9BACC6AC-186C-48B9-921C-3290E8D1B4A1}" type="presOf" srcId="{9710EA1C-7EEC-48B2-85EE-77153699644B}" destId="{23FBB8E5-36B3-4135-9571-915845BBC3FD}" srcOrd="0" destOrd="1" presId="urn:microsoft.com/office/officeart/2005/8/layout/radial2"/>
+    <dgm:cxn modelId="{9365A353-A172-4995-904F-6A8FD2D73C6A}" type="presOf" srcId="{B97E0F6D-775B-4977-B7A5-E38A8D0E7A89}" destId="{3974FB75-4CDA-4D57-8076-3F4705871C5D}" srcOrd="0" destOrd="0" presId="urn:microsoft.com/office/officeart/2005/8/layout/radial2"/>
+    <dgm:cxn modelId="{259001A6-4DB8-41AF-80F4-6DA95AA9E905}" srcId="{71A059E4-E5A2-430A-8FF1-F9398AAC2421}" destId="{EF6D1E2B-B2B3-4F87-96E5-793543E9F43F}" srcOrd="3" destOrd="0" parTransId="{47D198E4-914C-4E44-AF10-28A7BFAF45B5}" sibTransId="{B53D6E05-C5A1-4AC1-9156-F7CDF28FD62A}"/>
+    <dgm:cxn modelId="{9222F1FF-B709-4D6B-A2C3-9F54D2F0D450}" srcId="{3447004D-6F57-4FC5-96B5-C8D0B7E8FEF8}" destId="{4A1E6FB0-FB70-413E-90A3-696A490812D1}" srcOrd="0" destOrd="0" parTransId="{E9ED75C0-18E4-47E6-AA44-8A8A10A5CE71}" sibTransId="{67F4203E-E21D-4018-AD26-4F02CE02BC43}"/>
+    <dgm:cxn modelId="{6F8A0B50-A415-436B-8DC0-6CAA6D2B1556}" type="presOf" srcId="{B12A0242-2433-4029-AD85-F814892D4ED7}" destId="{010887FA-6A36-4121-9EC6-0C758CF470F3}" srcOrd="0" destOrd="0" presId="urn:microsoft.com/office/officeart/2005/8/layout/radial2"/>
+    <dgm:cxn modelId="{7F8BC0F1-19DB-4A19-9A4F-C7B0BA0A5427}" type="presOf" srcId="{EF6D1E2B-B2B3-4F87-96E5-793543E9F43F}" destId="{2B38D02F-7CB3-4561-9A8D-9A0B5265137D}" srcOrd="0" destOrd="0" presId="urn:microsoft.com/office/officeart/2005/8/layout/radial2"/>
+    <dgm:cxn modelId="{E5F47930-4E37-4B36-BAB0-FFE81EE57773}" type="presOf" srcId="{BCB9F004-C3C1-4E3C-B6DC-F53AED53D70F}" destId="{74305B94-8BC0-473D-8661-BDDEE7828265}" srcOrd="0" destOrd="1" presId="urn:microsoft.com/office/officeart/2005/8/layout/radial2"/>
+    <dgm:cxn modelId="{1C5A92A1-C9E0-4A45-9924-50C358EE6B8F}" type="presOf" srcId="{38321BEE-3435-44CB-A9D9-2959C64ECFF5}" destId="{23FBB8E5-36B3-4135-9571-915845BBC3FD}" srcOrd="0" destOrd="3" presId="urn:microsoft.com/office/officeart/2005/8/layout/radial2"/>
+    <dgm:cxn modelId="{A9058FB2-3894-42FD-BF49-83C1336C4889}" type="presOf" srcId="{F212D2F4-EB78-497F-8B1B-38A997446927}" destId="{4710D380-44A3-4F58-8EE1-CB03CBC8FA0F}" srcOrd="0" destOrd="0" presId="urn:microsoft.com/office/officeart/2005/8/layout/radial2"/>
+    <dgm:cxn modelId="{FB895669-8954-4DA1-BD1D-D12749C32E61}" type="presOf" srcId="{A574C59F-2016-4DAE-BAB8-5E077D6CFB59}" destId="{C4D7BBCE-5C74-4CFB-82F2-5D70E19751DC}" srcOrd="0" destOrd="0" presId="urn:microsoft.com/office/officeart/2005/8/layout/radial2"/>
+    <dgm:cxn modelId="{8750DBDD-E691-4869-BB31-AABBCF8717EC}" type="presOf" srcId="{02D5456C-D591-4104-8404-435F26A9BB17}" destId="{23FBB8E5-36B3-4135-9571-915845BBC3FD}" srcOrd="0" destOrd="2" presId="urn:microsoft.com/office/officeart/2005/8/layout/radial2"/>
+    <dgm:cxn modelId="{C71EEA8A-647C-4CD8-8CC7-B98BB98647F4}" srcId="{71A059E4-E5A2-430A-8FF1-F9398AAC2421}" destId="{20F002F5-B476-4484-BDBC-E1704CEDE259}" srcOrd="0" destOrd="0" parTransId="{F212D2F4-EB78-497F-8B1B-38A997446927}" sibTransId="{E2913B88-62F9-4A78-846D-0BE7730062B4}"/>
+    <dgm:cxn modelId="{816203E0-CADD-4449-B24E-2CFB9E5D85F6}" type="presOf" srcId="{D6C3B4B7-5959-4E1E-A717-8518DF6169A1}" destId="{9D418000-BCAE-40F6-976D-FDCB6DE53090}" srcOrd="0" destOrd="0" presId="urn:microsoft.com/office/officeart/2005/8/layout/radial2"/>
+    <dgm:cxn modelId="{5015904B-1809-499F-A16C-607AC91C6270}" srcId="{610C3ACF-7A84-4679-8074-58B66812FD4D}" destId="{3447004D-6F57-4FC5-96B5-C8D0B7E8FEF8}" srcOrd="2" destOrd="0" parTransId="{17DA82D2-E5BC-4776-8E2F-397C179C95DB}" sibTransId="{EEAB5E8D-5949-403C-A91C-1063EDF0B679}"/>
+    <dgm:cxn modelId="{41BC33BB-E23F-440D-A5BE-ABFD8C057A4F}" srcId="{71A059E4-E5A2-430A-8FF1-F9398AAC2421}" destId="{B12A0242-2433-4029-AD85-F814892D4ED7}" srcOrd="4" destOrd="0" parTransId="{B97E0F6D-775B-4977-B7A5-E38A8D0E7A89}" sibTransId="{AE6B9780-60B4-4544-9DA9-142128284F4A}"/>
+    <dgm:cxn modelId="{0CA09654-ED5C-4373-8811-B0814340A958}" type="presOf" srcId="{7CA392C3-D9E4-42CB-BFA7-B6C53B65D5C8}" destId="{1EE562A9-3F5F-4C57-86C6-834EE5BAB1A6}" srcOrd="0" destOrd="1" presId="urn:microsoft.com/office/officeart/2005/8/layout/radial2"/>
+    <dgm:cxn modelId="{194377A2-C782-4B01-8F04-450B3B6A5EFE}" srcId="{71A059E4-E5A2-430A-8FF1-F9398AAC2421}" destId="{A574C59F-2016-4DAE-BAB8-5E077D6CFB59}" srcOrd="1" destOrd="0" parTransId="{D6C3B4B7-5959-4E1E-A717-8518DF6169A1}" sibTransId="{9035C3CA-AA9A-43BD-AF58-F729C64B63A6}"/>
+    <dgm:cxn modelId="{547F9757-2EFC-45DF-86AC-2D49EEFF1D35}" srcId="{B12A0242-2433-4029-AD85-F814892D4ED7}" destId="{38321BEE-3435-44CB-A9D9-2959C64ECFF5}" srcOrd="3" destOrd="0" parTransId="{53D6883F-BC2F-4CD4-B086-3BF378B79BFB}" sibTransId="{622F2370-C2AB-4D02-AD0E-3256665F50E1}"/>
+    <dgm:cxn modelId="{EA72CE8A-C5C8-41BA-87EF-04FEB826049A}" type="presOf" srcId="{47D198E4-914C-4E44-AF10-28A7BFAF45B5}" destId="{2E0175CA-335B-4D47-82F8-6013A6414A49}" srcOrd="0" destOrd="0" presId="urn:microsoft.com/office/officeart/2005/8/layout/radial2"/>
+    <dgm:cxn modelId="{C5601473-894C-4ADB-B6CE-DF4A01FF02F3}" type="presOf" srcId="{4A1E6FB0-FB70-413E-90A3-696A490812D1}" destId="{1EE562A9-3F5F-4C57-86C6-834EE5BAB1A6}" srcOrd="0" destOrd="3" presId="urn:microsoft.com/office/officeart/2005/8/layout/radial2"/>
+    <dgm:cxn modelId="{4C1E36C0-0956-4F4E-9D09-E4FA239A7C3D}" type="presOf" srcId="{840C0A0A-6AE1-4E29-80AD-6F392FD03EDC}" destId="{23FBB8E5-36B3-4135-9571-915845BBC3FD}" srcOrd="0" destOrd="0" presId="urn:microsoft.com/office/officeart/2005/8/layout/radial2"/>
+    <dgm:cxn modelId="{86A3B69C-8AD4-4A7F-A1DA-D7F47E1BB8A2}" srcId="{71A059E4-E5A2-430A-8FF1-F9398AAC2421}" destId="{610C3ACF-7A84-4679-8074-58B66812FD4D}" srcOrd="2" destOrd="0" parTransId="{F7B48B73-B0C4-4FA2-9AE8-15C89D3EF691}" sibTransId="{C052F008-3677-4699-979C-2DC157FD7BF6}"/>
+    <dgm:cxn modelId="{D20E6C10-C2F5-401C-A743-C318FCF8EFF4}" srcId="{B12A0242-2433-4029-AD85-F814892D4ED7}" destId="{02D5456C-D591-4104-8404-435F26A9BB17}" srcOrd="2" destOrd="0" parTransId="{A63945C3-F0D5-43CF-B667-C39522337D24}" sibTransId="{99DFB1AC-2BC9-4D63-B1DC-514215A97C2B}"/>
+    <dgm:cxn modelId="{AE1F4FF9-ABBE-46C3-90ED-874DE46F98DF}" srcId="{B12A0242-2433-4029-AD85-F814892D4ED7}" destId="{840C0A0A-6AE1-4E29-80AD-6F392FD03EDC}" srcOrd="0" destOrd="0" parTransId="{7985C48D-DA9C-4EF1-A976-122884D4E844}" sibTransId="{ED2ABAA5-E174-4632-BEAE-F7886E9E35F4}"/>
     <dgm:cxn modelId="{C8BA3B85-0B9F-4532-A4C4-CC4725F4CC81}" type="presOf" srcId="{71A059E4-E5A2-430A-8FF1-F9398AAC2421}" destId="{47E43A2D-9040-4B0A-897F-F7A679782C00}" srcOrd="0" destOrd="0" presId="urn:microsoft.com/office/officeart/2005/8/layout/radial2"/>
-    <dgm:cxn modelId="{510B8A85-67F9-4FF6-A67B-12E7331B24DC}" type="presOf" srcId="{028A59AA-CBFB-4127-BC76-D50D05DBFC5F}" destId="{1EE562A9-3F5F-4C57-86C6-834EE5BAB1A6}" srcOrd="0" destOrd="0" presId="urn:microsoft.com/office/officeart/2005/8/layout/radial2"/>
-    <dgm:cxn modelId="{1C5A92A1-C9E0-4A45-9924-50C358EE6B8F}" type="presOf" srcId="{38321BEE-3435-44CB-A9D9-2959C64ECFF5}" destId="{23FBB8E5-36B3-4135-9571-915845BBC3FD}" srcOrd="0" destOrd="3" presId="urn:microsoft.com/office/officeart/2005/8/layout/radial2"/>
-    <dgm:cxn modelId="{194377A2-C782-4B01-8F04-450B3B6A5EFE}" srcId="{71A059E4-E5A2-430A-8FF1-F9398AAC2421}" destId="{A574C59F-2016-4DAE-BAB8-5E077D6CFB59}" srcOrd="1" destOrd="0" parTransId="{D6C3B4B7-5959-4E1E-A717-8518DF6169A1}" sibTransId="{9035C3CA-AA9A-43BD-AF58-F729C64B63A6}"/>
-    <dgm:cxn modelId="{41A5AB71-10EC-4AE3-A67A-40B4BBB2A95D}" type="presOf" srcId="{3447004D-6F57-4FC5-96B5-C8D0B7E8FEF8}" destId="{1EE562A9-3F5F-4C57-86C6-834EE5BAB1A6}" srcOrd="0" destOrd="2" presId="urn:microsoft.com/office/officeart/2005/8/layout/radial2"/>
-    <dgm:cxn modelId="{259001A6-4DB8-41AF-80F4-6DA95AA9E905}" srcId="{71A059E4-E5A2-430A-8FF1-F9398AAC2421}" destId="{EF6D1E2B-B2B3-4F87-96E5-793543E9F43F}" srcOrd="3" destOrd="0" parTransId="{47D198E4-914C-4E44-AF10-28A7BFAF45B5}" sibTransId="{B53D6E05-C5A1-4AC1-9156-F7CDF28FD62A}"/>
-    <dgm:cxn modelId="{DC21B904-B97D-459B-AFA0-6D4830C00CEA}" type="presOf" srcId="{610C3ACF-7A84-4679-8074-58B66812FD4D}" destId="{0FEF36F9-A68C-4708-8960-E6CEE6145183}" srcOrd="0" destOrd="0" presId="urn:microsoft.com/office/officeart/2005/8/layout/radial2"/>
-    <dgm:cxn modelId="{5154F922-021F-41AF-8011-43108DCD62B2}" type="presOf" srcId="{F7B48B73-B0C4-4FA2-9AE8-15C89D3EF691}" destId="{76BA4605-796D-4AD3-BDA5-823550D2F212}" srcOrd="0" destOrd="0" presId="urn:microsoft.com/office/officeart/2005/8/layout/radial2"/>
-    <dgm:cxn modelId="{A193B033-718C-4392-83A3-665E39317F4D}" type="presOf" srcId="{20F002F5-B476-4484-BDBC-E1704CEDE259}" destId="{BCAD45A3-2659-426E-A577-6BB66BA2921F}" srcOrd="0" destOrd="0" presId="urn:microsoft.com/office/officeart/2005/8/layout/radial2"/>
-    <dgm:cxn modelId="{86A3B69C-8AD4-4A7F-A1DA-D7F47E1BB8A2}" srcId="{71A059E4-E5A2-430A-8FF1-F9398AAC2421}" destId="{610C3ACF-7A84-4679-8074-58B66812FD4D}" srcOrd="2" destOrd="0" parTransId="{F7B48B73-B0C4-4FA2-9AE8-15C89D3EF691}" sibTransId="{C052F008-3677-4699-979C-2DC157FD7BF6}"/>
-    <dgm:cxn modelId="{9365A353-A172-4995-904F-6A8FD2D73C6A}" type="presOf" srcId="{B97E0F6D-775B-4977-B7A5-E38A8D0E7A89}" destId="{3974FB75-4CDA-4D57-8076-3F4705871C5D}" srcOrd="0" destOrd="0" presId="urn:microsoft.com/office/officeart/2005/8/layout/radial2"/>
-    <dgm:cxn modelId="{5015904B-1809-499F-A16C-607AC91C6270}" srcId="{610C3ACF-7A84-4679-8074-58B66812FD4D}" destId="{3447004D-6F57-4FC5-96B5-C8D0B7E8FEF8}" srcOrd="2" destOrd="0" parTransId="{17DA82D2-E5BC-4776-8E2F-397C179C95DB}" sibTransId="{EEAB5E8D-5949-403C-A91C-1063EDF0B679}"/>
-    <dgm:cxn modelId="{547F9757-2EFC-45DF-86AC-2D49EEFF1D35}" srcId="{B12A0242-2433-4029-AD85-F814892D4ED7}" destId="{38321BEE-3435-44CB-A9D9-2959C64ECFF5}" srcOrd="3" destOrd="0" parTransId="{53D6883F-BC2F-4CD4-B086-3BF378B79BFB}" sibTransId="{622F2370-C2AB-4D02-AD0E-3256665F50E1}"/>
-    <dgm:cxn modelId="{0CA09654-ED5C-4373-8811-B0814340A958}" type="presOf" srcId="{7CA392C3-D9E4-42CB-BFA7-B6C53B65D5C8}" destId="{1EE562A9-3F5F-4C57-86C6-834EE5BAB1A6}" srcOrd="0" destOrd="1" presId="urn:microsoft.com/office/officeart/2005/8/layout/radial2"/>
-    <dgm:cxn modelId="{BFB71832-B626-4BD4-930E-6298F29305F7}" srcId="{EF6D1E2B-B2B3-4F87-96E5-793543E9F43F}" destId="{BCB9F004-C3C1-4E3C-B6DC-F53AED53D70F}" srcOrd="1" destOrd="0" parTransId="{AD83EFF9-B013-4BCC-B483-FE01B01C3E6B}" sibTransId="{41F0EEEF-BEFB-4ACC-8523-DDB7A6262922}"/>
-    <dgm:cxn modelId="{7F8BC0F1-19DB-4A19-9A4F-C7B0BA0A5427}" type="presOf" srcId="{EF6D1E2B-B2B3-4F87-96E5-793543E9F43F}" destId="{2B38D02F-7CB3-4561-9A8D-9A0B5265137D}" srcOrd="0" destOrd="0" presId="urn:microsoft.com/office/officeart/2005/8/layout/radial2"/>
+    <dgm:cxn modelId="{5D77A46E-EFD3-4718-85A6-D3468123003D}" type="presOf" srcId="{FF281A5A-7EAD-4ECD-977A-B15E0AD51E26}" destId="{7A53C442-5E14-411A-A9BC-FCED8EE7841C}" srcOrd="0" destOrd="0" presId="urn:microsoft.com/office/officeart/2005/8/layout/radial2"/>
+    <dgm:cxn modelId="{BFA4DBEE-CE9C-4034-968C-64769D9D5628}" type="presOf" srcId="{31215E46-ABA6-4BAA-8553-A65AE7DF7913}" destId="{74305B94-8BC0-473D-8661-BDDEE7828265}" srcOrd="0" destOrd="2" presId="urn:microsoft.com/office/officeart/2005/8/layout/radial2"/>
     <dgm:cxn modelId="{6A294E1C-9844-4F25-96C9-DAB2DE4217FF}" srcId="{A574C59F-2016-4DAE-BAB8-5E077D6CFB59}" destId="{FF281A5A-7EAD-4ECD-977A-B15E0AD51E26}" srcOrd="0" destOrd="0" parTransId="{83C6B936-D586-4DA2-B039-4C8E6D50A007}" sibTransId="{86F3C38E-355D-4000-B159-F537762A0845}"/>
-    <dgm:cxn modelId="{8750DBDD-E691-4869-BB31-AABBCF8717EC}" type="presOf" srcId="{02D5456C-D591-4104-8404-435F26A9BB17}" destId="{23FBB8E5-36B3-4135-9571-915845BBC3FD}" srcOrd="0" destOrd="2" presId="urn:microsoft.com/office/officeart/2005/8/layout/radial2"/>
-    <dgm:cxn modelId="{BFA4DBEE-CE9C-4034-968C-64769D9D5628}" type="presOf" srcId="{31215E46-ABA6-4BAA-8553-A65AE7DF7913}" destId="{74305B94-8BC0-473D-8661-BDDEE7828265}" srcOrd="0" destOrd="2" presId="urn:microsoft.com/office/officeart/2005/8/layout/radial2"/>
-    <dgm:cxn modelId="{5D77A46E-EFD3-4718-85A6-D3468123003D}" type="presOf" srcId="{FF281A5A-7EAD-4ECD-977A-B15E0AD51E26}" destId="{7A53C442-5E14-411A-A9BC-FCED8EE7841C}" srcOrd="0" destOrd="0" presId="urn:microsoft.com/office/officeart/2005/8/layout/radial2"/>
-    <dgm:cxn modelId="{62DE465B-0203-49E5-8C19-6648886AD9C2}" type="presOf" srcId="{8BE338AF-A0A2-49A2-B73D-208347F2E462}" destId="{74305B94-8BC0-473D-8661-BDDEE7828265}" srcOrd="0" destOrd="0" presId="urn:microsoft.com/office/officeart/2005/8/layout/radial2"/>
-    <dgm:cxn modelId="{FB895669-8954-4DA1-BD1D-D12749C32E61}" type="presOf" srcId="{A574C59F-2016-4DAE-BAB8-5E077D6CFB59}" destId="{C4D7BBCE-5C74-4CFB-82F2-5D70E19751DC}" srcOrd="0" destOrd="0" presId="urn:microsoft.com/office/officeart/2005/8/layout/radial2"/>
-    <dgm:cxn modelId="{9222F1FF-B709-4D6B-A2C3-9F54D2F0D450}" srcId="{3447004D-6F57-4FC5-96B5-C8D0B7E8FEF8}" destId="{4A1E6FB0-FB70-413E-90A3-696A490812D1}" srcOrd="0" destOrd="0" parTransId="{E9ED75C0-18E4-47E6-AA44-8A8A10A5CE71}" sibTransId="{67F4203E-E21D-4018-AD26-4F02CE02BC43}"/>
-    <dgm:cxn modelId="{8C536857-3E0E-4E86-B0E3-B3EAB2AA9B83}" srcId="{EF6D1E2B-B2B3-4F87-96E5-793543E9F43F}" destId="{31215E46-ABA6-4BAA-8553-A65AE7DF7913}" srcOrd="2" destOrd="0" parTransId="{1727AB60-245E-49D8-9A57-D19FC51E6349}" sibTransId="{584E1165-2406-4A31-A354-D0676125101D}"/>
-    <dgm:cxn modelId="{C71EEA8A-647C-4CD8-8CC7-B98BB98647F4}" srcId="{71A059E4-E5A2-430A-8FF1-F9398AAC2421}" destId="{20F002F5-B476-4484-BDBC-E1704CEDE259}" srcOrd="0" destOrd="0" parTransId="{F212D2F4-EB78-497F-8B1B-38A997446927}" sibTransId="{E2913B88-62F9-4A78-846D-0BE7730062B4}"/>
-    <dgm:cxn modelId="{56AA2936-F13F-4B1F-B9A5-3D296282E55A}" srcId="{610C3ACF-7A84-4679-8074-58B66812FD4D}" destId="{028A59AA-CBFB-4127-BC76-D50D05DBFC5F}" srcOrd="0" destOrd="0" parTransId="{ABA3AA92-80FE-4BCA-A89A-496F04FA573D}" sibTransId="{FD4F982F-BC8D-4D68-AC6D-58F77D5DCBEC}"/>
-    <dgm:cxn modelId="{C5601473-894C-4ADB-B6CE-DF4A01FF02F3}" type="presOf" srcId="{4A1E6FB0-FB70-413E-90A3-696A490812D1}" destId="{1EE562A9-3F5F-4C57-86C6-834EE5BAB1A6}" srcOrd="0" destOrd="3" presId="urn:microsoft.com/office/officeart/2005/8/layout/radial2"/>
-    <dgm:cxn modelId="{9BACC6AC-186C-48B9-921C-3290E8D1B4A1}" type="presOf" srcId="{9710EA1C-7EEC-48B2-85EE-77153699644B}" destId="{23FBB8E5-36B3-4135-9571-915845BBC3FD}" srcOrd="0" destOrd="1" presId="urn:microsoft.com/office/officeart/2005/8/layout/radial2"/>
-    <dgm:cxn modelId="{E5F47930-4E37-4B36-BAB0-FFE81EE57773}" type="presOf" srcId="{BCB9F004-C3C1-4E3C-B6DC-F53AED53D70F}" destId="{74305B94-8BC0-473D-8661-BDDEE7828265}" srcOrd="0" destOrd="1" presId="urn:microsoft.com/office/officeart/2005/8/layout/radial2"/>
-    <dgm:cxn modelId="{D20E6C10-C2F5-401C-A743-C318FCF8EFF4}" srcId="{B12A0242-2433-4029-AD85-F814892D4ED7}" destId="{02D5456C-D591-4104-8404-435F26A9BB17}" srcOrd="2" destOrd="0" parTransId="{A63945C3-F0D5-43CF-B667-C39522337D24}" sibTransId="{99DFB1AC-2BC9-4D63-B1DC-514215A97C2B}"/>
-    <dgm:cxn modelId="{A9058FB2-3894-42FD-BF49-83C1336C4889}" type="presOf" srcId="{F212D2F4-EB78-497F-8B1B-38A997446927}" destId="{4710D380-44A3-4F58-8EE1-CB03CBC8FA0F}" srcOrd="0" destOrd="0" presId="urn:microsoft.com/office/officeart/2005/8/layout/radial2"/>
-    <dgm:cxn modelId="{EA72CE8A-C5C8-41BA-87EF-04FEB826049A}" type="presOf" srcId="{47D198E4-914C-4E44-AF10-28A7BFAF45B5}" destId="{2E0175CA-335B-4D47-82F8-6013A6414A49}" srcOrd="0" destOrd="0" presId="urn:microsoft.com/office/officeart/2005/8/layout/radial2"/>
-    <dgm:cxn modelId="{6F8A0B50-A415-436B-8DC0-6CAA6D2B1556}" type="presOf" srcId="{B12A0242-2433-4029-AD85-F814892D4ED7}" destId="{010887FA-6A36-4121-9EC6-0C758CF470F3}" srcOrd="0" destOrd="0" presId="urn:microsoft.com/office/officeart/2005/8/layout/radial2"/>
-    <dgm:cxn modelId="{4C1E36C0-0956-4F4E-9D09-E4FA239A7C3D}" type="presOf" srcId="{840C0A0A-6AE1-4E29-80AD-6F392FD03EDC}" destId="{23FBB8E5-36B3-4135-9571-915845BBC3FD}" srcOrd="0" destOrd="0" presId="urn:microsoft.com/office/officeart/2005/8/layout/radial2"/>
-    <dgm:cxn modelId="{41BC33BB-E23F-440D-A5BE-ABFD8C057A4F}" srcId="{71A059E4-E5A2-430A-8FF1-F9398AAC2421}" destId="{B12A0242-2433-4029-AD85-F814892D4ED7}" srcOrd="4" destOrd="0" parTransId="{B97E0F6D-775B-4977-B7A5-E38A8D0E7A89}" sibTransId="{AE6B9780-60B4-4544-9DA9-142128284F4A}"/>
-    <dgm:cxn modelId="{6E9A0419-46C3-4431-8805-4DDAB70F6854}" srcId="{EF6D1E2B-B2B3-4F87-96E5-793543E9F43F}" destId="{8BE338AF-A0A2-49A2-B73D-208347F2E462}" srcOrd="0" destOrd="0" parTransId="{11DB809F-2EB7-4961-96F3-6961A9B557E7}" sibTransId="{131C0413-A7D5-4F0E-8F4F-74CE93C16919}"/>
-    <dgm:cxn modelId="{7F93696C-17BB-4851-91C5-7D28AB1CE32C}" srcId="{610C3ACF-7A84-4679-8074-58B66812FD4D}" destId="{7CA392C3-D9E4-42CB-BFA7-B6C53B65D5C8}" srcOrd="1" destOrd="0" parTransId="{F2D76B9D-CD09-42A4-9E5D-6A8971FD1C73}" sibTransId="{D7969AA2-C3BE-4C7F-A4F8-CE1389A4E1C2}"/>
-    <dgm:cxn modelId="{FF659C51-A24E-43F9-B1DC-C00B1EB4E864}" srcId="{B12A0242-2433-4029-AD85-F814892D4ED7}" destId="{9710EA1C-7EEC-48B2-85EE-77153699644B}" srcOrd="1" destOrd="0" parTransId="{EDC0110E-5047-48D9-BE58-F954247A1EDD}" sibTransId="{88A46AF2-E5B7-44BB-85B3-6CE6A32E6047}"/>
-    <dgm:cxn modelId="{816203E0-CADD-4449-B24E-2CFB9E5D85F6}" type="presOf" srcId="{D6C3B4B7-5959-4E1E-A717-8518DF6169A1}" destId="{9D418000-BCAE-40F6-976D-FDCB6DE53090}" srcOrd="0" destOrd="0" presId="urn:microsoft.com/office/officeart/2005/8/layout/radial2"/>
-    <dgm:cxn modelId="{AE1F4FF9-ABBE-46C3-90ED-874DE46F98DF}" srcId="{B12A0242-2433-4029-AD85-F814892D4ED7}" destId="{840C0A0A-6AE1-4E29-80AD-6F392FD03EDC}" srcOrd="0" destOrd="0" parTransId="{7985C48D-DA9C-4EF1-A976-122884D4E844}" sibTransId="{ED2ABAA5-E174-4632-BEAE-F7886E9E35F4}"/>
     <dgm:cxn modelId="{6AEAEC09-C593-4505-BA75-DFF6033DAE79}" type="presParOf" srcId="{47E43A2D-9040-4B0A-897F-F7A679782C00}" destId="{13265ED7-7B77-4F07-918F-876EDE483898}" srcOrd="0" destOrd="0" presId="urn:microsoft.com/office/officeart/2005/8/layout/radial2"/>
     <dgm:cxn modelId="{DDEE6314-7CDD-4DBD-A674-421050B30DA1}" type="presParOf" srcId="{13265ED7-7B77-4F07-918F-876EDE483898}" destId="{78D1608B-1DF8-40F7-9027-360B5A0F0188}" srcOrd="0" destOrd="0" presId="urn:microsoft.com/office/officeart/2005/8/layout/radial2"/>
     <dgm:cxn modelId="{94972ED1-3E2F-4BF2-9BA4-63E5359616DD}" type="presParOf" srcId="{78D1608B-1DF8-40F7-9027-360B5A0F0188}" destId="{D2A9ED7B-3DCF-4AD2-8ABF-C239829B62D1}" srcOrd="0" destOrd="0" presId="urn:microsoft.com/office/officeart/2005/8/layout/radial2"/>
@@ -2088,9 +2095,9 @@
         <dsp:cNvSpPr/>
       </dsp:nvSpPr>
       <dsp:spPr>
-        <a:xfrm rot="3971614">
-          <a:off x="1656655" y="3647033"/>
-          <a:ext cx="963521" cy="40297"/>
+        <a:xfrm rot="3931229">
+          <a:off x="1757739" y="3711449"/>
+          <a:ext cx="1075341" cy="40297"/>
         </a:xfrm>
         <a:custGeom>
           <a:avLst/>
@@ -2104,7 +2111,7 @@
                 <a:pt x="0" y="20148"/>
               </a:moveTo>
               <a:lnTo>
-                <a:pt x="963521" y="20148"/>
+                <a:pt x="1075341" y="20148"/>
               </a:lnTo>
             </a:path>
           </a:pathLst>
@@ -2142,9 +2149,9 @@
         <dsp:cNvSpPr/>
       </dsp:nvSpPr>
       <dsp:spPr>
-        <a:xfrm rot="1072179">
-          <a:off x="2228190" y="2956605"/>
-          <a:ext cx="764989" cy="40297"/>
+        <a:xfrm rot="1188243">
+          <a:off x="2346869" y="2994619"/>
+          <a:ext cx="703169" cy="40297"/>
         </a:xfrm>
         <a:custGeom>
           <a:avLst/>
@@ -2158,7 +2165,7 @@
                 <a:pt x="0" y="20148"/>
               </a:moveTo>
               <a:lnTo>
-                <a:pt x="764989" y="20148"/>
+                <a:pt x="703169" y="20148"/>
               </a:lnTo>
             </a:path>
           </a:pathLst>
@@ -2196,9 +2203,9 @@
         <dsp:cNvSpPr/>
       </dsp:nvSpPr>
       <dsp:spPr>
-        <a:xfrm rot="20544919">
-          <a:off x="2207636" y="2240745"/>
-          <a:ext cx="1669490" cy="40297"/>
+        <a:xfrm rot="20564592">
+          <a:off x="2324268" y="2226205"/>
+          <a:ext cx="1928027" cy="40297"/>
         </a:xfrm>
         <a:custGeom>
           <a:avLst/>
@@ -2212,7 +2219,7 @@
                 <a:pt x="0" y="20148"/>
               </a:moveTo>
               <a:lnTo>
-                <a:pt x="1669490" y="20148"/>
+                <a:pt x="1928027" y="20148"/>
               </a:lnTo>
             </a:path>
           </a:pathLst>
@@ -2251,7 +2258,7 @@
       </dsp:nvSpPr>
       <dsp:spPr>
         <a:xfrm rot="17752077">
-          <a:off x="1674118" y="1654434"/>
+          <a:off x="1795138" y="1670280"/>
           <a:ext cx="1041346" cy="40297"/>
         </a:xfrm>
         <a:custGeom>
@@ -2304,9 +2311,9 @@
         <dsp:cNvSpPr/>
       </dsp:nvSpPr>
       <dsp:spPr>
-        <a:xfrm rot="14839394">
-          <a:off x="1062612" y="1845873"/>
-          <a:ext cx="600552" cy="40297"/>
+        <a:xfrm rot="14828289">
+          <a:off x="1024224" y="1758267"/>
+          <a:ext cx="825911" cy="40297"/>
         </a:xfrm>
         <a:custGeom>
           <a:avLst/>
@@ -2320,7 +2327,7 @@
                 <a:pt x="0" y="20148"/>
               </a:moveTo>
               <a:lnTo>
-                <a:pt x="600552" y="20148"/>
+                <a:pt x="825911" y="20148"/>
               </a:lnTo>
             </a:path>
           </a:pathLst>
@@ -2359,7 +2366,7 @@
       </dsp:nvSpPr>
       <dsp:spPr>
         <a:xfrm>
-          <a:off x="820938" y="1769098"/>
+          <a:off x="941959" y="1784944"/>
           <a:ext cx="1768081" cy="1831301"/>
         </a:xfrm>
         <a:prstGeom prst="ellipse">
@@ -2408,8 +2415,8 @@
       </dsp:nvSpPr>
       <dsp:spPr>
         <a:xfrm>
-          <a:off x="646935" y="756083"/>
-          <a:ext cx="866363" cy="866363"/>
+          <a:off x="876822" y="844519"/>
+          <a:ext cx="576053" cy="576001"/>
         </a:xfrm>
         <a:prstGeom prst="ellipse">
           <a:avLst/>
@@ -2474,8 +2481,8 @@
         </a:p>
       </dsp:txBody>
       <dsp:txXfrm>
-        <a:off x="773811" y="882959"/>
-        <a:ext cx="612611" cy="612611"/>
+        <a:off x="961183" y="928872"/>
+        <a:ext cx="407331" cy="407295"/>
       </dsp:txXfrm>
     </dsp:sp>
     <dsp:sp modelId="{C4D7BBCE-5C74-4CFB-82F2-5D70E19751DC}">
@@ -2485,7 +2492,7 @@
       </dsp:nvSpPr>
       <dsp:spPr>
         <a:xfrm>
-          <a:off x="2160243" y="324034"/>
+          <a:off x="2281264" y="339880"/>
           <a:ext cx="928565" cy="928565"/>
         </a:xfrm>
         <a:prstGeom prst="ellipse">
@@ -2551,7 +2558,7 @@
         </a:p>
       </dsp:txBody>
       <dsp:txXfrm>
-        <a:off x="2296228" y="460019"/>
+        <a:off x="2417249" y="475865"/>
         <a:ext cx="656595" cy="656595"/>
       </dsp:txXfrm>
     </dsp:sp>
@@ -2562,7 +2569,7 @@
       </dsp:nvSpPr>
       <dsp:spPr>
         <a:xfrm>
-          <a:off x="3181665" y="324034"/>
+          <a:off x="3302686" y="339880"/>
           <a:ext cx="1392848" cy="928565"/>
         </a:xfrm>
         <a:prstGeom prst="rect">
@@ -2624,7 +2631,7 @@
         </a:p>
       </dsp:txBody>
       <dsp:txXfrm>
-        <a:off x="3181665" y="324034"/>
+        <a:off x="3302686" y="339880"/>
         <a:ext cx="1392848" cy="928565"/>
       </dsp:txXfrm>
     </dsp:sp>
@@ -2635,8 +2642,8 @@
       </dsp:nvSpPr>
       <dsp:spPr>
         <a:xfrm>
-          <a:off x="3816425" y="1404155"/>
-          <a:ext cx="928565" cy="928565"/>
+          <a:off x="4198054" y="1620181"/>
+          <a:ext cx="511593" cy="528205"/>
         </a:xfrm>
         <a:prstGeom prst="ellipse">
           <a:avLst/>
@@ -2701,8 +2708,8 @@
         </a:p>
       </dsp:txBody>
       <dsp:txXfrm>
-        <a:off x="3952410" y="1540140"/>
-        <a:ext cx="656595" cy="656595"/>
+        <a:off x="4272975" y="1697535"/>
+        <a:ext cx="361751" cy="373497"/>
       </dsp:txXfrm>
     </dsp:sp>
     <dsp:sp modelId="{1EE562A9-3F5F-4C57-86C6-834EE5BAB1A6}">
@@ -2712,8 +2719,8 @@
       </dsp:nvSpPr>
       <dsp:spPr>
         <a:xfrm>
-          <a:off x="4837847" y="1404155"/>
-          <a:ext cx="1392848" cy="928565"/>
+          <a:off x="5323719" y="1620181"/>
+          <a:ext cx="767389" cy="528205"/>
         </a:xfrm>
         <a:prstGeom prst="rect">
           <a:avLst/>
@@ -2867,8 +2874,8 @@
         </a:p>
       </dsp:txBody>
       <dsp:txXfrm>
-        <a:off x="4837847" y="1404155"/>
-        <a:ext cx="1392848" cy="928565"/>
+        <a:off x="5323719" y="1620181"/>
+        <a:ext cx="767389" cy="528205"/>
       </dsp:txXfrm>
     </dsp:sp>
     <dsp:sp modelId="{2B38D02F-7CB3-4561-9A8D-9A0B5265137D}">
@@ -2878,8 +2885,8 @@
       </dsp:nvSpPr>
       <dsp:spPr>
         <a:xfrm>
-          <a:off x="2952328" y="2772307"/>
-          <a:ext cx="928565" cy="928565"/>
+          <a:off x="3007940" y="2895881"/>
+          <a:ext cx="720167" cy="720000"/>
         </a:xfrm>
         <a:prstGeom prst="ellipse">
           <a:avLst/>
@@ -2944,8 +2951,8 @@
         </a:p>
       </dsp:txBody>
       <dsp:txXfrm>
-        <a:off x="3088313" y="2908292"/>
-        <a:ext cx="656595" cy="656595"/>
+        <a:off x="3113406" y="3001323"/>
+        <a:ext cx="509235" cy="509116"/>
       </dsp:txXfrm>
     </dsp:sp>
     <dsp:sp modelId="{74305B94-8BC0-473D-8661-BDDEE7828265}">
@@ -2955,8 +2962,8 @@
       </dsp:nvSpPr>
       <dsp:spPr>
         <a:xfrm>
-          <a:off x="3973751" y="2772307"/>
-          <a:ext cx="1392848" cy="928565"/>
+          <a:off x="4081461" y="2895881"/>
+          <a:ext cx="1080251" cy="720000"/>
         </a:xfrm>
         <a:prstGeom prst="rect">
           <a:avLst/>
@@ -3067,8 +3074,8 @@
         </a:p>
       </dsp:txBody>
       <dsp:txXfrm>
-        <a:off x="3973751" y="2772307"/>
-        <a:ext cx="1392848" cy="928565"/>
+        <a:off x="4081461" y="2895881"/>
+        <a:ext cx="1080251" cy="720000"/>
       </dsp:txXfrm>
     </dsp:sp>
     <dsp:sp modelId="{010887FA-6A36-4121-9EC6-0C758CF470F3}">
@@ -3078,8 +3085,8 @@
       </dsp:nvSpPr>
       <dsp:spPr>
         <a:xfrm>
-          <a:off x="2056001" y="4068448"/>
-          <a:ext cx="928565" cy="928565"/>
+          <a:off x="2307375" y="4188576"/>
+          <a:ext cx="720000" cy="720000"/>
         </a:xfrm>
         <a:prstGeom prst="ellipse">
           <a:avLst/>
@@ -3148,8 +3155,8 @@
         </a:p>
       </dsp:txBody>
       <dsp:txXfrm>
-        <a:off x="2191986" y="4204433"/>
-        <a:ext cx="656595" cy="656595"/>
+        <a:off x="2412817" y="4294018"/>
+        <a:ext cx="509116" cy="509116"/>
       </dsp:txXfrm>
     </dsp:sp>
     <dsp:sp modelId="{23FBB8E5-36B3-4135-9571-915845BBC3FD}">
@@ -3159,8 +3166,8 @@
       </dsp:nvSpPr>
       <dsp:spPr>
         <a:xfrm>
-          <a:off x="3077424" y="4068448"/>
-          <a:ext cx="1392848" cy="928565"/>
+          <a:off x="3380939" y="4188576"/>
+          <a:ext cx="1080000" cy="720000"/>
         </a:xfrm>
         <a:prstGeom prst="rect">
           <a:avLst/>
@@ -3314,8 +3321,8 @@
         </a:p>
       </dsp:txBody>
       <dsp:txXfrm>
-        <a:off x="3077424" y="4068448"/>
-        <a:ext cx="1392848" cy="928565"/>
+        <a:off x="3380939" y="4188576"/>
+        <a:ext cx="1080000" cy="720000"/>
       </dsp:txXfrm>
     </dsp:sp>
   </dsp:spTree>
@@ -7696,7 +7703,7 @@
           <p:nvPr>
             <p:extLst>
               <p:ext uri="{D42A27DB-BD31-4B8C-83A1-F6EECF244321}">
-                <p14:modId xmlns:p14="http://schemas.microsoft.com/office/powerpoint/2010/main" val="4215175192"/>
+                <p14:modId xmlns:p14="http://schemas.microsoft.com/office/powerpoint/2010/main" val="3007716943"/>
               </p:ext>
             </p:extLst>
           </p:nvPr>
@@ -7719,7 +7726,7 @@
         </p:nvSpPr>
         <p:spPr>
           <a:xfrm>
-            <a:off x="2627784" y="2793122"/>
+            <a:off x="2699792" y="2793122"/>
             <a:ext cx="1440160" cy="707886"/>
           </a:xfrm>
           <a:prstGeom prst="rect">

</xml_diff>